<commit_message>
no RST for HL and T
</commit_message>
<xml_diff>
--- a/doc/cpu.pptx
+++ b/doc/cpu.pptx
@@ -53,7 +53,7 @@
       </p:grpSpPr>
       <p:sp>
         <p:nvSpPr>
-          <p:cNvPr id="23" name="PlaceHolder 1"/>
+          <p:cNvPr id="21" name="PlaceHolder 1"/>
           <p:cNvSpPr>
             <a:spLocks noGrp="1"/>
           </p:cNvSpPr>
@@ -84,7 +84,7 @@
       </p:sp>
       <p:sp>
         <p:nvSpPr>
-          <p:cNvPr id="24" name="PlaceHolder 2"/>
+          <p:cNvPr id="22" name="PlaceHolder 2"/>
           <p:cNvSpPr>
             <a:spLocks noGrp="1"/>
           </p:cNvSpPr>
@@ -114,7 +114,7 @@
       </p:sp>
       <p:sp>
         <p:nvSpPr>
-          <p:cNvPr id="25" name="PlaceHolder 3"/>
+          <p:cNvPr id="23" name="PlaceHolder 3"/>
           <p:cNvSpPr>
             <a:spLocks noGrp="1"/>
           </p:cNvSpPr>
@@ -166,7 +166,7 @@
       </p:grpSpPr>
       <p:sp>
         <p:nvSpPr>
-          <p:cNvPr id="26" name="PlaceHolder 1"/>
+          <p:cNvPr id="24" name="PlaceHolder 1"/>
           <p:cNvSpPr>
             <a:spLocks noGrp="1"/>
           </p:cNvSpPr>
@@ -197,7 +197,7 @@
       </p:sp>
       <p:sp>
         <p:nvSpPr>
-          <p:cNvPr id="27" name="PlaceHolder 2"/>
+          <p:cNvPr id="25" name="PlaceHolder 2"/>
           <p:cNvSpPr>
             <a:spLocks noGrp="1"/>
           </p:cNvSpPr>
@@ -227,7 +227,7 @@
       </p:sp>
       <p:sp>
         <p:nvSpPr>
-          <p:cNvPr id="28" name="PlaceHolder 3"/>
+          <p:cNvPr id="26" name="PlaceHolder 3"/>
           <p:cNvSpPr>
             <a:spLocks noGrp="1"/>
           </p:cNvSpPr>
@@ -257,7 +257,7 @@
       </p:sp>
       <p:sp>
         <p:nvSpPr>
-          <p:cNvPr id="29" name="PlaceHolder 4"/>
+          <p:cNvPr id="27" name="PlaceHolder 4"/>
           <p:cNvSpPr>
             <a:spLocks noGrp="1"/>
           </p:cNvSpPr>
@@ -287,7 +287,7 @@
       </p:sp>
       <p:sp>
         <p:nvSpPr>
-          <p:cNvPr id="30" name="PlaceHolder 5"/>
+          <p:cNvPr id="28" name="PlaceHolder 5"/>
           <p:cNvSpPr>
             <a:spLocks noGrp="1"/>
           </p:cNvSpPr>
@@ -339,7 +339,7 @@
       </p:grpSpPr>
       <p:sp>
         <p:nvSpPr>
-          <p:cNvPr id="31" name="PlaceHolder 1"/>
+          <p:cNvPr id="29" name="PlaceHolder 1"/>
           <p:cNvSpPr>
             <a:spLocks noGrp="1"/>
           </p:cNvSpPr>
@@ -370,7 +370,7 @@
       </p:sp>
       <p:sp>
         <p:nvSpPr>
-          <p:cNvPr id="32" name="PlaceHolder 2"/>
+          <p:cNvPr id="30" name="PlaceHolder 2"/>
           <p:cNvSpPr>
             <a:spLocks noGrp="1"/>
           </p:cNvSpPr>
@@ -400,7 +400,7 @@
       </p:sp>
       <p:sp>
         <p:nvSpPr>
-          <p:cNvPr id="33" name="PlaceHolder 3"/>
+          <p:cNvPr id="31" name="PlaceHolder 3"/>
           <p:cNvSpPr>
             <a:spLocks noGrp="1"/>
           </p:cNvSpPr>
@@ -430,7 +430,7 @@
       </p:sp>
       <p:sp>
         <p:nvSpPr>
-          <p:cNvPr id="34" name="PlaceHolder 4"/>
+          <p:cNvPr id="32" name="PlaceHolder 4"/>
           <p:cNvSpPr>
             <a:spLocks noGrp="1"/>
           </p:cNvSpPr>
@@ -460,7 +460,7 @@
       </p:sp>
       <p:sp>
         <p:nvSpPr>
-          <p:cNvPr id="35" name="PlaceHolder 5"/>
+          <p:cNvPr id="33" name="PlaceHolder 5"/>
           <p:cNvSpPr>
             <a:spLocks noGrp="1"/>
           </p:cNvSpPr>
@@ -490,7 +490,7 @@
       </p:sp>
       <p:sp>
         <p:nvSpPr>
-          <p:cNvPr id="36" name="PlaceHolder 6"/>
+          <p:cNvPr id="34" name="PlaceHolder 6"/>
           <p:cNvSpPr>
             <a:spLocks noGrp="1"/>
           </p:cNvSpPr>
@@ -520,7 +520,7 @@
       </p:sp>
       <p:sp>
         <p:nvSpPr>
-          <p:cNvPr id="37" name="PlaceHolder 7"/>
+          <p:cNvPr id="35" name="PlaceHolder 7"/>
           <p:cNvSpPr>
             <a:spLocks noGrp="1"/>
           </p:cNvSpPr>
@@ -572,7 +572,7 @@
       </p:grpSpPr>
       <p:sp>
         <p:nvSpPr>
-          <p:cNvPr id="2" name="PlaceHolder 1"/>
+          <p:cNvPr id="0" name="PlaceHolder 1"/>
           <p:cNvSpPr>
             <a:spLocks noGrp="1"/>
           </p:cNvSpPr>
@@ -603,7 +603,7 @@
       </p:sp>
       <p:sp>
         <p:nvSpPr>
-          <p:cNvPr id="3" name="PlaceHolder 2"/>
+          <p:cNvPr id="1" name="PlaceHolder 2"/>
           <p:cNvSpPr>
             <a:spLocks noGrp="1"/>
           </p:cNvSpPr>
@@ -656,7 +656,7 @@
       </p:grpSpPr>
       <p:sp>
         <p:nvSpPr>
-          <p:cNvPr id="4" name="PlaceHolder 1"/>
+          <p:cNvPr id="2" name="PlaceHolder 1"/>
           <p:cNvSpPr>
             <a:spLocks noGrp="1"/>
           </p:cNvSpPr>
@@ -687,7 +687,7 @@
       </p:sp>
       <p:sp>
         <p:nvSpPr>
-          <p:cNvPr id="5" name="PlaceHolder 2"/>
+          <p:cNvPr id="3" name="PlaceHolder 2"/>
           <p:cNvSpPr>
             <a:spLocks noGrp="1"/>
           </p:cNvSpPr>
@@ -739,7 +739,7 @@
       </p:grpSpPr>
       <p:sp>
         <p:nvSpPr>
-          <p:cNvPr id="6" name="PlaceHolder 1"/>
+          <p:cNvPr id="4" name="PlaceHolder 1"/>
           <p:cNvSpPr>
             <a:spLocks noGrp="1"/>
           </p:cNvSpPr>
@@ -770,7 +770,7 @@
       </p:sp>
       <p:sp>
         <p:nvSpPr>
-          <p:cNvPr id="7" name="PlaceHolder 2"/>
+          <p:cNvPr id="5" name="PlaceHolder 2"/>
           <p:cNvSpPr>
             <a:spLocks noGrp="1"/>
           </p:cNvSpPr>
@@ -800,7 +800,7 @@
       </p:sp>
       <p:sp>
         <p:nvSpPr>
-          <p:cNvPr id="8" name="PlaceHolder 3"/>
+          <p:cNvPr id="6" name="PlaceHolder 3"/>
           <p:cNvSpPr>
             <a:spLocks noGrp="1"/>
           </p:cNvSpPr>
@@ -852,7 +852,7 @@
       </p:grpSpPr>
       <p:sp>
         <p:nvSpPr>
-          <p:cNvPr id="9" name="PlaceHolder 1"/>
+          <p:cNvPr id="7" name="PlaceHolder 1"/>
           <p:cNvSpPr>
             <a:spLocks noGrp="1"/>
           </p:cNvSpPr>
@@ -905,7 +905,7 @@
       </p:grpSpPr>
       <p:sp>
         <p:nvSpPr>
-          <p:cNvPr id="10" name="PlaceHolder 1"/>
+          <p:cNvPr id="8" name="PlaceHolder 1"/>
           <p:cNvSpPr>
             <a:spLocks noGrp="1"/>
           </p:cNvSpPr>
@@ -958,7 +958,7 @@
       </p:grpSpPr>
       <p:sp>
         <p:nvSpPr>
-          <p:cNvPr id="11" name="PlaceHolder 1"/>
+          <p:cNvPr id="9" name="PlaceHolder 1"/>
           <p:cNvSpPr>
             <a:spLocks noGrp="1"/>
           </p:cNvSpPr>
@@ -989,7 +989,7 @@
       </p:sp>
       <p:sp>
         <p:nvSpPr>
-          <p:cNvPr id="12" name="PlaceHolder 2"/>
+          <p:cNvPr id="10" name="PlaceHolder 2"/>
           <p:cNvSpPr>
             <a:spLocks noGrp="1"/>
           </p:cNvSpPr>
@@ -1019,7 +1019,7 @@
       </p:sp>
       <p:sp>
         <p:nvSpPr>
-          <p:cNvPr id="13" name="PlaceHolder 3"/>
+          <p:cNvPr id="11" name="PlaceHolder 3"/>
           <p:cNvSpPr>
             <a:spLocks noGrp="1"/>
           </p:cNvSpPr>
@@ -1049,7 +1049,7 @@
       </p:sp>
       <p:sp>
         <p:nvSpPr>
-          <p:cNvPr id="14" name="PlaceHolder 4"/>
+          <p:cNvPr id="12" name="PlaceHolder 4"/>
           <p:cNvSpPr>
             <a:spLocks noGrp="1"/>
           </p:cNvSpPr>
@@ -1101,7 +1101,7 @@
       </p:grpSpPr>
       <p:sp>
         <p:nvSpPr>
-          <p:cNvPr id="15" name="PlaceHolder 1"/>
+          <p:cNvPr id="13" name="PlaceHolder 1"/>
           <p:cNvSpPr>
             <a:spLocks noGrp="1"/>
           </p:cNvSpPr>
@@ -1132,7 +1132,7 @@
       </p:sp>
       <p:sp>
         <p:nvSpPr>
-          <p:cNvPr id="16" name="PlaceHolder 2"/>
+          <p:cNvPr id="14" name="PlaceHolder 2"/>
           <p:cNvSpPr>
             <a:spLocks noGrp="1"/>
           </p:cNvSpPr>
@@ -1162,7 +1162,7 @@
       </p:sp>
       <p:sp>
         <p:nvSpPr>
-          <p:cNvPr id="17" name="PlaceHolder 3"/>
+          <p:cNvPr id="15" name="PlaceHolder 3"/>
           <p:cNvSpPr>
             <a:spLocks noGrp="1"/>
           </p:cNvSpPr>
@@ -1192,7 +1192,7 @@
       </p:sp>
       <p:sp>
         <p:nvSpPr>
-          <p:cNvPr id="18" name="PlaceHolder 4"/>
+          <p:cNvPr id="16" name="PlaceHolder 4"/>
           <p:cNvSpPr>
             <a:spLocks noGrp="1"/>
           </p:cNvSpPr>
@@ -1244,7 +1244,7 @@
       </p:grpSpPr>
       <p:sp>
         <p:nvSpPr>
-          <p:cNvPr id="19" name="PlaceHolder 1"/>
+          <p:cNvPr id="17" name="PlaceHolder 1"/>
           <p:cNvSpPr>
             <a:spLocks noGrp="1"/>
           </p:cNvSpPr>
@@ -1275,7 +1275,7 @@
       </p:sp>
       <p:sp>
         <p:nvSpPr>
-          <p:cNvPr id="20" name="PlaceHolder 2"/>
+          <p:cNvPr id="18" name="PlaceHolder 2"/>
           <p:cNvSpPr>
             <a:spLocks noGrp="1"/>
           </p:cNvSpPr>
@@ -1305,7 +1305,7 @@
       </p:sp>
       <p:sp>
         <p:nvSpPr>
-          <p:cNvPr id="21" name="PlaceHolder 3"/>
+          <p:cNvPr id="19" name="PlaceHolder 3"/>
           <p:cNvSpPr>
             <a:spLocks noGrp="1"/>
           </p:cNvSpPr>
@@ -1335,7 +1335,7 @@
       </p:sp>
       <p:sp>
         <p:nvSpPr>
-          <p:cNvPr id="22" name="PlaceHolder 4"/>
+          <p:cNvPr id="20" name="PlaceHolder 4"/>
           <p:cNvSpPr>
             <a:spLocks noGrp="1"/>
           </p:cNvSpPr>
@@ -1385,222 +1385,6 @@
           <a:chExt cx="0" cy="0"/>
         </a:xfrm>
       </p:grpSpPr>
-      <p:sp>
-        <p:nvSpPr>
-          <p:cNvPr id="0" name="PlaceHolder 1"/>
-          <p:cNvSpPr>
-            <a:spLocks noGrp="1"/>
-          </p:cNvSpPr>
-          <p:nvPr>
-            <p:ph type="title"/>
-          </p:nvPr>
-        </p:nvSpPr>
-        <p:spPr>
-          <a:xfrm>
-            <a:off x="534240" y="301320"/>
-            <a:ext cx="9622080" cy="1261800"/>
-          </a:xfrm>
-          <a:prstGeom prst="rect">
-            <a:avLst/>
-          </a:prstGeom>
-        </p:spPr>
-        <p:txBody>
-          <a:bodyPr lIns="0" rIns="0" tIns="0" bIns="0" anchor="ctr">
-            <a:noAutofit/>
-          </a:bodyPr>
-          <a:p>
-            <a:pPr algn="ctr"/>
-            <a:r>
-              <a:rPr b="0" lang="de-DE" sz="4400" spc="-1" strike="noStrike">
-                <a:latin typeface="Arial"/>
-              </a:rPr>
-              <a:t>Format des Titeltextes durch Klicken bearbeiten</a:t>
-            </a:r>
-            <a:endParaRPr b="0" lang="de-DE" sz="4400" spc="-1" strike="noStrike">
-              <a:latin typeface="Arial"/>
-            </a:endParaRPr>
-          </a:p>
-        </p:txBody>
-      </p:sp>
-      <p:sp>
-        <p:nvSpPr>
-          <p:cNvPr id="1" name="PlaceHolder 2"/>
-          <p:cNvSpPr>
-            <a:spLocks noGrp="1"/>
-          </p:cNvSpPr>
-          <p:nvPr>
-            <p:ph type="body"/>
-          </p:nvPr>
-        </p:nvSpPr>
-        <p:spPr>
-          <a:xfrm>
-            <a:off x="534240" y="1768680"/>
-            <a:ext cx="9622080" cy="4384080"/>
-          </a:xfrm>
-          <a:prstGeom prst="rect">
-            <a:avLst/>
-          </a:prstGeom>
-        </p:spPr>
-        <p:txBody>
-          <a:bodyPr lIns="0" rIns="0" tIns="0" bIns="0">
-            <a:normAutofit/>
-          </a:bodyPr>
-          <a:p>
-            <a:pPr marL="432000" indent="-324000">
-              <a:spcBef>
-                <a:spcPts val="1417"/>
-              </a:spcBef>
-              <a:buClr>
-                <a:srgbClr val="000000"/>
-              </a:buClr>
-              <a:buSzPct val="45000"/>
-              <a:buFont typeface="Wingdings" charset="2"/>
-              <a:buChar char=""/>
-            </a:pPr>
-            <a:r>
-              <a:rPr b="0" lang="de-DE" sz="3200" spc="-1" strike="noStrike">
-                <a:latin typeface="Arial"/>
-              </a:rPr>
-              <a:t>Format des Gliederungstextes durch Klicken bearbeiten</a:t>
-            </a:r>
-            <a:endParaRPr b="0" lang="de-DE" sz="3200" spc="-1" strike="noStrike">
-              <a:latin typeface="Arial"/>
-            </a:endParaRPr>
-          </a:p>
-          <a:p>
-            <a:pPr lvl="1" marL="864000" indent="-324000">
-              <a:spcBef>
-                <a:spcPts val="1134"/>
-              </a:spcBef>
-              <a:buClr>
-                <a:srgbClr val="000000"/>
-              </a:buClr>
-              <a:buSzPct val="75000"/>
-              <a:buFont typeface="Symbol" charset="2"/>
-              <a:buChar char=""/>
-            </a:pPr>
-            <a:r>
-              <a:rPr b="0" lang="de-DE" sz="2800" spc="-1" strike="noStrike">
-                <a:latin typeface="Arial"/>
-              </a:rPr>
-              <a:t>Zweite Gliederungsebene</a:t>
-            </a:r>
-            <a:endParaRPr b="0" lang="de-DE" sz="2800" spc="-1" strike="noStrike">
-              <a:latin typeface="Arial"/>
-            </a:endParaRPr>
-          </a:p>
-          <a:p>
-            <a:pPr lvl="2" marL="1296000" indent="-288000">
-              <a:spcBef>
-                <a:spcPts val="850"/>
-              </a:spcBef>
-              <a:buClr>
-                <a:srgbClr val="000000"/>
-              </a:buClr>
-              <a:buSzPct val="45000"/>
-              <a:buFont typeface="Wingdings" charset="2"/>
-              <a:buChar char=""/>
-            </a:pPr>
-            <a:r>
-              <a:rPr b="0" lang="de-DE" sz="2400" spc="-1" strike="noStrike">
-                <a:latin typeface="Arial"/>
-              </a:rPr>
-              <a:t>Dritte Gliederungsebene</a:t>
-            </a:r>
-            <a:endParaRPr b="0" lang="de-DE" sz="2400" spc="-1" strike="noStrike">
-              <a:latin typeface="Arial"/>
-            </a:endParaRPr>
-          </a:p>
-          <a:p>
-            <a:pPr lvl="3" marL="1728000" indent="-216000">
-              <a:spcBef>
-                <a:spcPts val="567"/>
-              </a:spcBef>
-              <a:buClr>
-                <a:srgbClr val="000000"/>
-              </a:buClr>
-              <a:buSzPct val="75000"/>
-              <a:buFont typeface="Symbol" charset="2"/>
-              <a:buChar char=""/>
-            </a:pPr>
-            <a:r>
-              <a:rPr b="0" lang="de-DE" sz="2000" spc="-1" strike="noStrike">
-                <a:latin typeface="Arial"/>
-              </a:rPr>
-              <a:t>Vierte Gliederungsebene</a:t>
-            </a:r>
-            <a:endParaRPr b="0" lang="de-DE" sz="2000" spc="-1" strike="noStrike">
-              <a:latin typeface="Arial"/>
-            </a:endParaRPr>
-          </a:p>
-          <a:p>
-            <a:pPr lvl="4" marL="2160000" indent="-216000">
-              <a:spcBef>
-                <a:spcPts val="283"/>
-              </a:spcBef>
-              <a:buClr>
-                <a:srgbClr val="000000"/>
-              </a:buClr>
-              <a:buSzPct val="45000"/>
-              <a:buFont typeface="Wingdings" charset="2"/>
-              <a:buChar char=""/>
-            </a:pPr>
-            <a:r>
-              <a:rPr b="0" lang="de-DE" sz="2000" spc="-1" strike="noStrike">
-                <a:latin typeface="Arial"/>
-              </a:rPr>
-              <a:t>Fünfte Gliederungsebene</a:t>
-            </a:r>
-            <a:endParaRPr b="0" lang="de-DE" sz="2000" spc="-1" strike="noStrike">
-              <a:latin typeface="Arial"/>
-            </a:endParaRPr>
-          </a:p>
-          <a:p>
-            <a:pPr lvl="5" marL="2592000" indent="-216000">
-              <a:spcBef>
-                <a:spcPts val="283"/>
-              </a:spcBef>
-              <a:buClr>
-                <a:srgbClr val="000000"/>
-              </a:buClr>
-              <a:buSzPct val="45000"/>
-              <a:buFont typeface="Wingdings" charset="2"/>
-              <a:buChar char=""/>
-            </a:pPr>
-            <a:r>
-              <a:rPr b="0" lang="de-DE" sz="2000" spc="-1" strike="noStrike">
-                <a:latin typeface="Arial"/>
-              </a:rPr>
-              <a:t>Sechste Gliederungsebene</a:t>
-            </a:r>
-            <a:endParaRPr b="0" lang="de-DE" sz="2000" spc="-1" strike="noStrike">
-              <a:latin typeface="Arial"/>
-            </a:endParaRPr>
-          </a:p>
-          <a:p>
-            <a:pPr lvl="6" marL="3024000" indent="-216000">
-              <a:spcBef>
-                <a:spcPts val="283"/>
-              </a:spcBef>
-              <a:buClr>
-                <a:srgbClr val="000000"/>
-              </a:buClr>
-              <a:buSzPct val="45000"/>
-              <a:buFont typeface="Wingdings" charset="2"/>
-              <a:buChar char=""/>
-            </a:pPr>
-            <a:r>
-              <a:rPr b="0" lang="de-DE" sz="2000" spc="-1" strike="noStrike">
-                <a:latin typeface="Arial"/>
-              </a:rPr>
-              <a:t>Siebte Gliederungsebene</a:t>
-            </a:r>
-            <a:endParaRPr b="0" lang="de-DE" sz="2000" spc="-1" strike="noStrike">
-              <a:latin typeface="Arial"/>
-            </a:endParaRPr>
-          </a:p>
-        </p:txBody>
-      </p:sp>
     </p:spTree>
   </p:cSld>
   <p:clrMap bg1="lt1" bg2="lt2" tx1="dk1" tx2="dk2" accent1="accent1" accent2="accent2" accent3="accent3" accent4="accent4" accent5="accent5" accent6="accent6" hlink="hlink" folHlink="folHlink"/>
@@ -1640,14 +1424,14 @@
       </p:grpSpPr>
       <p:sp>
         <p:nvSpPr>
-          <p:cNvPr id="38" name="CustomShape 1"/>
+          <p:cNvPr id="36" name="CustomShape 1"/>
           <p:cNvSpPr/>
           <p:nvPr/>
         </p:nvSpPr>
         <p:spPr>
           <a:xfrm>
             <a:off x="5812560" y="1411560"/>
-            <a:ext cx="3812400" cy="2300400"/>
+            <a:ext cx="3812040" cy="2300040"/>
           </a:xfrm>
           <a:prstGeom prst="rect">
             <a:avLst/>
@@ -1670,14 +1454,14 @@
       </p:sp>
       <p:sp>
         <p:nvSpPr>
-          <p:cNvPr id="39" name="CustomShape 2"/>
+          <p:cNvPr id="37" name="CustomShape 2"/>
           <p:cNvSpPr/>
           <p:nvPr/>
         </p:nvSpPr>
         <p:spPr>
           <a:xfrm>
             <a:off x="412560" y="2412360"/>
-            <a:ext cx="4028400" cy="2300400"/>
+            <a:ext cx="4028040" cy="2300040"/>
           </a:xfrm>
           <a:prstGeom prst="rect">
             <a:avLst/>
@@ -1700,14 +1484,14 @@
       </p:sp>
       <p:sp>
         <p:nvSpPr>
-          <p:cNvPr id="40" name="CustomShape 3"/>
+          <p:cNvPr id="38" name="CustomShape 3"/>
           <p:cNvSpPr/>
           <p:nvPr/>
         </p:nvSpPr>
         <p:spPr>
           <a:xfrm>
             <a:off x="6702840" y="756360"/>
-            <a:ext cx="1436400" cy="572400"/>
+            <a:ext cx="1436040" cy="572040"/>
           </a:xfrm>
           <a:prstGeom prst="rect">
             <a:avLst/>
@@ -1785,14 +1569,14 @@
       </p:sp>
       <p:sp>
         <p:nvSpPr>
-          <p:cNvPr id="41" name="CustomShape 4"/>
+          <p:cNvPr id="39" name="CustomShape 4"/>
           <p:cNvSpPr/>
           <p:nvPr/>
         </p:nvSpPr>
         <p:spPr>
           <a:xfrm>
             <a:off x="4686840" y="612360"/>
-            <a:ext cx="284400" cy="6515280"/>
+            <a:ext cx="284040" cy="6514920"/>
           </a:xfrm>
           <a:prstGeom prst="rect">
             <a:avLst/>
@@ -1840,14 +1624,14 @@
       </p:sp>
       <p:sp>
         <p:nvSpPr>
-          <p:cNvPr id="42" name="CustomShape 5"/>
+          <p:cNvPr id="40" name="CustomShape 5"/>
           <p:cNvSpPr/>
           <p:nvPr/>
         </p:nvSpPr>
         <p:spPr>
           <a:xfrm>
             <a:off x="9870840" y="612360"/>
-            <a:ext cx="284400" cy="6515280"/>
+            <a:ext cx="284040" cy="6514920"/>
           </a:xfrm>
           <a:prstGeom prst="rect">
             <a:avLst/>
@@ -1895,14 +1679,14 @@
       </p:sp>
       <p:sp>
         <p:nvSpPr>
-          <p:cNvPr id="43" name="CustomShape 6"/>
+          <p:cNvPr id="41" name="CustomShape 6"/>
           <p:cNvSpPr/>
           <p:nvPr/>
         </p:nvSpPr>
         <p:spPr>
           <a:xfrm>
             <a:off x="6702840" y="1548360"/>
-            <a:ext cx="1436400" cy="572400"/>
+            <a:ext cx="1436040" cy="572040"/>
           </a:xfrm>
           <a:prstGeom prst="rect">
             <a:avLst/>
@@ -1980,14 +1764,14 @@
       </p:sp>
       <p:sp>
         <p:nvSpPr>
-          <p:cNvPr id="44" name="CustomShape 7"/>
+          <p:cNvPr id="42" name="CustomShape 7"/>
           <p:cNvSpPr/>
           <p:nvPr/>
         </p:nvSpPr>
         <p:spPr>
           <a:xfrm>
             <a:off x="6702840" y="2268360"/>
-            <a:ext cx="1436400" cy="1292400"/>
+            <a:ext cx="1436040" cy="1292040"/>
           </a:xfrm>
           <a:prstGeom prst="rect">
             <a:avLst/>
@@ -2055,14 +1839,14 @@
       </p:sp>
       <p:sp>
         <p:nvSpPr>
-          <p:cNvPr id="45" name="CustomShape 8"/>
+          <p:cNvPr id="43" name="CustomShape 8"/>
           <p:cNvSpPr/>
           <p:nvPr/>
         </p:nvSpPr>
         <p:spPr>
           <a:xfrm>
             <a:off x="1518840" y="900360"/>
-            <a:ext cx="1436400" cy="428400"/>
+            <a:ext cx="1436040" cy="428040"/>
           </a:xfrm>
           <a:prstGeom prst="rect">
             <a:avLst/>
@@ -2130,14 +1914,14 @@
       </p:sp>
       <p:sp>
         <p:nvSpPr>
-          <p:cNvPr id="46" name="CustomShape 9"/>
+          <p:cNvPr id="44" name="CustomShape 9"/>
           <p:cNvSpPr/>
           <p:nvPr/>
         </p:nvSpPr>
         <p:spPr>
           <a:xfrm>
             <a:off x="1518840" y="1548360"/>
-            <a:ext cx="1436400" cy="428400"/>
+            <a:ext cx="1436040" cy="428040"/>
           </a:xfrm>
           <a:prstGeom prst="rect">
             <a:avLst/>
@@ -2185,14 +1969,14 @@
       </p:sp>
       <p:sp>
         <p:nvSpPr>
-          <p:cNvPr id="47" name="CustomShape 10"/>
+          <p:cNvPr id="45" name="CustomShape 10"/>
           <p:cNvSpPr/>
           <p:nvPr/>
         </p:nvSpPr>
         <p:spPr>
           <a:xfrm>
             <a:off x="1518840" y="2556360"/>
-            <a:ext cx="1436400" cy="428400"/>
+            <a:ext cx="1436040" cy="428040"/>
           </a:xfrm>
           <a:prstGeom prst="rect">
             <a:avLst/>
@@ -2240,14 +2024,14 @@
       </p:sp>
       <p:sp>
         <p:nvSpPr>
-          <p:cNvPr id="48" name="CustomShape 11"/>
+          <p:cNvPr id="46" name="CustomShape 11"/>
           <p:cNvSpPr/>
           <p:nvPr/>
         </p:nvSpPr>
         <p:spPr>
           <a:xfrm>
             <a:off x="1512360" y="3132360"/>
-            <a:ext cx="1436400" cy="860400"/>
+            <a:ext cx="1436040" cy="860040"/>
           </a:xfrm>
           <a:prstGeom prst="rect">
             <a:avLst/>
@@ -2295,14 +2079,14 @@
       </p:sp>
       <p:sp>
         <p:nvSpPr>
-          <p:cNvPr id="49" name="CustomShape 12"/>
+          <p:cNvPr id="47" name="CustomShape 12"/>
           <p:cNvSpPr/>
           <p:nvPr/>
         </p:nvSpPr>
         <p:spPr>
           <a:xfrm>
             <a:off x="1512360" y="4140360"/>
-            <a:ext cx="1436400" cy="428400"/>
+            <a:ext cx="1436040" cy="428040"/>
           </a:xfrm>
           <a:prstGeom prst="rect">
             <a:avLst/>
@@ -2350,14 +2134,14 @@
       </p:sp>
       <p:sp>
         <p:nvSpPr>
-          <p:cNvPr id="50" name="CustomShape 13"/>
+          <p:cNvPr id="48" name="CustomShape 13"/>
           <p:cNvSpPr/>
           <p:nvPr/>
         </p:nvSpPr>
         <p:spPr>
           <a:xfrm>
             <a:off x="1512360" y="4824360"/>
-            <a:ext cx="1436400" cy="428400"/>
+            <a:ext cx="1436040" cy="428040"/>
           </a:xfrm>
           <a:prstGeom prst="rect">
             <a:avLst/>
@@ -2405,14 +2189,14 @@
       </p:sp>
       <p:sp>
         <p:nvSpPr>
-          <p:cNvPr id="51" name="CustomShape 14"/>
+          <p:cNvPr id="49" name="CustomShape 14"/>
           <p:cNvSpPr/>
           <p:nvPr/>
         </p:nvSpPr>
         <p:spPr>
           <a:xfrm>
             <a:off x="1512360" y="5472360"/>
-            <a:ext cx="1436400" cy="428400"/>
+            <a:ext cx="1436040" cy="428040"/>
           </a:xfrm>
           <a:prstGeom prst="rect">
             <a:avLst/>
@@ -2460,14 +2244,14 @@
       </p:sp>
       <p:sp>
         <p:nvSpPr>
-          <p:cNvPr id="52" name="CustomShape 15"/>
+          <p:cNvPr id="50" name="CustomShape 15"/>
           <p:cNvSpPr/>
           <p:nvPr/>
         </p:nvSpPr>
         <p:spPr>
           <a:xfrm>
             <a:off x="1512360" y="6113880"/>
-            <a:ext cx="1436400" cy="434880"/>
+            <a:ext cx="1436040" cy="434520"/>
           </a:xfrm>
           <a:prstGeom prst="rect">
             <a:avLst/>
@@ -2515,7 +2299,7 @@
       </p:sp>
       <p:sp>
         <p:nvSpPr>
-          <p:cNvPr id="53" name="Line 16"/>
+          <p:cNvPr id="51" name="Line 16"/>
           <p:cNvSpPr/>
           <p:nvPr/>
         </p:nvSpPr>
@@ -2569,7 +2353,7 @@
       </p:sp>
       <p:sp>
         <p:nvSpPr>
-          <p:cNvPr id="54" name="Line 17"/>
+          <p:cNvPr id="52" name="Line 17"/>
           <p:cNvSpPr/>
           <p:nvPr/>
         </p:nvSpPr>
@@ -2623,7 +2407,7 @@
       </p:sp>
       <p:sp>
         <p:nvSpPr>
-          <p:cNvPr id="55" name="Line 18"/>
+          <p:cNvPr id="53" name="Line 18"/>
           <p:cNvSpPr/>
           <p:nvPr/>
         </p:nvSpPr>
@@ -2677,7 +2461,7 @@
       </p:sp>
       <p:sp>
         <p:nvSpPr>
-          <p:cNvPr id="56" name="Line 19"/>
+          <p:cNvPr id="54" name="Line 19"/>
           <p:cNvSpPr/>
           <p:nvPr/>
         </p:nvSpPr>
@@ -2731,7 +2515,7 @@
       </p:sp>
       <p:sp>
         <p:nvSpPr>
-          <p:cNvPr id="57" name="Line 20"/>
+          <p:cNvPr id="55" name="Line 20"/>
           <p:cNvSpPr/>
           <p:nvPr/>
         </p:nvSpPr>
@@ -2785,14 +2569,14 @@
       </p:sp>
       <p:sp>
         <p:nvSpPr>
-          <p:cNvPr id="58" name="CustomShape 21"/>
+          <p:cNvPr id="56" name="CustomShape 21"/>
           <p:cNvSpPr/>
           <p:nvPr/>
         </p:nvSpPr>
         <p:spPr>
           <a:xfrm rot="16200000">
-            <a:off x="2886840" y="3351960"/>
-            <a:ext cx="860400" cy="428400"/>
+            <a:off x="2886840" y="3352320"/>
+            <a:ext cx="860040" cy="428040"/>
           </a:xfrm>
           <a:prstGeom prst="rect">
             <a:avLst/>
@@ -2840,14 +2624,14 @@
       </p:sp>
       <p:sp>
         <p:nvSpPr>
-          <p:cNvPr id="59" name="CustomShape 22"/>
+          <p:cNvPr id="57" name="CustomShape 22"/>
           <p:cNvSpPr/>
           <p:nvPr/>
         </p:nvSpPr>
         <p:spPr>
           <a:xfrm rot="16200000">
-            <a:off x="288360" y="3351960"/>
-            <a:ext cx="860400" cy="428400"/>
+            <a:off x="288360" y="3352320"/>
+            <a:ext cx="860040" cy="428040"/>
           </a:xfrm>
           <a:prstGeom prst="rect">
             <a:avLst/>
@@ -2895,7 +2679,7 @@
       </p:sp>
       <p:sp>
         <p:nvSpPr>
-          <p:cNvPr id="60" name="Line 23"/>
+          <p:cNvPr id="58" name="Line 23"/>
           <p:cNvSpPr/>
           <p:nvPr/>
         </p:nvSpPr>
@@ -2949,7 +2733,7 @@
       </p:sp>
       <p:sp>
         <p:nvSpPr>
-          <p:cNvPr id="61" name="Line 24"/>
+          <p:cNvPr id="59" name="Line 24"/>
           <p:cNvSpPr/>
           <p:nvPr/>
         </p:nvSpPr>
@@ -3003,7 +2787,7 @@
       </p:sp>
       <p:sp>
         <p:nvSpPr>
-          <p:cNvPr id="62" name="Line 25"/>
+          <p:cNvPr id="60" name="Line 25"/>
           <p:cNvSpPr/>
           <p:nvPr/>
         </p:nvSpPr>
@@ -3032,7 +2816,7 @@
       </p:sp>
       <p:sp>
         <p:nvSpPr>
-          <p:cNvPr id="63" name="Line 26"/>
+          <p:cNvPr id="61" name="Line 26"/>
           <p:cNvSpPr/>
           <p:nvPr/>
         </p:nvSpPr>
@@ -3061,7 +2845,7 @@
       </p:sp>
       <p:sp>
         <p:nvSpPr>
-          <p:cNvPr id="64" name="Line 27"/>
+          <p:cNvPr id="62" name="Line 27"/>
           <p:cNvSpPr/>
           <p:nvPr/>
         </p:nvSpPr>
@@ -3090,14 +2874,14 @@
       </p:sp>
       <p:sp>
         <p:nvSpPr>
-          <p:cNvPr id="65" name="CustomShape 28"/>
+          <p:cNvPr id="63" name="CustomShape 28"/>
           <p:cNvSpPr/>
           <p:nvPr/>
         </p:nvSpPr>
         <p:spPr>
           <a:xfrm rot="16200000">
-            <a:off x="5690160" y="2631960"/>
-            <a:ext cx="1292400" cy="572400"/>
+            <a:off x="5690160" y="2632320"/>
+            <a:ext cx="1292040" cy="572040"/>
           </a:xfrm>
           <a:prstGeom prst="rect">
             <a:avLst/>
@@ -3165,7 +2949,7 @@
       </p:sp>
       <p:sp>
         <p:nvSpPr>
-          <p:cNvPr id="66" name="Line 29"/>
+          <p:cNvPr id="64" name="Line 29"/>
           <p:cNvSpPr/>
           <p:nvPr/>
         </p:nvSpPr>
@@ -3194,7 +2978,7 @@
       </p:sp>
       <p:sp>
         <p:nvSpPr>
-          <p:cNvPr id="67" name="Line 30"/>
+          <p:cNvPr id="65" name="Line 30"/>
           <p:cNvSpPr/>
           <p:nvPr/>
         </p:nvSpPr>
@@ -3248,7 +3032,7 @@
       </p:sp>
       <p:sp>
         <p:nvSpPr>
-          <p:cNvPr id="68" name="Line 31"/>
+          <p:cNvPr id="66" name="Line 31"/>
           <p:cNvSpPr/>
           <p:nvPr/>
         </p:nvSpPr>
@@ -3302,7 +3086,7 @@
       </p:sp>
       <p:sp>
         <p:nvSpPr>
-          <p:cNvPr id="69" name="Line 32"/>
+          <p:cNvPr id="67" name="Line 32"/>
           <p:cNvSpPr/>
           <p:nvPr/>
         </p:nvSpPr>
@@ -3356,7 +3140,7 @@
       </p:sp>
       <p:sp>
         <p:nvSpPr>
-          <p:cNvPr id="70" name="Line 33"/>
+          <p:cNvPr id="68" name="Line 33"/>
           <p:cNvSpPr/>
           <p:nvPr/>
         </p:nvSpPr>
@@ -3410,7 +3194,7 @@
       </p:sp>
       <p:sp>
         <p:nvSpPr>
-          <p:cNvPr id="71" name="Line 34"/>
+          <p:cNvPr id="69" name="Line 34"/>
           <p:cNvSpPr/>
           <p:nvPr/>
         </p:nvSpPr>
@@ -3464,7 +3248,7 @@
       </p:sp>
       <p:sp>
         <p:nvSpPr>
-          <p:cNvPr id="72" name="Line 35"/>
+          <p:cNvPr id="70" name="Line 35"/>
           <p:cNvSpPr/>
           <p:nvPr/>
         </p:nvSpPr>
@@ -3518,7 +3302,7 @@
       </p:sp>
       <p:sp>
         <p:nvSpPr>
-          <p:cNvPr id="73" name="Line 36"/>
+          <p:cNvPr id="71" name="Line 36"/>
           <p:cNvSpPr/>
           <p:nvPr/>
         </p:nvSpPr>
@@ -3572,7 +3356,7 @@
       </p:sp>
       <p:sp>
         <p:nvSpPr>
-          <p:cNvPr id="74" name="Line 37"/>
+          <p:cNvPr id="72" name="Line 37"/>
           <p:cNvSpPr/>
           <p:nvPr/>
         </p:nvSpPr>
@@ -3626,7 +3410,7 @@
       </p:sp>
       <p:sp>
         <p:nvSpPr>
-          <p:cNvPr id="75" name="Line 38"/>
+          <p:cNvPr id="73" name="Line 38"/>
           <p:cNvSpPr/>
           <p:nvPr/>
         </p:nvSpPr>
@@ -3680,7 +3464,7 @@
       </p:sp>
       <p:sp>
         <p:nvSpPr>
-          <p:cNvPr id="76" name="Line 39"/>
+          <p:cNvPr id="74" name="Line 39"/>
           <p:cNvSpPr/>
           <p:nvPr/>
         </p:nvSpPr>
@@ -3734,7 +3518,7 @@
       </p:sp>
       <p:sp>
         <p:nvSpPr>
-          <p:cNvPr id="77" name="Line 40"/>
+          <p:cNvPr id="75" name="Line 40"/>
           <p:cNvSpPr/>
           <p:nvPr/>
         </p:nvSpPr>
@@ -3788,14 +3572,14 @@
       </p:sp>
       <p:sp>
         <p:nvSpPr>
-          <p:cNvPr id="78" name="CustomShape 41"/>
+          <p:cNvPr id="76" name="CustomShape 41"/>
           <p:cNvSpPr/>
           <p:nvPr/>
         </p:nvSpPr>
         <p:spPr>
           <a:xfrm>
             <a:off x="1518840" y="324360"/>
-            <a:ext cx="1436400" cy="428400"/>
+            <a:ext cx="1436040" cy="428040"/>
           </a:xfrm>
           <a:prstGeom prst="rect">
             <a:avLst/>
@@ -3863,7 +3647,7 @@
       </p:sp>
       <p:sp>
         <p:nvSpPr>
-          <p:cNvPr id="79" name="Line 42"/>
+          <p:cNvPr id="77" name="Line 42"/>
           <p:cNvSpPr/>
           <p:nvPr/>
         </p:nvSpPr>
@@ -3892,7 +3676,7 @@
       </p:sp>
       <p:sp>
         <p:nvSpPr>
-          <p:cNvPr id="80" name="Line 43"/>
+          <p:cNvPr id="78" name="Line 43"/>
           <p:cNvSpPr/>
           <p:nvPr/>
         </p:nvSpPr>
@@ -3920,7 +3704,7 @@
       </p:sp>
       <p:sp>
         <p:nvSpPr>
-          <p:cNvPr id="81" name="Line 44"/>
+          <p:cNvPr id="79" name="Line 44"/>
           <p:cNvSpPr/>
           <p:nvPr/>
         </p:nvSpPr>
@@ -3949,14 +3733,14 @@
       </p:sp>
       <p:sp>
         <p:nvSpPr>
-          <p:cNvPr id="82" name="CustomShape 45"/>
+          <p:cNvPr id="80" name="CustomShape 45"/>
           <p:cNvSpPr/>
           <p:nvPr/>
         </p:nvSpPr>
         <p:spPr>
           <a:xfrm>
             <a:off x="4566960" y="324000"/>
-            <a:ext cx="528120" cy="302760"/>
+            <a:ext cx="527760" cy="302760"/>
           </a:xfrm>
           <a:prstGeom prst="rect">
             <a:avLst/>
@@ -4020,14 +3804,14 @@
       </p:sp>
       <p:sp>
         <p:nvSpPr>
-          <p:cNvPr id="83" name="CustomShape 46"/>
+          <p:cNvPr id="81" name="CustomShape 46"/>
           <p:cNvSpPr/>
           <p:nvPr/>
         </p:nvSpPr>
         <p:spPr>
           <a:xfrm>
             <a:off x="9670680" y="324360"/>
-            <a:ext cx="696600" cy="302760"/>
+            <a:ext cx="696240" cy="302760"/>
           </a:xfrm>
           <a:prstGeom prst="rect">
             <a:avLst/>
@@ -4091,14 +3875,14 @@
       </p:sp>
       <p:sp>
         <p:nvSpPr>
-          <p:cNvPr id="84" name="CustomShape 47"/>
+          <p:cNvPr id="82" name="CustomShape 47"/>
           <p:cNvSpPr/>
           <p:nvPr/>
         </p:nvSpPr>
         <p:spPr>
           <a:xfrm>
             <a:off x="3251520" y="2448360"/>
-            <a:ext cx="1153440" cy="546120"/>
+            <a:ext cx="1153080" cy="546120"/>
           </a:xfrm>
           <a:prstGeom prst="rect">
             <a:avLst/>
@@ -4162,14 +3946,14 @@
       </p:sp>
       <p:sp>
         <p:nvSpPr>
-          <p:cNvPr id="85" name="CustomShape 48"/>
+          <p:cNvPr id="83" name="CustomShape 48"/>
           <p:cNvSpPr/>
           <p:nvPr/>
         </p:nvSpPr>
         <p:spPr>
           <a:xfrm>
             <a:off x="8656560" y="3348000"/>
-            <a:ext cx="932400" cy="317880"/>
+            <a:ext cx="932040" cy="317880"/>
           </a:xfrm>
           <a:prstGeom prst="rect">
             <a:avLst/>
@@ -4213,14 +3997,14 @@
       </p:sp>
       <p:sp>
         <p:nvSpPr>
-          <p:cNvPr id="86" name="CustomShape 49"/>
+          <p:cNvPr id="84" name="CustomShape 49"/>
           <p:cNvSpPr/>
           <p:nvPr/>
         </p:nvSpPr>
         <p:spPr>
           <a:xfrm>
             <a:off x="1464480" y="1116360"/>
-            <a:ext cx="398880" cy="241560"/>
+            <a:ext cx="398520" cy="241560"/>
           </a:xfrm>
           <a:prstGeom prst="rect">
             <a:avLst/>
@@ -4284,14 +4068,14 @@
       </p:sp>
       <p:sp>
         <p:nvSpPr>
-          <p:cNvPr id="87" name="CustomShape 50"/>
+          <p:cNvPr id="85" name="CustomShape 50"/>
           <p:cNvSpPr/>
           <p:nvPr/>
         </p:nvSpPr>
         <p:spPr>
           <a:xfrm>
             <a:off x="6641280" y="885960"/>
-            <a:ext cx="1048320" cy="470160"/>
+            <a:ext cx="1047960" cy="469800"/>
           </a:xfrm>
           <a:prstGeom prst="rect">
             <a:avLst/>
@@ -4415,14 +4199,14 @@
       </p:sp>
       <p:sp>
         <p:nvSpPr>
-          <p:cNvPr id="88" name="CustomShape 51"/>
+          <p:cNvPr id="86" name="CustomShape 51"/>
           <p:cNvSpPr/>
           <p:nvPr/>
         </p:nvSpPr>
         <p:spPr>
           <a:xfrm>
             <a:off x="1450080" y="6408360"/>
-            <a:ext cx="305280" cy="165600"/>
+            <a:ext cx="304920" cy="165600"/>
           </a:xfrm>
           <a:prstGeom prst="rect">
             <a:avLst/>
@@ -4466,14 +4250,14 @@
       </p:sp>
       <p:sp>
         <p:nvSpPr>
-          <p:cNvPr id="89" name="CustomShape 52"/>
+          <p:cNvPr id="87" name="CustomShape 52"/>
           <p:cNvSpPr/>
           <p:nvPr/>
         </p:nvSpPr>
         <p:spPr>
           <a:xfrm>
             <a:off x="1450080" y="5760360"/>
-            <a:ext cx="305280" cy="165600"/>
+            <a:ext cx="304920" cy="165600"/>
           </a:xfrm>
           <a:prstGeom prst="rect">
             <a:avLst/>
@@ -4517,14 +4301,14 @@
       </p:sp>
       <p:sp>
         <p:nvSpPr>
-          <p:cNvPr id="90" name="CustomShape 53"/>
+          <p:cNvPr id="88" name="CustomShape 53"/>
           <p:cNvSpPr/>
           <p:nvPr/>
         </p:nvSpPr>
         <p:spPr>
           <a:xfrm>
             <a:off x="1450080" y="5112360"/>
-            <a:ext cx="305280" cy="165600"/>
+            <a:ext cx="304920" cy="165600"/>
           </a:xfrm>
           <a:prstGeom prst="rect">
             <a:avLst/>
@@ -4568,14 +4352,14 @@
       </p:sp>
       <p:sp>
         <p:nvSpPr>
-          <p:cNvPr id="91" name="CustomShape 54"/>
+          <p:cNvPr id="89" name="CustomShape 54"/>
           <p:cNvSpPr/>
           <p:nvPr/>
         </p:nvSpPr>
         <p:spPr>
           <a:xfrm>
             <a:off x="434880" y="3794760"/>
-            <a:ext cx="399240" cy="241560"/>
+            <a:ext cx="398880" cy="241560"/>
           </a:xfrm>
           <a:prstGeom prst="rect">
             <a:avLst/>
@@ -4639,14 +4423,14 @@
       </p:sp>
       <p:sp>
         <p:nvSpPr>
-          <p:cNvPr id="92" name="CustomShape 55"/>
+          <p:cNvPr id="90" name="CustomShape 55"/>
           <p:cNvSpPr/>
           <p:nvPr/>
         </p:nvSpPr>
         <p:spPr>
           <a:xfrm>
             <a:off x="1457280" y="1836360"/>
-            <a:ext cx="305280" cy="165600"/>
+            <a:ext cx="304920" cy="165600"/>
           </a:xfrm>
           <a:prstGeom prst="rect">
             <a:avLst/>
@@ -4690,14 +4474,14 @@
       </p:sp>
       <p:sp>
         <p:nvSpPr>
-          <p:cNvPr id="93" name="CustomShape 56"/>
+          <p:cNvPr id="91" name="CustomShape 56"/>
           <p:cNvSpPr/>
           <p:nvPr/>
         </p:nvSpPr>
         <p:spPr>
           <a:xfrm>
             <a:off x="1457280" y="2844360"/>
-            <a:ext cx="305280" cy="165600"/>
+            <a:ext cx="304920" cy="165600"/>
           </a:xfrm>
           <a:prstGeom prst="rect">
             <a:avLst/>
@@ -4741,14 +4525,14 @@
       </p:sp>
       <p:sp>
         <p:nvSpPr>
-          <p:cNvPr id="94" name="CustomShape 57"/>
+          <p:cNvPr id="92" name="CustomShape 57"/>
           <p:cNvSpPr/>
           <p:nvPr/>
         </p:nvSpPr>
         <p:spPr>
           <a:xfrm>
             <a:off x="1450080" y="4428360"/>
-            <a:ext cx="305280" cy="165600"/>
+            <a:ext cx="304920" cy="165600"/>
           </a:xfrm>
           <a:prstGeom prst="rect">
             <a:avLst/>
@@ -4792,14 +4576,14 @@
       </p:sp>
       <p:sp>
         <p:nvSpPr>
-          <p:cNvPr id="95" name="CustomShape 58"/>
+          <p:cNvPr id="93" name="CustomShape 58"/>
           <p:cNvSpPr/>
           <p:nvPr/>
         </p:nvSpPr>
         <p:spPr>
           <a:xfrm>
             <a:off x="6641280" y="1757160"/>
-            <a:ext cx="1120320" cy="394200"/>
+            <a:ext cx="1119960" cy="393840"/>
           </a:xfrm>
           <a:prstGeom prst="rect">
             <a:avLst/>
@@ -4903,14 +4687,14 @@
       </p:sp>
       <p:sp>
         <p:nvSpPr>
-          <p:cNvPr id="96" name="CustomShape 59"/>
+          <p:cNvPr id="94" name="CustomShape 59"/>
           <p:cNvSpPr/>
           <p:nvPr/>
         </p:nvSpPr>
         <p:spPr>
           <a:xfrm>
             <a:off x="6655680" y="3402360"/>
-            <a:ext cx="305280" cy="165600"/>
+            <a:ext cx="304920" cy="165600"/>
           </a:xfrm>
           <a:prstGeom prst="rect">
             <a:avLst/>
@@ -4954,14 +4738,14 @@
       </p:sp>
       <p:sp>
         <p:nvSpPr>
-          <p:cNvPr id="97" name="CustomShape 60"/>
+          <p:cNvPr id="95" name="CustomShape 60"/>
           <p:cNvSpPr/>
           <p:nvPr/>
         </p:nvSpPr>
         <p:spPr>
           <a:xfrm>
             <a:off x="1450080" y="3852360"/>
-            <a:ext cx="449280" cy="165600"/>
+            <a:ext cx="448920" cy="165600"/>
           </a:xfrm>
           <a:prstGeom prst="rect">
             <a:avLst/>
@@ -5005,7 +4789,7 @@
       </p:sp>
       <p:sp>
         <p:nvSpPr>
-          <p:cNvPr id="98" name="Line 61"/>
+          <p:cNvPr id="96" name="Line 61"/>
           <p:cNvSpPr/>
           <p:nvPr/>
         </p:nvSpPr>
@@ -5033,14 +4817,14 @@
       </p:sp>
       <p:sp>
         <p:nvSpPr>
-          <p:cNvPr id="99" name="CustomShape 62"/>
+          <p:cNvPr id="97" name="CustomShape 62"/>
           <p:cNvSpPr/>
           <p:nvPr/>
         </p:nvSpPr>
         <p:spPr>
           <a:xfrm>
             <a:off x="6702840" y="5428080"/>
-            <a:ext cx="1436400" cy="572400"/>
+            <a:ext cx="1436040" cy="572040"/>
           </a:xfrm>
           <a:prstGeom prst="rect">
             <a:avLst/>
@@ -5118,7 +4902,7 @@
       </p:sp>
       <p:sp>
         <p:nvSpPr>
-          <p:cNvPr id="100" name="Line 63"/>
+          <p:cNvPr id="98" name="Line 63"/>
           <p:cNvSpPr/>
           <p:nvPr/>
         </p:nvSpPr>
@@ -5172,7 +4956,7 @@
       </p:sp>
       <p:sp>
         <p:nvSpPr>
-          <p:cNvPr id="101" name="Line 64"/>
+          <p:cNvPr id="99" name="Line 64"/>
           <p:cNvSpPr/>
           <p:nvPr/>
         </p:nvSpPr>
@@ -5226,14 +5010,14 @@
       </p:sp>
       <p:sp>
         <p:nvSpPr>
-          <p:cNvPr id="102" name="CustomShape 65"/>
+          <p:cNvPr id="100" name="CustomShape 65"/>
           <p:cNvSpPr/>
           <p:nvPr/>
         </p:nvSpPr>
         <p:spPr>
           <a:xfrm>
             <a:off x="1454760" y="460440"/>
-            <a:ext cx="450360" cy="317520"/>
+            <a:ext cx="450000" cy="317520"/>
           </a:xfrm>
           <a:prstGeom prst="rect">
             <a:avLst/>
@@ -5317,7 +5101,7 @@
       </p:sp>
       <p:sp>
         <p:nvSpPr>
-          <p:cNvPr id="103" name="Line 66"/>
+          <p:cNvPr id="101" name="Line 66"/>
           <p:cNvSpPr/>
           <p:nvPr/>
         </p:nvSpPr>
@@ -5345,14 +5129,14 @@
       </p:sp>
       <p:sp>
         <p:nvSpPr>
-          <p:cNvPr id="104" name="CustomShape 67"/>
+          <p:cNvPr id="102" name="CustomShape 67"/>
           <p:cNvSpPr/>
           <p:nvPr/>
         </p:nvSpPr>
         <p:spPr>
           <a:xfrm>
             <a:off x="2798640" y="887040"/>
-            <a:ext cx="305280" cy="165600"/>
+            <a:ext cx="304920" cy="165600"/>
           </a:xfrm>
           <a:prstGeom prst="rect">
             <a:avLst/>
@@ -5396,14 +5180,14 @@
       </p:sp>
       <p:sp>
         <p:nvSpPr>
-          <p:cNvPr id="105" name="CustomShape 68"/>
+          <p:cNvPr id="103" name="CustomShape 68"/>
           <p:cNvSpPr/>
           <p:nvPr/>
         </p:nvSpPr>
         <p:spPr>
           <a:xfrm>
             <a:off x="2798640" y="1526400"/>
-            <a:ext cx="305280" cy="165600"/>
+            <a:ext cx="304920" cy="165600"/>
           </a:xfrm>
           <a:prstGeom prst="rect">
             <a:avLst/>
@@ -5447,14 +5231,14 @@
       </p:sp>
       <p:sp>
         <p:nvSpPr>
-          <p:cNvPr id="106" name="CustomShape 69"/>
+          <p:cNvPr id="104" name="CustomShape 69"/>
           <p:cNvSpPr/>
           <p:nvPr/>
         </p:nvSpPr>
         <p:spPr>
           <a:xfrm>
             <a:off x="2798640" y="2534400"/>
-            <a:ext cx="305280" cy="165600"/>
+            <a:ext cx="304920" cy="165600"/>
           </a:xfrm>
           <a:prstGeom prst="rect">
             <a:avLst/>
@@ -5498,14 +5282,14 @@
       </p:sp>
       <p:sp>
         <p:nvSpPr>
-          <p:cNvPr id="107" name="CustomShape 70"/>
+          <p:cNvPr id="105" name="CustomShape 70"/>
           <p:cNvSpPr/>
           <p:nvPr/>
         </p:nvSpPr>
         <p:spPr>
           <a:xfrm>
             <a:off x="2798640" y="4118760"/>
-            <a:ext cx="305280" cy="165600"/>
+            <a:ext cx="304920" cy="165600"/>
           </a:xfrm>
           <a:prstGeom prst="rect">
             <a:avLst/>
@@ -5549,14 +5333,14 @@
       </p:sp>
       <p:sp>
         <p:nvSpPr>
-          <p:cNvPr id="108" name="CustomShape 71"/>
+          <p:cNvPr id="106" name="CustomShape 71"/>
           <p:cNvSpPr/>
           <p:nvPr/>
         </p:nvSpPr>
         <p:spPr>
           <a:xfrm>
             <a:off x="2798640" y="4802760"/>
-            <a:ext cx="305280" cy="165600"/>
+            <a:ext cx="304920" cy="165600"/>
           </a:xfrm>
           <a:prstGeom prst="rect">
             <a:avLst/>
@@ -5600,14 +5384,14 @@
       </p:sp>
       <p:sp>
         <p:nvSpPr>
-          <p:cNvPr id="109" name="CustomShape 72"/>
+          <p:cNvPr id="107" name="CustomShape 72"/>
           <p:cNvSpPr/>
           <p:nvPr/>
         </p:nvSpPr>
         <p:spPr>
           <a:xfrm>
             <a:off x="2798640" y="5457240"/>
-            <a:ext cx="305280" cy="165600"/>
+            <a:ext cx="304920" cy="165600"/>
           </a:xfrm>
           <a:prstGeom prst="rect">
             <a:avLst/>
@@ -5651,14 +5435,14 @@
       </p:sp>
       <p:sp>
         <p:nvSpPr>
-          <p:cNvPr id="110" name="CustomShape 73"/>
+          <p:cNvPr id="108" name="CustomShape 73"/>
           <p:cNvSpPr/>
           <p:nvPr/>
         </p:nvSpPr>
         <p:spPr>
           <a:xfrm>
             <a:off x="2798640" y="6093360"/>
-            <a:ext cx="305280" cy="165600"/>
+            <a:ext cx="304920" cy="165600"/>
           </a:xfrm>
           <a:prstGeom prst="rect">
             <a:avLst/>
@@ -5702,14 +5486,14 @@
       </p:sp>
       <p:sp>
         <p:nvSpPr>
-          <p:cNvPr id="111" name="CustomShape 74"/>
+          <p:cNvPr id="109" name="CustomShape 74"/>
           <p:cNvSpPr/>
           <p:nvPr/>
         </p:nvSpPr>
         <p:spPr>
           <a:xfrm>
             <a:off x="3384000" y="3115440"/>
-            <a:ext cx="305280" cy="165600"/>
+            <a:ext cx="304920" cy="165600"/>
           </a:xfrm>
           <a:prstGeom prst="rect">
             <a:avLst/>
@@ -5753,14 +5537,14 @@
       </p:sp>
       <p:sp>
         <p:nvSpPr>
-          <p:cNvPr id="112" name="CustomShape 75"/>
+          <p:cNvPr id="110" name="CustomShape 75"/>
           <p:cNvSpPr/>
           <p:nvPr/>
         </p:nvSpPr>
         <p:spPr>
           <a:xfrm>
             <a:off x="779040" y="3108960"/>
-            <a:ext cx="305280" cy="165600"/>
+            <a:ext cx="304920" cy="165600"/>
           </a:xfrm>
           <a:prstGeom prst="rect">
             <a:avLst/>
@@ -5804,14 +5588,14 @@
       </p:sp>
       <p:sp>
         <p:nvSpPr>
-          <p:cNvPr id="113" name="CustomShape 76"/>
+          <p:cNvPr id="111" name="CustomShape 76"/>
           <p:cNvSpPr/>
           <p:nvPr/>
         </p:nvSpPr>
         <p:spPr>
           <a:xfrm>
             <a:off x="7949160" y="734400"/>
-            <a:ext cx="305280" cy="165600"/>
+            <a:ext cx="304920" cy="165600"/>
           </a:xfrm>
           <a:prstGeom prst="rect">
             <a:avLst/>
@@ -5855,14 +5639,14 @@
       </p:sp>
       <p:sp>
         <p:nvSpPr>
-          <p:cNvPr id="114" name="CustomShape 77"/>
+          <p:cNvPr id="112" name="CustomShape 77"/>
           <p:cNvSpPr/>
           <p:nvPr/>
         </p:nvSpPr>
         <p:spPr>
           <a:xfrm>
             <a:off x="7949160" y="1526400"/>
-            <a:ext cx="305280" cy="165600"/>
+            <a:ext cx="304920" cy="165600"/>
           </a:xfrm>
           <a:prstGeom prst="rect">
             <a:avLst/>
@@ -5906,14 +5690,14 @@
       </p:sp>
       <p:sp>
         <p:nvSpPr>
-          <p:cNvPr id="115" name="CustomShape 78"/>
+          <p:cNvPr id="113" name="CustomShape 78"/>
           <p:cNvSpPr/>
           <p:nvPr/>
         </p:nvSpPr>
         <p:spPr>
           <a:xfrm>
             <a:off x="7955280" y="5400000"/>
-            <a:ext cx="305280" cy="165600"/>
+            <a:ext cx="304920" cy="165600"/>
           </a:xfrm>
           <a:prstGeom prst="rect">
             <a:avLst/>
@@ -5957,14 +5741,14 @@
       </p:sp>
       <p:sp>
         <p:nvSpPr>
-          <p:cNvPr id="116" name="CustomShape 79"/>
+          <p:cNvPr id="114" name="CustomShape 79"/>
           <p:cNvSpPr/>
           <p:nvPr/>
         </p:nvSpPr>
         <p:spPr>
           <a:xfrm>
             <a:off x="6466320" y="2245320"/>
-            <a:ext cx="305280" cy="165600"/>
+            <a:ext cx="304920" cy="165600"/>
           </a:xfrm>
           <a:prstGeom prst="rect">
             <a:avLst/>
@@ -6008,14 +5792,14 @@
       </p:sp>
       <p:sp>
         <p:nvSpPr>
-          <p:cNvPr id="117" name="CustomShape 80"/>
+          <p:cNvPr id="115" name="CustomShape 80"/>
           <p:cNvSpPr/>
           <p:nvPr/>
         </p:nvSpPr>
         <p:spPr>
           <a:xfrm>
             <a:off x="3024000" y="325080"/>
-            <a:ext cx="710640" cy="428400"/>
+            <a:ext cx="710280" cy="428040"/>
           </a:xfrm>
           <a:prstGeom prst="rect">
             <a:avLst/>
@@ -6063,7 +5847,7 @@
       </p:sp>
       <p:sp>
         <p:nvSpPr>
-          <p:cNvPr id="118" name="Line 81"/>
+          <p:cNvPr id="116" name="Line 81"/>
           <p:cNvSpPr/>
           <p:nvPr/>
         </p:nvSpPr>
@@ -6091,14 +5875,14 @@
       </p:sp>
       <p:sp>
         <p:nvSpPr>
-          <p:cNvPr id="119" name="CustomShape 82"/>
+          <p:cNvPr id="117" name="CustomShape 82"/>
           <p:cNvSpPr/>
           <p:nvPr/>
         </p:nvSpPr>
         <p:spPr>
           <a:xfrm>
             <a:off x="2957760" y="612000"/>
-            <a:ext cx="449280" cy="165600"/>
+            <a:ext cx="448920" cy="165600"/>
           </a:xfrm>
           <a:prstGeom prst="rect">
             <a:avLst/>
@@ -6142,7 +5926,7 @@
       </p:sp>
       <p:graphicFrame>
         <p:nvGraphicFramePr>
-          <p:cNvPr id="120" name="Table 83"/>
+          <p:cNvPr id="118" name="Table 83"/>
           <p:cNvGraphicFramePr/>
           <p:nvPr/>
         </p:nvGraphicFramePr>
@@ -6414,14 +6198,14 @@
       </p:graphicFrame>
       <p:sp>
         <p:nvSpPr>
-          <p:cNvPr id="121" name="CustomShape 84"/>
+          <p:cNvPr id="119" name="CustomShape 84"/>
           <p:cNvSpPr/>
           <p:nvPr/>
         </p:nvSpPr>
         <p:spPr>
           <a:xfrm>
             <a:off x="294120" y="6930000"/>
-            <a:ext cx="434880" cy="196200"/>
+            <a:ext cx="434520" cy="196200"/>
           </a:xfrm>
           <a:prstGeom prst="rect">
             <a:avLst/>
@@ -6465,14 +6249,14 @@
       </p:sp>
       <p:sp>
         <p:nvSpPr>
-          <p:cNvPr id="122" name="CustomShape 85"/>
+          <p:cNvPr id="120" name="CustomShape 85"/>
           <p:cNvSpPr/>
           <p:nvPr/>
         </p:nvSpPr>
         <p:spPr>
           <a:xfrm>
             <a:off x="6706080" y="3844080"/>
-            <a:ext cx="1436400" cy="572400"/>
+            <a:ext cx="1436040" cy="572040"/>
           </a:xfrm>
           <a:prstGeom prst="rect">
             <a:avLst/>
@@ -6520,7 +6304,7 @@
       </p:sp>
       <p:sp>
         <p:nvSpPr>
-          <p:cNvPr id="123" name="Line 86"/>
+          <p:cNvPr id="121" name="Line 86"/>
           <p:cNvSpPr/>
           <p:nvPr/>
         </p:nvSpPr>
@@ -6574,7 +6358,7 @@
       </p:sp>
       <p:sp>
         <p:nvSpPr>
-          <p:cNvPr id="124" name="Line 87"/>
+          <p:cNvPr id="122" name="Line 87"/>
           <p:cNvSpPr/>
           <p:nvPr/>
         </p:nvSpPr>
@@ -6628,14 +6412,14 @@
       </p:sp>
       <p:sp>
         <p:nvSpPr>
-          <p:cNvPr id="125" name="CustomShape 88"/>
+          <p:cNvPr id="123" name="CustomShape 88"/>
           <p:cNvSpPr/>
           <p:nvPr/>
         </p:nvSpPr>
         <p:spPr>
           <a:xfrm>
             <a:off x="6658920" y="4197600"/>
-            <a:ext cx="449280" cy="241920"/>
+            <a:ext cx="448920" cy="241560"/>
           </a:xfrm>
           <a:prstGeom prst="rect">
             <a:avLst/>
@@ -6699,14 +6483,14 @@
       </p:sp>
       <p:sp>
         <p:nvSpPr>
-          <p:cNvPr id="126" name="CustomShape 89"/>
+          <p:cNvPr id="124" name="CustomShape 89"/>
           <p:cNvSpPr/>
           <p:nvPr/>
         </p:nvSpPr>
         <p:spPr>
           <a:xfrm>
             <a:off x="7958520" y="3816000"/>
-            <a:ext cx="305280" cy="165600"/>
+            <a:ext cx="304920" cy="165600"/>
           </a:xfrm>
           <a:prstGeom prst="rect">
             <a:avLst/>
@@ -6750,14 +6534,14 @@
       </p:sp>
       <p:sp>
         <p:nvSpPr>
-          <p:cNvPr id="127" name="CustomShape 90"/>
+          <p:cNvPr id="125" name="CustomShape 90"/>
           <p:cNvSpPr/>
           <p:nvPr/>
         </p:nvSpPr>
         <p:spPr>
           <a:xfrm>
             <a:off x="6050160" y="3840840"/>
-            <a:ext cx="572400" cy="262800"/>
+            <a:ext cx="572040" cy="262440"/>
           </a:xfrm>
           <a:prstGeom prst="rect">
             <a:avLst/>
@@ -6805,14 +6589,14 @@
       </p:sp>
       <p:sp>
         <p:nvSpPr>
-          <p:cNvPr id="128" name="CustomShape 91"/>
+          <p:cNvPr id="126" name="CustomShape 91"/>
           <p:cNvSpPr/>
           <p:nvPr/>
         </p:nvSpPr>
         <p:spPr>
           <a:xfrm>
             <a:off x="6050160" y="4154400"/>
-            <a:ext cx="572400" cy="262800"/>
+            <a:ext cx="572040" cy="262440"/>
           </a:xfrm>
           <a:prstGeom prst="rect">
             <a:avLst/>
@@ -6860,7 +6644,7 @@
       </p:sp>
       <p:sp>
         <p:nvSpPr>
-          <p:cNvPr id="129" name="Line 92"/>
+          <p:cNvPr id="127" name="Line 92"/>
           <p:cNvSpPr/>
           <p:nvPr/>
         </p:nvSpPr>
@@ -6888,7 +6672,7 @@
       </p:sp>
       <p:sp>
         <p:nvSpPr>
-          <p:cNvPr id="130" name="Line 93"/>
+          <p:cNvPr id="128" name="Line 93"/>
           <p:cNvSpPr/>
           <p:nvPr/>
         </p:nvSpPr>
@@ -6916,14 +6700,14 @@
       </p:sp>
       <p:sp>
         <p:nvSpPr>
-          <p:cNvPr id="131" name="CustomShape 94"/>
+          <p:cNvPr id="129" name="CustomShape 94"/>
           <p:cNvSpPr/>
           <p:nvPr/>
         </p:nvSpPr>
         <p:spPr>
           <a:xfrm>
             <a:off x="6472800" y="3816000"/>
-            <a:ext cx="305280" cy="165600"/>
+            <a:ext cx="304920" cy="165600"/>
           </a:xfrm>
           <a:prstGeom prst="rect">
             <a:avLst/>
@@ -6967,14 +6751,14 @@
       </p:sp>
       <p:sp>
         <p:nvSpPr>
-          <p:cNvPr id="132" name="CustomShape 95"/>
+          <p:cNvPr id="130" name="CustomShape 95"/>
           <p:cNvSpPr/>
           <p:nvPr/>
         </p:nvSpPr>
         <p:spPr>
           <a:xfrm>
             <a:off x="6472800" y="4125600"/>
-            <a:ext cx="305280" cy="165600"/>
+            <a:ext cx="304920" cy="165600"/>
           </a:xfrm>
           <a:prstGeom prst="rect">
             <a:avLst/>
@@ -7018,14 +6802,14 @@
       </p:sp>
       <p:sp>
         <p:nvSpPr>
-          <p:cNvPr id="133" name="CustomShape 96"/>
+          <p:cNvPr id="131" name="CustomShape 96"/>
           <p:cNvSpPr/>
           <p:nvPr/>
         </p:nvSpPr>
         <p:spPr>
           <a:xfrm>
             <a:off x="6708960" y="4636080"/>
-            <a:ext cx="1436400" cy="572400"/>
+            <a:ext cx="1436040" cy="572040"/>
           </a:xfrm>
           <a:prstGeom prst="rect">
             <a:avLst/>
@@ -7103,7 +6887,7 @@
       </p:sp>
       <p:sp>
         <p:nvSpPr>
-          <p:cNvPr id="134" name="Line 97"/>
+          <p:cNvPr id="132" name="Line 97"/>
           <p:cNvSpPr/>
           <p:nvPr/>
         </p:nvSpPr>
@@ -7157,7 +6941,7 @@
       </p:sp>
       <p:sp>
         <p:nvSpPr>
-          <p:cNvPr id="135" name="Line 98"/>
+          <p:cNvPr id="133" name="Line 98"/>
           <p:cNvSpPr/>
           <p:nvPr/>
         </p:nvSpPr>
@@ -7211,14 +6995,14 @@
       </p:sp>
       <p:sp>
         <p:nvSpPr>
-          <p:cNvPr id="136" name="CustomShape 99"/>
+          <p:cNvPr id="134" name="CustomShape 99"/>
           <p:cNvSpPr/>
           <p:nvPr/>
         </p:nvSpPr>
         <p:spPr>
           <a:xfrm>
             <a:off x="7961400" y="4608000"/>
-            <a:ext cx="305280" cy="165600"/>
+            <a:ext cx="304920" cy="165600"/>
           </a:xfrm>
           <a:prstGeom prst="rect">
             <a:avLst/>
@@ -7262,14 +7046,14 @@
       </p:sp>
       <p:sp>
         <p:nvSpPr>
-          <p:cNvPr id="137" name="CustomShape 100"/>
+          <p:cNvPr id="135" name="CustomShape 100"/>
           <p:cNvSpPr/>
           <p:nvPr/>
         </p:nvSpPr>
         <p:spPr>
           <a:xfrm>
             <a:off x="6708960" y="3844080"/>
-            <a:ext cx="1436400" cy="572400"/>
+            <a:ext cx="1436040" cy="572040"/>
           </a:xfrm>
           <a:prstGeom prst="rect">
             <a:avLst/>
@@ -7317,14 +7101,14 @@
       </p:sp>
       <p:sp>
         <p:nvSpPr>
-          <p:cNvPr id="138" name="CustomShape 101"/>
-          <p:cNvSpPr/>
-          <p:nvPr/>
-        </p:nvSpPr>
-        <p:spPr>
-          <a:xfrm>
-            <a:off x="6647400" y="4053600"/>
-            <a:ext cx="825840" cy="393840"/>
+          <p:cNvPr id="136" name="CustomShape 101"/>
+          <p:cNvSpPr/>
+          <p:nvPr/>
+        </p:nvSpPr>
+        <p:spPr>
+          <a:xfrm>
+            <a:off x="6647400" y="4125600"/>
+            <a:ext cx="825480" cy="318240"/>
           </a:xfrm>
           <a:prstGeom prst="rect">
             <a:avLst/>
@@ -7378,7 +7162,7 @@
                 <a:latin typeface="Arial"/>
                 <a:ea typeface="DejaVu Sans"/>
               </a:rPr>
-              <a:t>RST</a:t>
+              <a:t>DATA_TO_ADDR_HI</a:t>
             </a:r>
             <a:endParaRPr b="0" lang="de-DE" sz="500" spc="-1" strike="noStrike">
               <a:latin typeface="Arial"/>
@@ -7398,26 +7182,6 @@
                 <a:latin typeface="Arial"/>
                 <a:ea typeface="DejaVu Sans"/>
               </a:rPr>
-              <a:t>DATA_TO_ADDR_HI</a:t>
-            </a:r>
-            <a:endParaRPr b="0" lang="de-DE" sz="500" spc="-1" strike="noStrike">
-              <a:latin typeface="Arial"/>
-            </a:endParaRPr>
-          </a:p>
-          <a:p>
-            <a:pPr>
-              <a:lnSpc>
-                <a:spcPct val="100000"/>
-              </a:lnSpc>
-            </a:pPr>
-            <a:r>
-              <a:rPr b="0" lang="de-DE" sz="500" spc="-1" strike="noStrike">
-                <a:solidFill>
-                  <a:srgbClr val="000000"/>
-                </a:solidFill>
-                <a:latin typeface="Arial"/>
-                <a:ea typeface="DejaVu Sans"/>
-              </a:rPr>
               <a:t>DATA_TO_ADDR_LO</a:t>
             </a:r>
             <a:endParaRPr b="0" lang="de-DE" sz="500" spc="-1" strike="noStrike">
@@ -7428,14 +7192,14 @@
       </p:sp>
       <p:sp>
         <p:nvSpPr>
-          <p:cNvPr id="139" name="CustomShape 102"/>
+          <p:cNvPr id="137" name="CustomShape 102"/>
           <p:cNvSpPr/>
           <p:nvPr/>
         </p:nvSpPr>
         <p:spPr>
           <a:xfrm>
             <a:off x="7961400" y="3816000"/>
-            <a:ext cx="305280" cy="165600"/>
+            <a:ext cx="304920" cy="165600"/>
           </a:xfrm>
           <a:prstGeom prst="rect">
             <a:avLst/>
@@ -7479,14 +7243,14 @@
       </p:sp>
       <p:sp>
         <p:nvSpPr>
-          <p:cNvPr id="140" name="CustomShape 103"/>
+          <p:cNvPr id="138" name="CustomShape 103"/>
           <p:cNvSpPr/>
           <p:nvPr/>
         </p:nvSpPr>
         <p:spPr>
           <a:xfrm>
             <a:off x="6053040" y="3840840"/>
-            <a:ext cx="572400" cy="262800"/>
+            <a:ext cx="572040" cy="262440"/>
           </a:xfrm>
           <a:prstGeom prst="rect">
             <a:avLst/>
@@ -7534,14 +7298,14 @@
       </p:sp>
       <p:sp>
         <p:nvSpPr>
-          <p:cNvPr id="141" name="CustomShape 104"/>
+          <p:cNvPr id="139" name="CustomShape 104"/>
           <p:cNvSpPr/>
           <p:nvPr/>
         </p:nvSpPr>
         <p:spPr>
           <a:xfrm>
             <a:off x="6053040" y="4154400"/>
-            <a:ext cx="572400" cy="262800"/>
+            <a:ext cx="572040" cy="262440"/>
           </a:xfrm>
           <a:prstGeom prst="rect">
             <a:avLst/>
@@ -7589,7 +7353,7 @@
       </p:sp>
       <p:sp>
         <p:nvSpPr>
-          <p:cNvPr id="142" name="Line 105"/>
+          <p:cNvPr id="140" name="Line 105"/>
           <p:cNvSpPr/>
           <p:nvPr/>
         </p:nvSpPr>
@@ -7617,7 +7381,7 @@
       </p:sp>
       <p:sp>
         <p:nvSpPr>
-          <p:cNvPr id="143" name="Line 106"/>
+          <p:cNvPr id="141" name="Line 106"/>
           <p:cNvSpPr/>
           <p:nvPr/>
         </p:nvSpPr>
@@ -7645,14 +7409,14 @@
       </p:sp>
       <p:sp>
         <p:nvSpPr>
-          <p:cNvPr id="144" name="CustomShape 107"/>
+          <p:cNvPr id="142" name="CustomShape 107"/>
           <p:cNvSpPr/>
           <p:nvPr/>
         </p:nvSpPr>
         <p:spPr>
           <a:xfrm>
             <a:off x="6475680" y="3816000"/>
-            <a:ext cx="305280" cy="165600"/>
+            <a:ext cx="304920" cy="165600"/>
           </a:xfrm>
           <a:prstGeom prst="rect">
             <a:avLst/>
@@ -7696,14 +7460,14 @@
       </p:sp>
       <p:sp>
         <p:nvSpPr>
-          <p:cNvPr id="145" name="CustomShape 108"/>
+          <p:cNvPr id="143" name="CustomShape 108"/>
           <p:cNvSpPr/>
           <p:nvPr/>
         </p:nvSpPr>
         <p:spPr>
           <a:xfrm>
             <a:off x="6475680" y="4125600"/>
-            <a:ext cx="305280" cy="165600"/>
+            <a:ext cx="304920" cy="165600"/>
           </a:xfrm>
           <a:prstGeom prst="rect">
             <a:avLst/>
@@ -7747,7 +7511,7 @@
       </p:sp>
       <p:sp>
         <p:nvSpPr>
-          <p:cNvPr id="146" name="Line 109"/>
+          <p:cNvPr id="144" name="Line 109"/>
           <p:cNvSpPr/>
           <p:nvPr/>
         </p:nvSpPr>
@@ -7801,7 +7565,7 @@
       </p:sp>
       <p:sp>
         <p:nvSpPr>
-          <p:cNvPr id="147" name="Line 110"/>
+          <p:cNvPr id="145" name="Line 110"/>
           <p:cNvSpPr/>
           <p:nvPr/>
         </p:nvSpPr>
@@ -7855,14 +7619,14 @@
       </p:sp>
       <p:sp>
         <p:nvSpPr>
-          <p:cNvPr id="148" name="CustomShape 111"/>
-          <p:cNvSpPr/>
-          <p:nvPr/>
-        </p:nvSpPr>
-        <p:spPr>
-          <a:xfrm>
-            <a:off x="6647400" y="4845600"/>
-            <a:ext cx="825840" cy="393840"/>
+          <p:cNvPr id="146" name="CustomShape 111"/>
+          <p:cNvSpPr/>
+          <p:nvPr/>
+        </p:nvSpPr>
+        <p:spPr>
+          <a:xfrm>
+            <a:off x="6647400" y="4917600"/>
+            <a:ext cx="825480" cy="318240"/>
           </a:xfrm>
           <a:prstGeom prst="rect">
             <a:avLst/>
@@ -7916,7 +7680,7 @@
                 <a:latin typeface="Arial"/>
                 <a:ea typeface="DejaVu Sans"/>
               </a:rPr>
-              <a:t>RST</a:t>
+              <a:t>DATA_TO_ADDR_HI</a:t>
             </a:r>
             <a:endParaRPr b="0" lang="de-DE" sz="500" spc="-1" strike="noStrike">
               <a:latin typeface="Arial"/>
@@ -7936,26 +7700,6 @@
                 <a:latin typeface="Arial"/>
                 <a:ea typeface="DejaVu Sans"/>
               </a:rPr>
-              <a:t>DATA_TO_ADDR_HI</a:t>
-            </a:r>
-            <a:endParaRPr b="0" lang="de-DE" sz="500" spc="-1" strike="noStrike">
-              <a:latin typeface="Arial"/>
-            </a:endParaRPr>
-          </a:p>
-          <a:p>
-            <a:pPr>
-              <a:lnSpc>
-                <a:spcPct val="100000"/>
-              </a:lnSpc>
-            </a:pPr>
-            <a:r>
-              <a:rPr b="0" lang="de-DE" sz="500" spc="-1" strike="noStrike">
-                <a:solidFill>
-                  <a:srgbClr val="000000"/>
-                </a:solidFill>
-                <a:latin typeface="Arial"/>
-                <a:ea typeface="DejaVu Sans"/>
-              </a:rPr>
               <a:t>DATA_TO_ADDR_LO</a:t>
             </a:r>
             <a:endParaRPr b="0" lang="de-DE" sz="500" spc="-1" strike="noStrike">
@@ -7966,14 +7710,14 @@
       </p:sp>
       <p:sp>
         <p:nvSpPr>
-          <p:cNvPr id="149" name="CustomShape 112"/>
+          <p:cNvPr id="147" name="CustomShape 112"/>
           <p:cNvSpPr/>
           <p:nvPr/>
         </p:nvSpPr>
         <p:spPr>
           <a:xfrm>
             <a:off x="6640200" y="5479200"/>
-            <a:ext cx="825840" cy="545760"/>
+            <a:ext cx="825480" cy="545400"/>
           </a:xfrm>
           <a:prstGeom prst="rect">
             <a:avLst/>
@@ -8117,7 +7861,7 @@
       </p:sp>
       <p:sp>
         <p:nvSpPr>
-          <p:cNvPr id="150" name="Line 113"/>
+          <p:cNvPr id="148" name="Line 113"/>
           <p:cNvSpPr/>
           <p:nvPr/>
         </p:nvSpPr>
@@ -8171,7 +7915,7 @@
       </p:sp>
       <p:sp>
         <p:nvSpPr>
-          <p:cNvPr id="151" name="Line 114"/>
+          <p:cNvPr id="149" name="Line 114"/>
           <p:cNvSpPr/>
           <p:nvPr/>
         </p:nvSpPr>

</xml_diff>

<commit_message>
h and l to data
</commit_message>
<xml_diff>
--- a/doc/cpu.pptx
+++ b/doc/cpu.pptx
@@ -1431,7 +1431,7 @@
         <p:spPr>
           <a:xfrm>
             <a:off x="5812560" y="1411560"/>
-            <a:ext cx="3812040" cy="2300040"/>
+            <a:ext cx="3811680" cy="2299680"/>
           </a:xfrm>
           <a:prstGeom prst="rect">
             <a:avLst/>
@@ -1461,7 +1461,7 @@
         <p:spPr>
           <a:xfrm>
             <a:off x="412560" y="2412360"/>
-            <a:ext cx="4028040" cy="2300040"/>
+            <a:ext cx="4027680" cy="2299680"/>
           </a:xfrm>
           <a:prstGeom prst="rect">
             <a:avLst/>
@@ -1491,7 +1491,7 @@
         <p:spPr>
           <a:xfrm>
             <a:off x="6702840" y="756360"/>
-            <a:ext cx="1436040" cy="572040"/>
+            <a:ext cx="1435680" cy="571680"/>
           </a:xfrm>
           <a:prstGeom prst="rect">
             <a:avLst/>
@@ -1576,7 +1576,7 @@
         <p:spPr>
           <a:xfrm>
             <a:off x="4686840" y="612360"/>
-            <a:ext cx="284040" cy="6514920"/>
+            <a:ext cx="283680" cy="6514560"/>
           </a:xfrm>
           <a:prstGeom prst="rect">
             <a:avLst/>
@@ -1631,7 +1631,7 @@
         <p:spPr>
           <a:xfrm>
             <a:off x="9870840" y="612360"/>
-            <a:ext cx="284040" cy="6514920"/>
+            <a:ext cx="283680" cy="6514560"/>
           </a:xfrm>
           <a:prstGeom prst="rect">
             <a:avLst/>
@@ -1686,7 +1686,7 @@
         <p:spPr>
           <a:xfrm>
             <a:off x="6702840" y="1548360"/>
-            <a:ext cx="1436040" cy="572040"/>
+            <a:ext cx="1435680" cy="571680"/>
           </a:xfrm>
           <a:prstGeom prst="rect">
             <a:avLst/>
@@ -1771,7 +1771,7 @@
         <p:spPr>
           <a:xfrm>
             <a:off x="6702840" y="2268360"/>
-            <a:ext cx="1436040" cy="1292040"/>
+            <a:ext cx="1435680" cy="1291680"/>
           </a:xfrm>
           <a:prstGeom prst="rect">
             <a:avLst/>
@@ -1846,7 +1846,7 @@
         <p:spPr>
           <a:xfrm>
             <a:off x="1518840" y="900360"/>
-            <a:ext cx="1436040" cy="428040"/>
+            <a:ext cx="1435680" cy="427680"/>
           </a:xfrm>
           <a:prstGeom prst="rect">
             <a:avLst/>
@@ -1921,7 +1921,7 @@
         <p:spPr>
           <a:xfrm>
             <a:off x="1518840" y="1548360"/>
-            <a:ext cx="1436040" cy="428040"/>
+            <a:ext cx="1435680" cy="427680"/>
           </a:xfrm>
           <a:prstGeom prst="rect">
             <a:avLst/>
@@ -1976,7 +1976,7 @@
         <p:spPr>
           <a:xfrm>
             <a:off x="1518840" y="2556360"/>
-            <a:ext cx="1436040" cy="428040"/>
+            <a:ext cx="1435680" cy="427680"/>
           </a:xfrm>
           <a:prstGeom prst="rect">
             <a:avLst/>
@@ -2031,7 +2031,7 @@
         <p:spPr>
           <a:xfrm>
             <a:off x="1512360" y="3132360"/>
-            <a:ext cx="1436040" cy="860040"/>
+            <a:ext cx="1435680" cy="859680"/>
           </a:xfrm>
           <a:prstGeom prst="rect">
             <a:avLst/>
@@ -2086,7 +2086,7 @@
         <p:spPr>
           <a:xfrm>
             <a:off x="1512360" y="4140360"/>
-            <a:ext cx="1436040" cy="428040"/>
+            <a:ext cx="1435680" cy="427680"/>
           </a:xfrm>
           <a:prstGeom prst="rect">
             <a:avLst/>
@@ -2141,7 +2141,7 @@
         <p:spPr>
           <a:xfrm>
             <a:off x="1512360" y="4824360"/>
-            <a:ext cx="1436040" cy="428040"/>
+            <a:ext cx="1435680" cy="427680"/>
           </a:xfrm>
           <a:prstGeom prst="rect">
             <a:avLst/>
@@ -2196,7 +2196,7 @@
         <p:spPr>
           <a:xfrm>
             <a:off x="1512360" y="5472360"/>
-            <a:ext cx="1436040" cy="428040"/>
+            <a:ext cx="1435680" cy="427680"/>
           </a:xfrm>
           <a:prstGeom prst="rect">
             <a:avLst/>
@@ -2251,7 +2251,7 @@
         <p:spPr>
           <a:xfrm>
             <a:off x="1512360" y="6113880"/>
-            <a:ext cx="1436040" cy="434520"/>
+            <a:ext cx="1435680" cy="434160"/>
           </a:xfrm>
           <a:prstGeom prst="rect">
             <a:avLst/>
@@ -2575,8 +2575,8 @@
         </p:nvSpPr>
         <p:spPr>
           <a:xfrm rot="16200000">
-            <a:off x="2886840" y="3352320"/>
-            <a:ext cx="860040" cy="428040"/>
+            <a:off x="2886840" y="3352680"/>
+            <a:ext cx="859680" cy="427680"/>
           </a:xfrm>
           <a:prstGeom prst="rect">
             <a:avLst/>
@@ -2630,8 +2630,8 @@
         </p:nvSpPr>
         <p:spPr>
           <a:xfrm rot="16200000">
-            <a:off x="288360" y="3352320"/>
-            <a:ext cx="860040" cy="428040"/>
+            <a:off x="288360" y="3352680"/>
+            <a:ext cx="859680" cy="427680"/>
           </a:xfrm>
           <a:prstGeom prst="rect">
             <a:avLst/>
@@ -2880,8 +2880,8 @@
         </p:nvSpPr>
         <p:spPr>
           <a:xfrm rot="16200000">
-            <a:off x="5690160" y="2632320"/>
-            <a:ext cx="1292040" cy="572040"/>
+            <a:off x="5690160" y="2632680"/>
+            <a:ext cx="1291680" cy="571680"/>
           </a:xfrm>
           <a:prstGeom prst="rect">
             <a:avLst/>
@@ -3579,7 +3579,7 @@
         <p:spPr>
           <a:xfrm>
             <a:off x="1518840" y="324360"/>
-            <a:ext cx="1436040" cy="428040"/>
+            <a:ext cx="1435680" cy="427680"/>
           </a:xfrm>
           <a:prstGeom prst="rect">
             <a:avLst/>
@@ -3740,7 +3740,7 @@
         <p:spPr>
           <a:xfrm>
             <a:off x="4566960" y="324000"/>
-            <a:ext cx="527760" cy="302760"/>
+            <a:ext cx="527400" cy="302760"/>
           </a:xfrm>
           <a:prstGeom prst="rect">
             <a:avLst/>
@@ -3811,7 +3811,7 @@
         <p:spPr>
           <a:xfrm>
             <a:off x="9670680" y="324360"/>
-            <a:ext cx="696240" cy="302760"/>
+            <a:ext cx="695880" cy="302760"/>
           </a:xfrm>
           <a:prstGeom prst="rect">
             <a:avLst/>
@@ -3882,7 +3882,7 @@
         <p:spPr>
           <a:xfrm>
             <a:off x="3251520" y="2448360"/>
-            <a:ext cx="1153080" cy="546120"/>
+            <a:ext cx="1152720" cy="546120"/>
           </a:xfrm>
           <a:prstGeom prst="rect">
             <a:avLst/>
@@ -3953,7 +3953,7 @@
         <p:spPr>
           <a:xfrm>
             <a:off x="8656560" y="3348000"/>
-            <a:ext cx="932040" cy="317880"/>
+            <a:ext cx="931680" cy="317880"/>
           </a:xfrm>
           <a:prstGeom prst="rect">
             <a:avLst/>
@@ -4004,7 +4004,7 @@
         <p:spPr>
           <a:xfrm>
             <a:off x="1464480" y="1116360"/>
-            <a:ext cx="398520" cy="241560"/>
+            <a:ext cx="398160" cy="241560"/>
           </a:xfrm>
           <a:prstGeom prst="rect">
             <a:avLst/>
@@ -4075,7 +4075,7 @@
         <p:spPr>
           <a:xfrm>
             <a:off x="6641280" y="885960"/>
-            <a:ext cx="1047960" cy="469800"/>
+            <a:ext cx="1047600" cy="469440"/>
           </a:xfrm>
           <a:prstGeom prst="rect">
             <a:avLst/>
@@ -4206,7 +4206,7 @@
         <p:spPr>
           <a:xfrm>
             <a:off x="1450080" y="6408360"/>
-            <a:ext cx="304920" cy="165600"/>
+            <a:ext cx="304560" cy="165600"/>
           </a:xfrm>
           <a:prstGeom prst="rect">
             <a:avLst/>
@@ -4257,7 +4257,7 @@
         <p:spPr>
           <a:xfrm>
             <a:off x="1450080" y="5760360"/>
-            <a:ext cx="304920" cy="165600"/>
+            <a:ext cx="304560" cy="165600"/>
           </a:xfrm>
           <a:prstGeom prst="rect">
             <a:avLst/>
@@ -4308,7 +4308,7 @@
         <p:spPr>
           <a:xfrm>
             <a:off x="1450080" y="5112360"/>
-            <a:ext cx="304920" cy="165600"/>
+            <a:ext cx="304560" cy="165600"/>
           </a:xfrm>
           <a:prstGeom prst="rect">
             <a:avLst/>
@@ -4359,7 +4359,7 @@
         <p:spPr>
           <a:xfrm>
             <a:off x="434880" y="3794760"/>
-            <a:ext cx="398880" cy="241560"/>
+            <a:ext cx="398520" cy="241560"/>
           </a:xfrm>
           <a:prstGeom prst="rect">
             <a:avLst/>
@@ -4430,7 +4430,7 @@
         <p:spPr>
           <a:xfrm>
             <a:off x="1457280" y="1836360"/>
-            <a:ext cx="304920" cy="165600"/>
+            <a:ext cx="304560" cy="165600"/>
           </a:xfrm>
           <a:prstGeom prst="rect">
             <a:avLst/>
@@ -4481,7 +4481,7 @@
         <p:spPr>
           <a:xfrm>
             <a:off x="1457280" y="2844360"/>
-            <a:ext cx="304920" cy="165600"/>
+            <a:ext cx="304560" cy="165600"/>
           </a:xfrm>
           <a:prstGeom prst="rect">
             <a:avLst/>
@@ -4532,7 +4532,7 @@
         <p:spPr>
           <a:xfrm>
             <a:off x="1450080" y="4428360"/>
-            <a:ext cx="304920" cy="165600"/>
+            <a:ext cx="304560" cy="165600"/>
           </a:xfrm>
           <a:prstGeom prst="rect">
             <a:avLst/>
@@ -4583,7 +4583,7 @@
         <p:spPr>
           <a:xfrm>
             <a:off x="6641280" y="1757160"/>
-            <a:ext cx="1119960" cy="393840"/>
+            <a:ext cx="1119600" cy="393480"/>
           </a:xfrm>
           <a:prstGeom prst="rect">
             <a:avLst/>
@@ -4694,7 +4694,7 @@
         <p:spPr>
           <a:xfrm>
             <a:off x="6655680" y="3402360"/>
-            <a:ext cx="304920" cy="165600"/>
+            <a:ext cx="304560" cy="165600"/>
           </a:xfrm>
           <a:prstGeom prst="rect">
             <a:avLst/>
@@ -4745,7 +4745,7 @@
         <p:spPr>
           <a:xfrm>
             <a:off x="1450080" y="3852360"/>
-            <a:ext cx="448920" cy="165600"/>
+            <a:ext cx="448560" cy="165600"/>
           </a:xfrm>
           <a:prstGeom prst="rect">
             <a:avLst/>
@@ -4824,7 +4824,7 @@
         <p:spPr>
           <a:xfrm>
             <a:off x="6702840" y="5428080"/>
-            <a:ext cx="1436040" cy="572040"/>
+            <a:ext cx="1435680" cy="571680"/>
           </a:xfrm>
           <a:prstGeom prst="rect">
             <a:avLst/>
@@ -5017,7 +5017,7 @@
         <p:spPr>
           <a:xfrm>
             <a:off x="1454760" y="460440"/>
-            <a:ext cx="450000" cy="317520"/>
+            <a:ext cx="449640" cy="317520"/>
           </a:xfrm>
           <a:prstGeom prst="rect">
             <a:avLst/>
@@ -5136,7 +5136,7 @@
         <p:spPr>
           <a:xfrm>
             <a:off x="2798640" y="887040"/>
-            <a:ext cx="304920" cy="165600"/>
+            <a:ext cx="304560" cy="165600"/>
           </a:xfrm>
           <a:prstGeom prst="rect">
             <a:avLst/>
@@ -5187,7 +5187,7 @@
         <p:spPr>
           <a:xfrm>
             <a:off x="2798640" y="1526400"/>
-            <a:ext cx="304920" cy="165600"/>
+            <a:ext cx="304560" cy="165600"/>
           </a:xfrm>
           <a:prstGeom prst="rect">
             <a:avLst/>
@@ -5238,7 +5238,7 @@
         <p:spPr>
           <a:xfrm>
             <a:off x="2798640" y="2534400"/>
-            <a:ext cx="304920" cy="165600"/>
+            <a:ext cx="304560" cy="165600"/>
           </a:xfrm>
           <a:prstGeom prst="rect">
             <a:avLst/>
@@ -5289,7 +5289,7 @@
         <p:spPr>
           <a:xfrm>
             <a:off x="2798640" y="4118760"/>
-            <a:ext cx="304920" cy="165600"/>
+            <a:ext cx="304560" cy="165600"/>
           </a:xfrm>
           <a:prstGeom prst="rect">
             <a:avLst/>
@@ -5340,7 +5340,7 @@
         <p:spPr>
           <a:xfrm>
             <a:off x="2798640" y="4802760"/>
-            <a:ext cx="304920" cy="165600"/>
+            <a:ext cx="304560" cy="165600"/>
           </a:xfrm>
           <a:prstGeom prst="rect">
             <a:avLst/>
@@ -5391,7 +5391,7 @@
         <p:spPr>
           <a:xfrm>
             <a:off x="2798640" y="5457240"/>
-            <a:ext cx="304920" cy="165600"/>
+            <a:ext cx="304560" cy="165600"/>
           </a:xfrm>
           <a:prstGeom prst="rect">
             <a:avLst/>
@@ -5442,7 +5442,7 @@
         <p:spPr>
           <a:xfrm>
             <a:off x="2798640" y="6093360"/>
-            <a:ext cx="304920" cy="165600"/>
+            <a:ext cx="304560" cy="165600"/>
           </a:xfrm>
           <a:prstGeom prst="rect">
             <a:avLst/>
@@ -5493,7 +5493,7 @@
         <p:spPr>
           <a:xfrm>
             <a:off x="3384000" y="3115440"/>
-            <a:ext cx="304920" cy="165600"/>
+            <a:ext cx="304560" cy="165600"/>
           </a:xfrm>
           <a:prstGeom prst="rect">
             <a:avLst/>
@@ -5544,7 +5544,7 @@
         <p:spPr>
           <a:xfrm>
             <a:off x="779040" y="3108960"/>
-            <a:ext cx="304920" cy="165600"/>
+            <a:ext cx="304560" cy="165600"/>
           </a:xfrm>
           <a:prstGeom prst="rect">
             <a:avLst/>
@@ -5595,7 +5595,7 @@
         <p:spPr>
           <a:xfrm>
             <a:off x="7949160" y="734400"/>
-            <a:ext cx="304920" cy="165600"/>
+            <a:ext cx="304560" cy="165600"/>
           </a:xfrm>
           <a:prstGeom prst="rect">
             <a:avLst/>
@@ -5646,7 +5646,7 @@
         <p:spPr>
           <a:xfrm>
             <a:off x="7949160" y="1526400"/>
-            <a:ext cx="304920" cy="165600"/>
+            <a:ext cx="304560" cy="165600"/>
           </a:xfrm>
           <a:prstGeom prst="rect">
             <a:avLst/>
@@ -5697,7 +5697,7 @@
         <p:spPr>
           <a:xfrm>
             <a:off x="7955280" y="5400000"/>
-            <a:ext cx="304920" cy="165600"/>
+            <a:ext cx="304560" cy="165600"/>
           </a:xfrm>
           <a:prstGeom prst="rect">
             <a:avLst/>
@@ -5748,7 +5748,7 @@
         <p:spPr>
           <a:xfrm>
             <a:off x="6466320" y="2245320"/>
-            <a:ext cx="304920" cy="165600"/>
+            <a:ext cx="304560" cy="165600"/>
           </a:xfrm>
           <a:prstGeom prst="rect">
             <a:avLst/>
@@ -5799,7 +5799,7 @@
         <p:spPr>
           <a:xfrm>
             <a:off x="3024000" y="325080"/>
-            <a:ext cx="710280" cy="428040"/>
+            <a:ext cx="709920" cy="427680"/>
           </a:xfrm>
           <a:prstGeom prst="rect">
             <a:avLst/>
@@ -5882,7 +5882,7 @@
         <p:spPr>
           <a:xfrm>
             <a:off x="2957760" y="612000"/>
-            <a:ext cx="448920" cy="165600"/>
+            <a:ext cx="448560" cy="165600"/>
           </a:xfrm>
           <a:prstGeom prst="rect">
             <a:avLst/>
@@ -6205,7 +6205,7 @@
         <p:spPr>
           <a:xfrm>
             <a:off x="294120" y="6930000"/>
-            <a:ext cx="434520" cy="196200"/>
+            <a:ext cx="434160" cy="196200"/>
           </a:xfrm>
           <a:prstGeom prst="rect">
             <a:avLst/>
@@ -6256,7 +6256,7 @@
         <p:spPr>
           <a:xfrm>
             <a:off x="6706080" y="3844080"/>
-            <a:ext cx="1436040" cy="572040"/>
+            <a:ext cx="1435680" cy="571680"/>
           </a:xfrm>
           <a:prstGeom prst="rect">
             <a:avLst/>
@@ -6419,7 +6419,7 @@
         <p:spPr>
           <a:xfrm>
             <a:off x="6658920" y="4197600"/>
-            <a:ext cx="448920" cy="241560"/>
+            <a:ext cx="448560" cy="241560"/>
           </a:xfrm>
           <a:prstGeom prst="rect">
             <a:avLst/>
@@ -6490,7 +6490,7 @@
         <p:spPr>
           <a:xfrm>
             <a:off x="7958520" y="3816000"/>
-            <a:ext cx="304920" cy="165600"/>
+            <a:ext cx="304560" cy="165600"/>
           </a:xfrm>
           <a:prstGeom prst="rect">
             <a:avLst/>
@@ -6541,7 +6541,7 @@
         <p:spPr>
           <a:xfrm>
             <a:off x="6050160" y="3840840"/>
-            <a:ext cx="572040" cy="262440"/>
+            <a:ext cx="571680" cy="262080"/>
           </a:xfrm>
           <a:prstGeom prst="rect">
             <a:avLst/>
@@ -6596,7 +6596,7 @@
         <p:spPr>
           <a:xfrm>
             <a:off x="6050160" y="4154400"/>
-            <a:ext cx="572040" cy="262440"/>
+            <a:ext cx="571680" cy="262080"/>
           </a:xfrm>
           <a:prstGeom prst="rect">
             <a:avLst/>
@@ -6707,7 +6707,7 @@
         <p:spPr>
           <a:xfrm>
             <a:off x="6472800" y="3816000"/>
-            <a:ext cx="304920" cy="165600"/>
+            <a:ext cx="304560" cy="165600"/>
           </a:xfrm>
           <a:prstGeom prst="rect">
             <a:avLst/>
@@ -6758,7 +6758,7 @@
         <p:spPr>
           <a:xfrm>
             <a:off x="6472800" y="4125600"/>
-            <a:ext cx="304920" cy="165600"/>
+            <a:ext cx="304560" cy="165600"/>
           </a:xfrm>
           <a:prstGeom prst="rect">
             <a:avLst/>
@@ -6809,7 +6809,7 @@
         <p:spPr>
           <a:xfrm>
             <a:off x="6708960" y="4636080"/>
-            <a:ext cx="1436040" cy="572040"/>
+            <a:ext cx="1435680" cy="571680"/>
           </a:xfrm>
           <a:prstGeom prst="rect">
             <a:avLst/>
@@ -7002,7 +7002,7 @@
         <p:spPr>
           <a:xfrm>
             <a:off x="7961400" y="4608000"/>
-            <a:ext cx="304920" cy="165600"/>
+            <a:ext cx="304560" cy="165600"/>
           </a:xfrm>
           <a:prstGeom prst="rect">
             <a:avLst/>
@@ -7053,7 +7053,7 @@
         <p:spPr>
           <a:xfrm>
             <a:off x="6708960" y="3844080"/>
-            <a:ext cx="1436040" cy="572040"/>
+            <a:ext cx="1435680" cy="571680"/>
           </a:xfrm>
           <a:prstGeom prst="rect">
             <a:avLst/>
@@ -7108,7 +7108,7 @@
         <p:spPr>
           <a:xfrm>
             <a:off x="6647400" y="4125600"/>
-            <a:ext cx="825480" cy="318240"/>
+            <a:ext cx="825120" cy="317880"/>
           </a:xfrm>
           <a:prstGeom prst="rect">
             <a:avLst/>
@@ -7199,7 +7199,7 @@
         <p:spPr>
           <a:xfrm>
             <a:off x="7961400" y="3816000"/>
-            <a:ext cx="304920" cy="165600"/>
+            <a:ext cx="304560" cy="165600"/>
           </a:xfrm>
           <a:prstGeom prst="rect">
             <a:avLst/>
@@ -7250,7 +7250,7 @@
         <p:spPr>
           <a:xfrm>
             <a:off x="6053040" y="3840840"/>
-            <a:ext cx="572040" cy="262440"/>
+            <a:ext cx="571680" cy="262080"/>
           </a:xfrm>
           <a:prstGeom prst="rect">
             <a:avLst/>
@@ -7305,7 +7305,7 @@
         <p:spPr>
           <a:xfrm>
             <a:off x="6053040" y="4154400"/>
-            <a:ext cx="572040" cy="262440"/>
+            <a:ext cx="571680" cy="262080"/>
           </a:xfrm>
           <a:prstGeom prst="rect">
             <a:avLst/>
@@ -7416,7 +7416,7 @@
         <p:spPr>
           <a:xfrm>
             <a:off x="6475680" y="3816000"/>
-            <a:ext cx="304920" cy="165600"/>
+            <a:ext cx="304560" cy="165600"/>
           </a:xfrm>
           <a:prstGeom prst="rect">
             <a:avLst/>
@@ -7467,7 +7467,7 @@
         <p:spPr>
           <a:xfrm>
             <a:off x="6475680" y="4125600"/>
-            <a:ext cx="304920" cy="165600"/>
+            <a:ext cx="304560" cy="165600"/>
           </a:xfrm>
           <a:prstGeom prst="rect">
             <a:avLst/>
@@ -7626,7 +7626,7 @@
         <p:spPr>
           <a:xfrm>
             <a:off x="6647400" y="4917600"/>
-            <a:ext cx="825480" cy="318240"/>
+            <a:ext cx="825120" cy="317880"/>
           </a:xfrm>
           <a:prstGeom prst="rect">
             <a:avLst/>
@@ -7717,7 +7717,7 @@
         <p:spPr>
           <a:xfrm>
             <a:off x="6640200" y="5479200"/>
-            <a:ext cx="825480" cy="545400"/>
+            <a:ext cx="825120" cy="545400"/>
           </a:xfrm>
           <a:prstGeom prst="rect">
             <a:avLst/>
@@ -7960,6 +7960,114 @@
                 <a:ea typeface="DejaVu Sans"/>
               </a:rPr>
               <a:t>DATA_TO_C</a:t>
+            </a:r>
+            <a:endParaRPr b="0" lang="de-DE" sz="500" spc="-1" strike="noStrike">
+              <a:latin typeface="Arial"/>
+            </a:endParaRPr>
+          </a:p>
+        </p:txBody>
+      </p:sp>
+      <p:sp>
+        <p:nvSpPr>
+          <p:cNvPr id="150" name="Line 115"/>
+          <p:cNvSpPr/>
+          <p:nvPr/>
+        </p:nvSpPr>
+        <p:spPr>
+          <a:xfrm>
+            <a:off x="4978440" y="3969360"/>
+            <a:ext cx="1075320" cy="0"/>
+          </a:xfrm>
+          <a:prstGeom prst="line">
+            <a:avLst/>
+          </a:prstGeom>
+          <a:ln w="12600">
+            <a:solidFill>
+              <a:srgbClr val="000000"/>
+            </a:solidFill>
+            <a:round/>
+            <a:headEnd len="med" type="triangle" w="med"/>
+          </a:ln>
+        </p:spPr>
+        <p:style>
+          <a:lnRef idx="0"/>
+          <a:fillRef idx="0"/>
+          <a:effectRef idx="0"/>
+          <a:fontRef idx="minor"/>
+        </p:style>
+        <p:txBody>
+          <a:bodyPr lIns="96120" rIns="96120" tIns="51120" bIns="51120" anchorCtr="1">
+            <a:spAutoFit/>
+          </a:bodyPr>
+          <a:p>
+            <a:pPr algn="ctr">
+              <a:lnSpc>
+                <a:spcPts val="283"/>
+              </a:lnSpc>
+            </a:pPr>
+            <a:r>
+              <a:rPr b="0" lang="de-DE" sz="500" spc="-1" strike="noStrike">
+                <a:solidFill>
+                  <a:srgbClr val="000000"/>
+                </a:solidFill>
+                <a:latin typeface="Arial"/>
+                <a:ea typeface="DejaVu Sans"/>
+              </a:rPr>
+              <a:t>H_TO_DATA</a:t>
+            </a:r>
+            <a:endParaRPr b="0" lang="de-DE" sz="500" spc="-1" strike="noStrike">
+              <a:latin typeface="Arial"/>
+            </a:endParaRPr>
+          </a:p>
+        </p:txBody>
+      </p:sp>
+      <p:sp>
+        <p:nvSpPr>
+          <p:cNvPr id="151" name="Line 116"/>
+          <p:cNvSpPr/>
+          <p:nvPr/>
+        </p:nvSpPr>
+        <p:spPr>
+          <a:xfrm>
+            <a:off x="4982040" y="4294800"/>
+            <a:ext cx="1075320" cy="0"/>
+          </a:xfrm>
+          <a:prstGeom prst="line">
+            <a:avLst/>
+          </a:prstGeom>
+          <a:ln w="12600">
+            <a:solidFill>
+              <a:srgbClr val="000000"/>
+            </a:solidFill>
+            <a:round/>
+            <a:headEnd len="med" type="triangle" w="med"/>
+          </a:ln>
+        </p:spPr>
+        <p:style>
+          <a:lnRef idx="0"/>
+          <a:fillRef idx="0"/>
+          <a:effectRef idx="0"/>
+          <a:fontRef idx="minor"/>
+        </p:style>
+        <p:txBody>
+          <a:bodyPr lIns="96120" rIns="96120" tIns="51120" bIns="51120" anchorCtr="1">
+            <a:spAutoFit/>
+          </a:bodyPr>
+          <a:p>
+            <a:pPr algn="ctr">
+              <a:lnSpc>
+                <a:spcPts val="283"/>
+              </a:lnSpc>
+            </a:pPr>
+            <a:r>
+              <a:rPr b="0" lang="de-DE" sz="500" spc="-1" strike="noStrike">
+                <a:solidFill>
+                  <a:srgbClr val="000000"/>
+                </a:solidFill>
+                <a:latin typeface="Arial"/>
+                <a:ea typeface="DejaVu Sans"/>
+              </a:rPr>
+              <a:t>L_TO_DATA</a:t>
             </a:r>
             <a:endParaRPr b="0" lang="de-DE" sz="500" spc="-1" strike="noStrike">
               <a:latin typeface="Arial"/>

</xml_diff>

<commit_message>
prepare ADC and SBB
</commit_message>
<xml_diff>
--- a/doc/cpu.pptx
+++ b/doc/cpu.pptx
@@ -1431,7 +1431,7 @@
         <p:spPr>
           <a:xfrm>
             <a:off x="5812560" y="1411560"/>
-            <a:ext cx="3811680" cy="2299680"/>
+            <a:ext cx="3810960" cy="2298960"/>
           </a:xfrm>
           <a:prstGeom prst="rect">
             <a:avLst/>
@@ -1461,7 +1461,7 @@
         <p:spPr>
           <a:xfrm>
             <a:off x="412560" y="2412360"/>
-            <a:ext cx="4027680" cy="2299680"/>
+            <a:ext cx="4026960" cy="2298960"/>
           </a:xfrm>
           <a:prstGeom prst="rect">
             <a:avLst/>
@@ -1491,7 +1491,7 @@
         <p:spPr>
           <a:xfrm>
             <a:off x="6702840" y="756360"/>
-            <a:ext cx="1435680" cy="571680"/>
+            <a:ext cx="1434960" cy="570960"/>
           </a:xfrm>
           <a:prstGeom prst="rect">
             <a:avLst/>
@@ -1576,7 +1576,7 @@
         <p:spPr>
           <a:xfrm>
             <a:off x="4686840" y="612360"/>
-            <a:ext cx="283680" cy="6514560"/>
+            <a:ext cx="282960" cy="6513840"/>
           </a:xfrm>
           <a:prstGeom prst="rect">
             <a:avLst/>
@@ -1631,7 +1631,7 @@
         <p:spPr>
           <a:xfrm>
             <a:off x="9870840" y="612360"/>
-            <a:ext cx="283680" cy="6514560"/>
+            <a:ext cx="282960" cy="6513840"/>
           </a:xfrm>
           <a:prstGeom prst="rect">
             <a:avLst/>
@@ -1686,7 +1686,7 @@
         <p:spPr>
           <a:xfrm>
             <a:off x="6702840" y="1548360"/>
-            <a:ext cx="1435680" cy="571680"/>
+            <a:ext cx="1434960" cy="570960"/>
           </a:xfrm>
           <a:prstGeom prst="rect">
             <a:avLst/>
@@ -1771,7 +1771,7 @@
         <p:spPr>
           <a:xfrm>
             <a:off x="6702840" y="2268360"/>
-            <a:ext cx="1435680" cy="1291680"/>
+            <a:ext cx="1434960" cy="1290960"/>
           </a:xfrm>
           <a:prstGeom prst="rect">
             <a:avLst/>
@@ -1846,7 +1846,7 @@
         <p:spPr>
           <a:xfrm>
             <a:off x="1518840" y="900360"/>
-            <a:ext cx="1435680" cy="427680"/>
+            <a:ext cx="1434960" cy="426960"/>
           </a:xfrm>
           <a:prstGeom prst="rect">
             <a:avLst/>
@@ -1921,7 +1921,7 @@
         <p:spPr>
           <a:xfrm>
             <a:off x="1518840" y="1548360"/>
-            <a:ext cx="1435680" cy="427680"/>
+            <a:ext cx="1434960" cy="426960"/>
           </a:xfrm>
           <a:prstGeom prst="rect">
             <a:avLst/>
@@ -1976,7 +1976,7 @@
         <p:spPr>
           <a:xfrm>
             <a:off x="1518840" y="2556360"/>
-            <a:ext cx="1435680" cy="427680"/>
+            <a:ext cx="1434960" cy="426960"/>
           </a:xfrm>
           <a:prstGeom prst="rect">
             <a:avLst/>
@@ -2031,7 +2031,7 @@
         <p:spPr>
           <a:xfrm>
             <a:off x="1512360" y="3132360"/>
-            <a:ext cx="1435680" cy="859680"/>
+            <a:ext cx="1434960" cy="858960"/>
           </a:xfrm>
           <a:prstGeom prst="rect">
             <a:avLst/>
@@ -2086,7 +2086,7 @@
         <p:spPr>
           <a:xfrm>
             <a:off x="1512360" y="4140360"/>
-            <a:ext cx="1435680" cy="427680"/>
+            <a:ext cx="1434960" cy="426960"/>
           </a:xfrm>
           <a:prstGeom prst="rect">
             <a:avLst/>
@@ -2141,7 +2141,7 @@
         <p:spPr>
           <a:xfrm>
             <a:off x="1512360" y="4824360"/>
-            <a:ext cx="1435680" cy="427680"/>
+            <a:ext cx="1434960" cy="426960"/>
           </a:xfrm>
           <a:prstGeom prst="rect">
             <a:avLst/>
@@ -2196,7 +2196,7 @@
         <p:spPr>
           <a:xfrm>
             <a:off x="1512360" y="5472360"/>
-            <a:ext cx="1435680" cy="427680"/>
+            <a:ext cx="1434960" cy="426960"/>
           </a:xfrm>
           <a:prstGeom prst="rect">
             <a:avLst/>
@@ -2251,7 +2251,7 @@
         <p:spPr>
           <a:xfrm>
             <a:off x="1512360" y="6113880"/>
-            <a:ext cx="1435680" cy="434160"/>
+            <a:ext cx="1434960" cy="433440"/>
           </a:xfrm>
           <a:prstGeom prst="rect">
             <a:avLst/>
@@ -2575,8 +2575,8 @@
         </p:nvSpPr>
         <p:spPr>
           <a:xfrm rot="16200000">
-            <a:off x="2886840" y="3352680"/>
-            <a:ext cx="859680" cy="427680"/>
+            <a:off x="2807640" y="3349080"/>
+            <a:ext cx="858960" cy="426960"/>
           </a:xfrm>
           <a:prstGeom prst="rect">
             <a:avLst/>
@@ -2630,8 +2630,8 @@
         </p:nvSpPr>
         <p:spPr>
           <a:xfrm rot="16200000">
-            <a:off x="288360" y="3352680"/>
-            <a:ext cx="859680" cy="427680"/>
+            <a:off x="288360" y="3353400"/>
+            <a:ext cx="858960" cy="426960"/>
           </a:xfrm>
           <a:prstGeom prst="rect">
             <a:avLst/>
@@ -2851,8 +2851,8 @@
         </p:nvSpPr>
         <p:spPr>
           <a:xfrm>
-            <a:off x="2962080" y="3564360"/>
-            <a:ext cx="140760" cy="0"/>
+            <a:off x="2947680" y="3564360"/>
+            <a:ext cx="75960" cy="0"/>
           </a:xfrm>
           <a:prstGeom prst="line">
             <a:avLst/>
@@ -2862,7 +2862,6 @@
               <a:srgbClr val="000000"/>
             </a:solidFill>
             <a:round/>
-            <a:tailEnd len="med" type="triangle" w="med"/>
           </a:ln>
         </p:spPr>
         <p:style>
@@ -2880,8 +2879,8 @@
         </p:nvSpPr>
         <p:spPr>
           <a:xfrm rot="16200000">
-            <a:off x="5690160" y="2632680"/>
-            <a:ext cx="1291680" cy="571680"/>
+            <a:off x="5690160" y="2633400"/>
+            <a:ext cx="1290960" cy="570960"/>
           </a:xfrm>
           <a:prstGeom prst="rect">
             <a:avLst/>
@@ -2984,8 +2983,8 @@
         </p:nvSpPr>
         <p:spPr>
           <a:xfrm>
-            <a:off x="3534840" y="3564360"/>
-            <a:ext cx="1152000" cy="0"/>
+            <a:off x="3450960" y="3564360"/>
+            <a:ext cx="1235880" cy="0"/>
           </a:xfrm>
           <a:prstGeom prst="line">
             <a:avLst/>
@@ -3579,7 +3578,7 @@
         <p:spPr>
           <a:xfrm>
             <a:off x="1518840" y="324360"/>
-            <a:ext cx="1435680" cy="427680"/>
+            <a:ext cx="1434960" cy="426960"/>
           </a:xfrm>
           <a:prstGeom prst="rect">
             <a:avLst/>
@@ -3740,7 +3739,7 @@
         <p:spPr>
           <a:xfrm>
             <a:off x="4566960" y="324000"/>
-            <a:ext cx="527400" cy="302760"/>
+            <a:ext cx="526680" cy="302760"/>
           </a:xfrm>
           <a:prstGeom prst="rect">
             <a:avLst/>
@@ -3811,7 +3810,7 @@
         <p:spPr>
           <a:xfrm>
             <a:off x="9670680" y="324360"/>
-            <a:ext cx="695880" cy="302760"/>
+            <a:ext cx="695160" cy="302760"/>
           </a:xfrm>
           <a:prstGeom prst="rect">
             <a:avLst/>
@@ -3882,7 +3881,7 @@
         <p:spPr>
           <a:xfrm>
             <a:off x="3251520" y="2448360"/>
-            <a:ext cx="1152720" cy="546120"/>
+            <a:ext cx="1152000" cy="546120"/>
           </a:xfrm>
           <a:prstGeom prst="rect">
             <a:avLst/>
@@ -3953,7 +3952,7 @@
         <p:spPr>
           <a:xfrm>
             <a:off x="8656560" y="3348000"/>
-            <a:ext cx="931680" cy="317880"/>
+            <a:ext cx="930960" cy="317880"/>
           </a:xfrm>
           <a:prstGeom prst="rect">
             <a:avLst/>
@@ -4004,7 +4003,7 @@
         <p:spPr>
           <a:xfrm>
             <a:off x="1464480" y="1116360"/>
-            <a:ext cx="398160" cy="241560"/>
+            <a:ext cx="397440" cy="241560"/>
           </a:xfrm>
           <a:prstGeom prst="rect">
             <a:avLst/>
@@ -4075,7 +4074,7 @@
         <p:spPr>
           <a:xfrm>
             <a:off x="6641280" y="885960"/>
-            <a:ext cx="1047600" cy="469440"/>
+            <a:ext cx="1046880" cy="469440"/>
           </a:xfrm>
           <a:prstGeom prst="rect">
             <a:avLst/>
@@ -4206,7 +4205,7 @@
         <p:spPr>
           <a:xfrm>
             <a:off x="1450080" y="6408360"/>
-            <a:ext cx="304560" cy="165600"/>
+            <a:ext cx="303840" cy="165600"/>
           </a:xfrm>
           <a:prstGeom prst="rect">
             <a:avLst/>
@@ -4257,7 +4256,7 @@
         <p:spPr>
           <a:xfrm>
             <a:off x="1450080" y="5760360"/>
-            <a:ext cx="304560" cy="165600"/>
+            <a:ext cx="303840" cy="165600"/>
           </a:xfrm>
           <a:prstGeom prst="rect">
             <a:avLst/>
@@ -4308,7 +4307,7 @@
         <p:spPr>
           <a:xfrm>
             <a:off x="1450080" y="5112360"/>
-            <a:ext cx="304560" cy="165600"/>
+            <a:ext cx="303840" cy="165600"/>
           </a:xfrm>
           <a:prstGeom prst="rect">
             <a:avLst/>
@@ -4359,7 +4358,7 @@
         <p:spPr>
           <a:xfrm>
             <a:off x="434880" y="3794760"/>
-            <a:ext cx="398520" cy="241560"/>
+            <a:ext cx="397800" cy="241560"/>
           </a:xfrm>
           <a:prstGeom prst="rect">
             <a:avLst/>
@@ -4430,7 +4429,7 @@
         <p:spPr>
           <a:xfrm>
             <a:off x="1457280" y="1836360"/>
-            <a:ext cx="304560" cy="165600"/>
+            <a:ext cx="303840" cy="165600"/>
           </a:xfrm>
           <a:prstGeom prst="rect">
             <a:avLst/>
@@ -4481,7 +4480,7 @@
         <p:spPr>
           <a:xfrm>
             <a:off x="1457280" y="2844360"/>
-            <a:ext cx="304560" cy="165600"/>
+            <a:ext cx="303840" cy="165600"/>
           </a:xfrm>
           <a:prstGeom prst="rect">
             <a:avLst/>
@@ -4532,7 +4531,7 @@
         <p:spPr>
           <a:xfrm>
             <a:off x="1450080" y="4428360"/>
-            <a:ext cx="304560" cy="165600"/>
+            <a:ext cx="303840" cy="165600"/>
           </a:xfrm>
           <a:prstGeom prst="rect">
             <a:avLst/>
@@ -4583,7 +4582,7 @@
         <p:spPr>
           <a:xfrm>
             <a:off x="6641280" y="1757160"/>
-            <a:ext cx="1119600" cy="393480"/>
+            <a:ext cx="1118880" cy="393480"/>
           </a:xfrm>
           <a:prstGeom prst="rect">
             <a:avLst/>
@@ -4694,7 +4693,7 @@
         <p:spPr>
           <a:xfrm>
             <a:off x="6655680" y="3402360"/>
-            <a:ext cx="304560" cy="165600"/>
+            <a:ext cx="303840" cy="165600"/>
           </a:xfrm>
           <a:prstGeom prst="rect">
             <a:avLst/>
@@ -4744,8 +4743,8 @@
         </p:nvSpPr>
         <p:spPr>
           <a:xfrm>
-            <a:off x="1450080" y="3852360"/>
-            <a:ext cx="448560" cy="165600"/>
+            <a:off x="1450080" y="3780360"/>
+            <a:ext cx="447840" cy="241560"/>
           </a:xfrm>
           <a:prstGeom prst="rect">
             <a:avLst/>
@@ -4780,6 +4779,26 @@
                 <a:ea typeface="DejaVu Sans"/>
               </a:rPr>
               <a:t>SUB</a:t>
+            </a:r>
+            <a:endParaRPr b="0" lang="de-DE" sz="500" spc="-1" strike="noStrike">
+              <a:latin typeface="Arial"/>
+            </a:endParaRPr>
+          </a:p>
+          <a:p>
+            <a:pPr>
+              <a:lnSpc>
+                <a:spcPct val="100000"/>
+              </a:lnSpc>
+            </a:pPr>
+            <a:r>
+              <a:rPr b="0" lang="de-DE" sz="500" spc="-1" strike="noStrike">
+                <a:solidFill>
+                  <a:srgbClr val="ffffff"/>
+                </a:solidFill>
+                <a:latin typeface="Arial"/>
+                <a:ea typeface="DejaVu Sans"/>
+              </a:rPr>
+              <a:t>CARRY</a:t>
             </a:r>
             <a:endParaRPr b="0" lang="de-DE" sz="500" spc="-1" strike="noStrike">
               <a:latin typeface="Arial"/>
@@ -4824,7 +4843,7 @@
         <p:spPr>
           <a:xfrm>
             <a:off x="6702840" y="5428080"/>
-            <a:ext cx="1435680" cy="571680"/>
+            <a:ext cx="1434960" cy="570960"/>
           </a:xfrm>
           <a:prstGeom prst="rect">
             <a:avLst/>
@@ -5017,7 +5036,7 @@
         <p:spPr>
           <a:xfrm>
             <a:off x="1454760" y="460440"/>
-            <a:ext cx="449640" cy="317520"/>
+            <a:ext cx="448920" cy="317520"/>
           </a:xfrm>
           <a:prstGeom prst="rect">
             <a:avLst/>
@@ -5136,7 +5155,7 @@
         <p:spPr>
           <a:xfrm>
             <a:off x="2798640" y="887040"/>
-            <a:ext cx="304560" cy="165600"/>
+            <a:ext cx="303840" cy="165600"/>
           </a:xfrm>
           <a:prstGeom prst="rect">
             <a:avLst/>
@@ -5187,7 +5206,7 @@
         <p:spPr>
           <a:xfrm>
             <a:off x="2798640" y="1526400"/>
-            <a:ext cx="304560" cy="165600"/>
+            <a:ext cx="303840" cy="165600"/>
           </a:xfrm>
           <a:prstGeom prst="rect">
             <a:avLst/>
@@ -5238,7 +5257,7 @@
         <p:spPr>
           <a:xfrm>
             <a:off x="2798640" y="2534400"/>
-            <a:ext cx="304560" cy="165600"/>
+            <a:ext cx="303840" cy="165600"/>
           </a:xfrm>
           <a:prstGeom prst="rect">
             <a:avLst/>
@@ -5289,7 +5308,7 @@
         <p:spPr>
           <a:xfrm>
             <a:off x="2798640" y="4118760"/>
-            <a:ext cx="304560" cy="165600"/>
+            <a:ext cx="303840" cy="165600"/>
           </a:xfrm>
           <a:prstGeom prst="rect">
             <a:avLst/>
@@ -5340,7 +5359,7 @@
         <p:spPr>
           <a:xfrm>
             <a:off x="2798640" y="4802760"/>
-            <a:ext cx="304560" cy="165600"/>
+            <a:ext cx="303840" cy="165600"/>
           </a:xfrm>
           <a:prstGeom prst="rect">
             <a:avLst/>
@@ -5391,7 +5410,7 @@
         <p:spPr>
           <a:xfrm>
             <a:off x="2798640" y="5457240"/>
-            <a:ext cx="304560" cy="165600"/>
+            <a:ext cx="303840" cy="165600"/>
           </a:xfrm>
           <a:prstGeom prst="rect">
             <a:avLst/>
@@ -5442,7 +5461,7 @@
         <p:spPr>
           <a:xfrm>
             <a:off x="2798640" y="6093360"/>
-            <a:ext cx="304560" cy="165600"/>
+            <a:ext cx="303840" cy="165600"/>
           </a:xfrm>
           <a:prstGeom prst="rect">
             <a:avLst/>
@@ -5492,8 +5511,8 @@
         </p:nvSpPr>
         <p:spPr>
           <a:xfrm>
-            <a:off x="3384000" y="3115440"/>
-            <a:ext cx="304560" cy="165600"/>
+            <a:off x="3304440" y="3099600"/>
+            <a:ext cx="303840" cy="165600"/>
           </a:xfrm>
           <a:prstGeom prst="rect">
             <a:avLst/>
@@ -5544,7 +5563,7 @@
         <p:spPr>
           <a:xfrm>
             <a:off x="779040" y="3108960"/>
-            <a:ext cx="304560" cy="165600"/>
+            <a:ext cx="303840" cy="165600"/>
           </a:xfrm>
           <a:prstGeom prst="rect">
             <a:avLst/>
@@ -5595,7 +5614,7 @@
         <p:spPr>
           <a:xfrm>
             <a:off x="7949160" y="734400"/>
-            <a:ext cx="304560" cy="165600"/>
+            <a:ext cx="303840" cy="165600"/>
           </a:xfrm>
           <a:prstGeom prst="rect">
             <a:avLst/>
@@ -5646,7 +5665,7 @@
         <p:spPr>
           <a:xfrm>
             <a:off x="7949160" y="1526400"/>
-            <a:ext cx="304560" cy="165600"/>
+            <a:ext cx="303840" cy="165600"/>
           </a:xfrm>
           <a:prstGeom prst="rect">
             <a:avLst/>
@@ -5697,7 +5716,7 @@
         <p:spPr>
           <a:xfrm>
             <a:off x="7955280" y="5400000"/>
-            <a:ext cx="304560" cy="165600"/>
+            <a:ext cx="303840" cy="165600"/>
           </a:xfrm>
           <a:prstGeom prst="rect">
             <a:avLst/>
@@ -5748,7 +5767,7 @@
         <p:spPr>
           <a:xfrm>
             <a:off x="6466320" y="2245320"/>
-            <a:ext cx="304560" cy="165600"/>
+            <a:ext cx="303840" cy="165600"/>
           </a:xfrm>
           <a:prstGeom prst="rect">
             <a:avLst/>
@@ -5799,7 +5818,7 @@
         <p:spPr>
           <a:xfrm>
             <a:off x="3024000" y="325080"/>
-            <a:ext cx="709920" cy="427680"/>
+            <a:ext cx="709200" cy="426960"/>
           </a:xfrm>
           <a:prstGeom prst="rect">
             <a:avLst/>
@@ -5882,7 +5901,7 @@
         <p:spPr>
           <a:xfrm>
             <a:off x="2957760" y="612000"/>
-            <a:ext cx="448560" cy="165600"/>
+            <a:ext cx="447840" cy="165600"/>
           </a:xfrm>
           <a:prstGeom prst="rect">
             <a:avLst/>
@@ -6205,7 +6224,7 @@
         <p:spPr>
           <a:xfrm>
             <a:off x="294120" y="6930000"/>
-            <a:ext cx="434160" cy="196200"/>
+            <a:ext cx="433440" cy="196200"/>
           </a:xfrm>
           <a:prstGeom prst="rect">
             <a:avLst/>
@@ -6256,7 +6275,7 @@
         <p:spPr>
           <a:xfrm>
             <a:off x="6706080" y="3844080"/>
-            <a:ext cx="1435680" cy="571680"/>
+            <a:ext cx="1434960" cy="570960"/>
           </a:xfrm>
           <a:prstGeom prst="rect">
             <a:avLst/>
@@ -6419,7 +6438,7 @@
         <p:spPr>
           <a:xfrm>
             <a:off x="6658920" y="4197600"/>
-            <a:ext cx="448560" cy="241560"/>
+            <a:ext cx="447840" cy="241560"/>
           </a:xfrm>
           <a:prstGeom prst="rect">
             <a:avLst/>
@@ -6490,7 +6509,7 @@
         <p:spPr>
           <a:xfrm>
             <a:off x="7958520" y="3816000"/>
-            <a:ext cx="304560" cy="165600"/>
+            <a:ext cx="303840" cy="165600"/>
           </a:xfrm>
           <a:prstGeom prst="rect">
             <a:avLst/>
@@ -6541,7 +6560,7 @@
         <p:spPr>
           <a:xfrm>
             <a:off x="6050160" y="3840840"/>
-            <a:ext cx="571680" cy="262080"/>
+            <a:ext cx="570960" cy="261360"/>
           </a:xfrm>
           <a:prstGeom prst="rect">
             <a:avLst/>
@@ -6596,7 +6615,7 @@
         <p:spPr>
           <a:xfrm>
             <a:off x="6050160" y="4154400"/>
-            <a:ext cx="571680" cy="262080"/>
+            <a:ext cx="570960" cy="261360"/>
           </a:xfrm>
           <a:prstGeom prst="rect">
             <a:avLst/>
@@ -6707,7 +6726,7 @@
         <p:spPr>
           <a:xfrm>
             <a:off x="6472800" y="3816000"/>
-            <a:ext cx="304560" cy="165600"/>
+            <a:ext cx="303840" cy="165600"/>
           </a:xfrm>
           <a:prstGeom prst="rect">
             <a:avLst/>
@@ -6758,7 +6777,7 @@
         <p:spPr>
           <a:xfrm>
             <a:off x="6472800" y="4125600"/>
-            <a:ext cx="304560" cy="165600"/>
+            <a:ext cx="303840" cy="165600"/>
           </a:xfrm>
           <a:prstGeom prst="rect">
             <a:avLst/>
@@ -6809,7 +6828,7 @@
         <p:spPr>
           <a:xfrm>
             <a:off x="6708960" y="4636080"/>
-            <a:ext cx="1435680" cy="571680"/>
+            <a:ext cx="1434960" cy="570960"/>
           </a:xfrm>
           <a:prstGeom prst="rect">
             <a:avLst/>
@@ -7002,7 +7021,7 @@
         <p:spPr>
           <a:xfrm>
             <a:off x="7961400" y="4608000"/>
-            <a:ext cx="304560" cy="165600"/>
+            <a:ext cx="303840" cy="165600"/>
           </a:xfrm>
           <a:prstGeom prst="rect">
             <a:avLst/>
@@ -7053,7 +7072,7 @@
         <p:spPr>
           <a:xfrm>
             <a:off x="6708960" y="3844080"/>
-            <a:ext cx="1435680" cy="571680"/>
+            <a:ext cx="1434960" cy="570960"/>
           </a:xfrm>
           <a:prstGeom prst="rect">
             <a:avLst/>
@@ -7108,7 +7127,7 @@
         <p:spPr>
           <a:xfrm>
             <a:off x="6647400" y="4125600"/>
-            <a:ext cx="825120" cy="317880"/>
+            <a:ext cx="824400" cy="317520"/>
           </a:xfrm>
           <a:prstGeom prst="rect">
             <a:avLst/>
@@ -7199,7 +7218,7 @@
         <p:spPr>
           <a:xfrm>
             <a:off x="7961400" y="3816000"/>
-            <a:ext cx="304560" cy="165600"/>
+            <a:ext cx="303840" cy="165600"/>
           </a:xfrm>
           <a:prstGeom prst="rect">
             <a:avLst/>
@@ -7250,7 +7269,7 @@
         <p:spPr>
           <a:xfrm>
             <a:off x="6053040" y="3840840"/>
-            <a:ext cx="571680" cy="262080"/>
+            <a:ext cx="570960" cy="261360"/>
           </a:xfrm>
           <a:prstGeom prst="rect">
             <a:avLst/>
@@ -7305,7 +7324,7 @@
         <p:spPr>
           <a:xfrm>
             <a:off x="6053040" y="4154400"/>
-            <a:ext cx="571680" cy="262080"/>
+            <a:ext cx="570960" cy="261360"/>
           </a:xfrm>
           <a:prstGeom prst="rect">
             <a:avLst/>
@@ -7416,7 +7435,7 @@
         <p:spPr>
           <a:xfrm>
             <a:off x="6475680" y="3816000"/>
-            <a:ext cx="304560" cy="165600"/>
+            <a:ext cx="303840" cy="165600"/>
           </a:xfrm>
           <a:prstGeom prst="rect">
             <a:avLst/>
@@ -7467,7 +7486,7 @@
         <p:spPr>
           <a:xfrm>
             <a:off x="6475680" y="4125600"/>
-            <a:ext cx="304560" cy="165600"/>
+            <a:ext cx="303840" cy="165600"/>
           </a:xfrm>
           <a:prstGeom prst="rect">
             <a:avLst/>
@@ -7626,7 +7645,7 @@
         <p:spPr>
           <a:xfrm>
             <a:off x="6647400" y="4917600"/>
-            <a:ext cx="825120" cy="317880"/>
+            <a:ext cx="824400" cy="317520"/>
           </a:xfrm>
           <a:prstGeom prst="rect">
             <a:avLst/>
@@ -7717,7 +7736,7 @@
         <p:spPr>
           <a:xfrm>
             <a:off x="6640200" y="5479200"/>
-            <a:ext cx="825120" cy="545400"/>
+            <a:ext cx="824400" cy="545400"/>
           </a:xfrm>
           <a:prstGeom prst="rect">
             <a:avLst/>

</xml_diff>

<commit_message>
add new control signals
</commit_message>
<xml_diff>
--- a/doc/cpu.pptx
+++ b/doc/cpu.pptx
@@ -53,7 +53,7 @@
       </p:grpSpPr>
       <p:sp>
         <p:nvSpPr>
-          <p:cNvPr id="21" name="PlaceHolder 1"/>
+          <p:cNvPr id="23" name="PlaceHolder 1"/>
           <p:cNvSpPr>
             <a:spLocks noGrp="1"/>
           </p:cNvSpPr>
@@ -84,7 +84,7 @@
       </p:sp>
       <p:sp>
         <p:nvSpPr>
-          <p:cNvPr id="22" name="PlaceHolder 2"/>
+          <p:cNvPr id="24" name="PlaceHolder 2"/>
           <p:cNvSpPr>
             <a:spLocks noGrp="1"/>
           </p:cNvSpPr>
@@ -114,7 +114,7 @@
       </p:sp>
       <p:sp>
         <p:nvSpPr>
-          <p:cNvPr id="23" name="PlaceHolder 3"/>
+          <p:cNvPr id="25" name="PlaceHolder 3"/>
           <p:cNvSpPr>
             <a:spLocks noGrp="1"/>
           </p:cNvSpPr>
@@ -166,7 +166,7 @@
       </p:grpSpPr>
       <p:sp>
         <p:nvSpPr>
-          <p:cNvPr id="24" name="PlaceHolder 1"/>
+          <p:cNvPr id="26" name="PlaceHolder 1"/>
           <p:cNvSpPr>
             <a:spLocks noGrp="1"/>
           </p:cNvSpPr>
@@ -197,7 +197,7 @@
       </p:sp>
       <p:sp>
         <p:nvSpPr>
-          <p:cNvPr id="25" name="PlaceHolder 2"/>
+          <p:cNvPr id="27" name="PlaceHolder 2"/>
           <p:cNvSpPr>
             <a:spLocks noGrp="1"/>
           </p:cNvSpPr>
@@ -227,7 +227,7 @@
       </p:sp>
       <p:sp>
         <p:nvSpPr>
-          <p:cNvPr id="26" name="PlaceHolder 3"/>
+          <p:cNvPr id="28" name="PlaceHolder 3"/>
           <p:cNvSpPr>
             <a:spLocks noGrp="1"/>
           </p:cNvSpPr>
@@ -257,7 +257,7 @@
       </p:sp>
       <p:sp>
         <p:nvSpPr>
-          <p:cNvPr id="27" name="PlaceHolder 4"/>
+          <p:cNvPr id="29" name="PlaceHolder 4"/>
           <p:cNvSpPr>
             <a:spLocks noGrp="1"/>
           </p:cNvSpPr>
@@ -287,7 +287,7 @@
       </p:sp>
       <p:sp>
         <p:nvSpPr>
-          <p:cNvPr id="28" name="PlaceHolder 5"/>
+          <p:cNvPr id="30" name="PlaceHolder 5"/>
           <p:cNvSpPr>
             <a:spLocks noGrp="1"/>
           </p:cNvSpPr>
@@ -339,7 +339,7 @@
       </p:grpSpPr>
       <p:sp>
         <p:nvSpPr>
-          <p:cNvPr id="29" name="PlaceHolder 1"/>
+          <p:cNvPr id="31" name="PlaceHolder 1"/>
           <p:cNvSpPr>
             <a:spLocks noGrp="1"/>
           </p:cNvSpPr>
@@ -370,7 +370,7 @@
       </p:sp>
       <p:sp>
         <p:nvSpPr>
-          <p:cNvPr id="30" name="PlaceHolder 2"/>
+          <p:cNvPr id="32" name="PlaceHolder 2"/>
           <p:cNvSpPr>
             <a:spLocks noGrp="1"/>
           </p:cNvSpPr>
@@ -400,7 +400,7 @@
       </p:sp>
       <p:sp>
         <p:nvSpPr>
-          <p:cNvPr id="31" name="PlaceHolder 3"/>
+          <p:cNvPr id="33" name="PlaceHolder 3"/>
           <p:cNvSpPr>
             <a:spLocks noGrp="1"/>
           </p:cNvSpPr>
@@ -430,7 +430,7 @@
       </p:sp>
       <p:sp>
         <p:nvSpPr>
-          <p:cNvPr id="32" name="PlaceHolder 4"/>
+          <p:cNvPr id="34" name="PlaceHolder 4"/>
           <p:cNvSpPr>
             <a:spLocks noGrp="1"/>
           </p:cNvSpPr>
@@ -460,7 +460,7 @@
       </p:sp>
       <p:sp>
         <p:nvSpPr>
-          <p:cNvPr id="33" name="PlaceHolder 5"/>
+          <p:cNvPr id="35" name="PlaceHolder 5"/>
           <p:cNvSpPr>
             <a:spLocks noGrp="1"/>
           </p:cNvSpPr>
@@ -490,7 +490,7 @@
       </p:sp>
       <p:sp>
         <p:nvSpPr>
-          <p:cNvPr id="34" name="PlaceHolder 6"/>
+          <p:cNvPr id="36" name="PlaceHolder 6"/>
           <p:cNvSpPr>
             <a:spLocks noGrp="1"/>
           </p:cNvSpPr>
@@ -520,7 +520,7 @@
       </p:sp>
       <p:sp>
         <p:nvSpPr>
-          <p:cNvPr id="35" name="PlaceHolder 7"/>
+          <p:cNvPr id="37" name="PlaceHolder 7"/>
           <p:cNvSpPr>
             <a:spLocks noGrp="1"/>
           </p:cNvSpPr>
@@ -572,7 +572,7 @@
       </p:grpSpPr>
       <p:sp>
         <p:nvSpPr>
-          <p:cNvPr id="0" name="PlaceHolder 1"/>
+          <p:cNvPr id="2" name="PlaceHolder 1"/>
           <p:cNvSpPr>
             <a:spLocks noGrp="1"/>
           </p:cNvSpPr>
@@ -603,7 +603,7 @@
       </p:sp>
       <p:sp>
         <p:nvSpPr>
-          <p:cNvPr id="1" name="PlaceHolder 2"/>
+          <p:cNvPr id="3" name="PlaceHolder 2"/>
           <p:cNvSpPr>
             <a:spLocks noGrp="1"/>
           </p:cNvSpPr>
@@ -656,7 +656,7 @@
       </p:grpSpPr>
       <p:sp>
         <p:nvSpPr>
-          <p:cNvPr id="2" name="PlaceHolder 1"/>
+          <p:cNvPr id="4" name="PlaceHolder 1"/>
           <p:cNvSpPr>
             <a:spLocks noGrp="1"/>
           </p:cNvSpPr>
@@ -687,7 +687,7 @@
       </p:sp>
       <p:sp>
         <p:nvSpPr>
-          <p:cNvPr id="3" name="PlaceHolder 2"/>
+          <p:cNvPr id="5" name="PlaceHolder 2"/>
           <p:cNvSpPr>
             <a:spLocks noGrp="1"/>
           </p:cNvSpPr>
@@ -739,7 +739,7 @@
       </p:grpSpPr>
       <p:sp>
         <p:nvSpPr>
-          <p:cNvPr id="4" name="PlaceHolder 1"/>
+          <p:cNvPr id="6" name="PlaceHolder 1"/>
           <p:cNvSpPr>
             <a:spLocks noGrp="1"/>
           </p:cNvSpPr>
@@ -770,7 +770,7 @@
       </p:sp>
       <p:sp>
         <p:nvSpPr>
-          <p:cNvPr id="5" name="PlaceHolder 2"/>
+          <p:cNvPr id="7" name="PlaceHolder 2"/>
           <p:cNvSpPr>
             <a:spLocks noGrp="1"/>
           </p:cNvSpPr>
@@ -800,7 +800,7 @@
       </p:sp>
       <p:sp>
         <p:nvSpPr>
-          <p:cNvPr id="6" name="PlaceHolder 3"/>
+          <p:cNvPr id="8" name="PlaceHolder 3"/>
           <p:cNvSpPr>
             <a:spLocks noGrp="1"/>
           </p:cNvSpPr>
@@ -852,7 +852,7 @@
       </p:grpSpPr>
       <p:sp>
         <p:nvSpPr>
-          <p:cNvPr id="7" name="PlaceHolder 1"/>
+          <p:cNvPr id="9" name="PlaceHolder 1"/>
           <p:cNvSpPr>
             <a:spLocks noGrp="1"/>
           </p:cNvSpPr>
@@ -905,7 +905,7 @@
       </p:grpSpPr>
       <p:sp>
         <p:nvSpPr>
-          <p:cNvPr id="8" name="PlaceHolder 1"/>
+          <p:cNvPr id="10" name="PlaceHolder 1"/>
           <p:cNvSpPr>
             <a:spLocks noGrp="1"/>
           </p:cNvSpPr>
@@ -958,7 +958,7 @@
       </p:grpSpPr>
       <p:sp>
         <p:nvSpPr>
-          <p:cNvPr id="9" name="PlaceHolder 1"/>
+          <p:cNvPr id="11" name="PlaceHolder 1"/>
           <p:cNvSpPr>
             <a:spLocks noGrp="1"/>
           </p:cNvSpPr>
@@ -989,7 +989,7 @@
       </p:sp>
       <p:sp>
         <p:nvSpPr>
-          <p:cNvPr id="10" name="PlaceHolder 2"/>
+          <p:cNvPr id="12" name="PlaceHolder 2"/>
           <p:cNvSpPr>
             <a:spLocks noGrp="1"/>
           </p:cNvSpPr>
@@ -1019,7 +1019,7 @@
       </p:sp>
       <p:sp>
         <p:nvSpPr>
-          <p:cNvPr id="11" name="PlaceHolder 3"/>
+          <p:cNvPr id="13" name="PlaceHolder 3"/>
           <p:cNvSpPr>
             <a:spLocks noGrp="1"/>
           </p:cNvSpPr>
@@ -1049,7 +1049,7 @@
       </p:sp>
       <p:sp>
         <p:nvSpPr>
-          <p:cNvPr id="12" name="PlaceHolder 4"/>
+          <p:cNvPr id="14" name="PlaceHolder 4"/>
           <p:cNvSpPr>
             <a:spLocks noGrp="1"/>
           </p:cNvSpPr>
@@ -1101,7 +1101,7 @@
       </p:grpSpPr>
       <p:sp>
         <p:nvSpPr>
-          <p:cNvPr id="13" name="PlaceHolder 1"/>
+          <p:cNvPr id="15" name="PlaceHolder 1"/>
           <p:cNvSpPr>
             <a:spLocks noGrp="1"/>
           </p:cNvSpPr>
@@ -1132,7 +1132,7 @@
       </p:sp>
       <p:sp>
         <p:nvSpPr>
-          <p:cNvPr id="14" name="PlaceHolder 2"/>
+          <p:cNvPr id="16" name="PlaceHolder 2"/>
           <p:cNvSpPr>
             <a:spLocks noGrp="1"/>
           </p:cNvSpPr>
@@ -1162,7 +1162,7 @@
       </p:sp>
       <p:sp>
         <p:nvSpPr>
-          <p:cNvPr id="15" name="PlaceHolder 3"/>
+          <p:cNvPr id="17" name="PlaceHolder 3"/>
           <p:cNvSpPr>
             <a:spLocks noGrp="1"/>
           </p:cNvSpPr>
@@ -1192,7 +1192,7 @@
       </p:sp>
       <p:sp>
         <p:nvSpPr>
-          <p:cNvPr id="16" name="PlaceHolder 4"/>
+          <p:cNvPr id="18" name="PlaceHolder 4"/>
           <p:cNvSpPr>
             <a:spLocks noGrp="1"/>
           </p:cNvSpPr>
@@ -1244,7 +1244,7 @@
       </p:grpSpPr>
       <p:sp>
         <p:nvSpPr>
-          <p:cNvPr id="17" name="PlaceHolder 1"/>
+          <p:cNvPr id="19" name="PlaceHolder 1"/>
           <p:cNvSpPr>
             <a:spLocks noGrp="1"/>
           </p:cNvSpPr>
@@ -1275,7 +1275,7 @@
       </p:sp>
       <p:sp>
         <p:nvSpPr>
-          <p:cNvPr id="18" name="PlaceHolder 2"/>
+          <p:cNvPr id="20" name="PlaceHolder 2"/>
           <p:cNvSpPr>
             <a:spLocks noGrp="1"/>
           </p:cNvSpPr>
@@ -1305,7 +1305,7 @@
       </p:sp>
       <p:sp>
         <p:nvSpPr>
-          <p:cNvPr id="19" name="PlaceHolder 3"/>
+          <p:cNvPr id="21" name="PlaceHolder 3"/>
           <p:cNvSpPr>
             <a:spLocks noGrp="1"/>
           </p:cNvSpPr>
@@ -1335,7 +1335,7 @@
       </p:sp>
       <p:sp>
         <p:nvSpPr>
-          <p:cNvPr id="20" name="PlaceHolder 4"/>
+          <p:cNvPr id="22" name="PlaceHolder 4"/>
           <p:cNvSpPr>
             <a:spLocks noGrp="1"/>
           </p:cNvSpPr>
@@ -1385,6 +1385,222 @@
           <a:chExt cx="0" cy="0"/>
         </a:xfrm>
       </p:grpSpPr>
+      <p:sp>
+        <p:nvSpPr>
+          <p:cNvPr id="0" name="PlaceHolder 1"/>
+          <p:cNvSpPr>
+            <a:spLocks noGrp="1"/>
+          </p:cNvSpPr>
+          <p:nvPr>
+            <p:ph type="title"/>
+          </p:nvPr>
+        </p:nvSpPr>
+        <p:spPr>
+          <a:xfrm>
+            <a:off x="534240" y="301320"/>
+            <a:ext cx="9622080" cy="1261800"/>
+          </a:xfrm>
+          <a:prstGeom prst="rect">
+            <a:avLst/>
+          </a:prstGeom>
+        </p:spPr>
+        <p:txBody>
+          <a:bodyPr lIns="0" rIns="0" tIns="0" bIns="0" anchor="ctr">
+            <a:noAutofit/>
+          </a:bodyPr>
+          <a:p>
+            <a:pPr algn="ctr"/>
+            <a:r>
+              <a:rPr b="0" lang="de-DE" sz="4400" spc="-1" strike="noStrike">
+                <a:latin typeface="Arial"/>
+              </a:rPr>
+              <a:t>Format des Titeltextes durch Klicken bearbeiten</a:t>
+            </a:r>
+            <a:endParaRPr b="0" lang="de-DE" sz="4400" spc="-1" strike="noStrike">
+              <a:latin typeface="Arial"/>
+            </a:endParaRPr>
+          </a:p>
+        </p:txBody>
+      </p:sp>
+      <p:sp>
+        <p:nvSpPr>
+          <p:cNvPr id="1" name="PlaceHolder 2"/>
+          <p:cNvSpPr>
+            <a:spLocks noGrp="1"/>
+          </p:cNvSpPr>
+          <p:nvPr>
+            <p:ph type="body"/>
+          </p:nvPr>
+        </p:nvSpPr>
+        <p:spPr>
+          <a:xfrm>
+            <a:off x="534240" y="1768680"/>
+            <a:ext cx="9622080" cy="4384080"/>
+          </a:xfrm>
+          <a:prstGeom prst="rect">
+            <a:avLst/>
+          </a:prstGeom>
+        </p:spPr>
+        <p:txBody>
+          <a:bodyPr lIns="0" rIns="0" tIns="0" bIns="0">
+            <a:normAutofit/>
+          </a:bodyPr>
+          <a:p>
+            <a:pPr marL="432000" indent="-324000">
+              <a:spcBef>
+                <a:spcPts val="1417"/>
+              </a:spcBef>
+              <a:buClr>
+                <a:srgbClr val="000000"/>
+              </a:buClr>
+              <a:buSzPct val="45000"/>
+              <a:buFont typeface="Wingdings" charset="2"/>
+              <a:buChar char=""/>
+            </a:pPr>
+            <a:r>
+              <a:rPr b="0" lang="de-DE" sz="3200" spc="-1" strike="noStrike">
+                <a:latin typeface="Arial"/>
+              </a:rPr>
+              <a:t>Format des Gliederungstextes durch Klicken bearbeiten</a:t>
+            </a:r>
+            <a:endParaRPr b="0" lang="de-DE" sz="3200" spc="-1" strike="noStrike">
+              <a:latin typeface="Arial"/>
+            </a:endParaRPr>
+          </a:p>
+          <a:p>
+            <a:pPr lvl="1" marL="864000" indent="-324000">
+              <a:spcBef>
+                <a:spcPts val="1134"/>
+              </a:spcBef>
+              <a:buClr>
+                <a:srgbClr val="000000"/>
+              </a:buClr>
+              <a:buSzPct val="75000"/>
+              <a:buFont typeface="Symbol" charset="2"/>
+              <a:buChar char=""/>
+            </a:pPr>
+            <a:r>
+              <a:rPr b="0" lang="de-DE" sz="2800" spc="-1" strike="noStrike">
+                <a:latin typeface="Arial"/>
+              </a:rPr>
+              <a:t>Zweite Gliederungsebene</a:t>
+            </a:r>
+            <a:endParaRPr b="0" lang="de-DE" sz="2800" spc="-1" strike="noStrike">
+              <a:latin typeface="Arial"/>
+            </a:endParaRPr>
+          </a:p>
+          <a:p>
+            <a:pPr lvl="2" marL="1296000" indent="-288000">
+              <a:spcBef>
+                <a:spcPts val="850"/>
+              </a:spcBef>
+              <a:buClr>
+                <a:srgbClr val="000000"/>
+              </a:buClr>
+              <a:buSzPct val="45000"/>
+              <a:buFont typeface="Wingdings" charset="2"/>
+              <a:buChar char=""/>
+            </a:pPr>
+            <a:r>
+              <a:rPr b="0" lang="de-DE" sz="2400" spc="-1" strike="noStrike">
+                <a:latin typeface="Arial"/>
+              </a:rPr>
+              <a:t>Dritte Gliederungsebene</a:t>
+            </a:r>
+            <a:endParaRPr b="0" lang="de-DE" sz="2400" spc="-1" strike="noStrike">
+              <a:latin typeface="Arial"/>
+            </a:endParaRPr>
+          </a:p>
+          <a:p>
+            <a:pPr lvl="3" marL="1728000" indent="-216000">
+              <a:spcBef>
+                <a:spcPts val="567"/>
+              </a:spcBef>
+              <a:buClr>
+                <a:srgbClr val="000000"/>
+              </a:buClr>
+              <a:buSzPct val="75000"/>
+              <a:buFont typeface="Symbol" charset="2"/>
+              <a:buChar char=""/>
+            </a:pPr>
+            <a:r>
+              <a:rPr b="0" lang="de-DE" sz="2000" spc="-1" strike="noStrike">
+                <a:latin typeface="Arial"/>
+              </a:rPr>
+              <a:t>Vierte Gliederungsebene</a:t>
+            </a:r>
+            <a:endParaRPr b="0" lang="de-DE" sz="2000" spc="-1" strike="noStrike">
+              <a:latin typeface="Arial"/>
+            </a:endParaRPr>
+          </a:p>
+          <a:p>
+            <a:pPr lvl="4" marL="2160000" indent="-216000">
+              <a:spcBef>
+                <a:spcPts val="283"/>
+              </a:spcBef>
+              <a:buClr>
+                <a:srgbClr val="000000"/>
+              </a:buClr>
+              <a:buSzPct val="45000"/>
+              <a:buFont typeface="Wingdings" charset="2"/>
+              <a:buChar char=""/>
+            </a:pPr>
+            <a:r>
+              <a:rPr b="0" lang="de-DE" sz="2000" spc="-1" strike="noStrike">
+                <a:latin typeface="Arial"/>
+              </a:rPr>
+              <a:t>Fünfte Gliederungsebene</a:t>
+            </a:r>
+            <a:endParaRPr b="0" lang="de-DE" sz="2000" spc="-1" strike="noStrike">
+              <a:latin typeface="Arial"/>
+            </a:endParaRPr>
+          </a:p>
+          <a:p>
+            <a:pPr lvl="5" marL="2592000" indent="-216000">
+              <a:spcBef>
+                <a:spcPts val="283"/>
+              </a:spcBef>
+              <a:buClr>
+                <a:srgbClr val="000000"/>
+              </a:buClr>
+              <a:buSzPct val="45000"/>
+              <a:buFont typeface="Wingdings" charset="2"/>
+              <a:buChar char=""/>
+            </a:pPr>
+            <a:r>
+              <a:rPr b="0" lang="de-DE" sz="2000" spc="-1" strike="noStrike">
+                <a:latin typeface="Arial"/>
+              </a:rPr>
+              <a:t>Sechste Gliederungsebene</a:t>
+            </a:r>
+            <a:endParaRPr b="0" lang="de-DE" sz="2000" spc="-1" strike="noStrike">
+              <a:latin typeface="Arial"/>
+            </a:endParaRPr>
+          </a:p>
+          <a:p>
+            <a:pPr lvl="6" marL="3024000" indent="-216000">
+              <a:spcBef>
+                <a:spcPts val="283"/>
+              </a:spcBef>
+              <a:buClr>
+                <a:srgbClr val="000000"/>
+              </a:buClr>
+              <a:buSzPct val="45000"/>
+              <a:buFont typeface="Wingdings" charset="2"/>
+              <a:buChar char=""/>
+            </a:pPr>
+            <a:r>
+              <a:rPr b="0" lang="de-DE" sz="2000" spc="-1" strike="noStrike">
+                <a:latin typeface="Arial"/>
+              </a:rPr>
+              <a:t>Siebte Gliederungsebene</a:t>
+            </a:r>
+            <a:endParaRPr b="0" lang="de-DE" sz="2000" spc="-1" strike="noStrike">
+              <a:latin typeface="Arial"/>
+            </a:endParaRPr>
+          </a:p>
+        </p:txBody>
+      </p:sp>
     </p:spTree>
   </p:cSld>
   <p:clrMap bg1="lt1" bg2="lt2" tx1="dk1" tx2="dk2" accent1="accent1" accent2="accent2" accent3="accent3" accent4="accent4" accent5="accent5" accent6="accent6" hlink="hlink" folHlink="folHlink"/>
@@ -1424,14 +1640,14 @@
       </p:grpSpPr>
       <p:sp>
         <p:nvSpPr>
-          <p:cNvPr id="36" name="CustomShape 1"/>
+          <p:cNvPr id="38" name="CustomShape 1"/>
           <p:cNvSpPr/>
           <p:nvPr/>
         </p:nvSpPr>
         <p:spPr>
           <a:xfrm>
             <a:off x="5812560" y="1411560"/>
-            <a:ext cx="3810960" cy="2298960"/>
+            <a:ext cx="3810600" cy="2298600"/>
           </a:xfrm>
           <a:prstGeom prst="rect">
             <a:avLst/>
@@ -1454,14 +1670,14 @@
       </p:sp>
       <p:sp>
         <p:nvSpPr>
-          <p:cNvPr id="37" name="CustomShape 2"/>
+          <p:cNvPr id="39" name="CustomShape 2"/>
           <p:cNvSpPr/>
           <p:nvPr/>
         </p:nvSpPr>
         <p:spPr>
           <a:xfrm>
             <a:off x="412560" y="2412360"/>
-            <a:ext cx="4026960" cy="2298960"/>
+            <a:ext cx="4026600" cy="2298600"/>
           </a:xfrm>
           <a:prstGeom prst="rect">
             <a:avLst/>
@@ -1484,14 +1700,14 @@
       </p:sp>
       <p:sp>
         <p:nvSpPr>
-          <p:cNvPr id="38" name="CustomShape 3"/>
+          <p:cNvPr id="40" name="CustomShape 3"/>
           <p:cNvSpPr/>
           <p:nvPr/>
         </p:nvSpPr>
         <p:spPr>
           <a:xfrm>
             <a:off x="6702840" y="756360"/>
-            <a:ext cx="1434960" cy="570960"/>
+            <a:ext cx="1434600" cy="570600"/>
           </a:xfrm>
           <a:prstGeom prst="rect">
             <a:avLst/>
@@ -1569,14 +1785,14 @@
       </p:sp>
       <p:sp>
         <p:nvSpPr>
-          <p:cNvPr id="39" name="CustomShape 4"/>
+          <p:cNvPr id="41" name="CustomShape 4"/>
           <p:cNvSpPr/>
           <p:nvPr/>
         </p:nvSpPr>
         <p:spPr>
           <a:xfrm>
             <a:off x="4686840" y="612360"/>
-            <a:ext cx="282960" cy="6513840"/>
+            <a:ext cx="282600" cy="6513480"/>
           </a:xfrm>
           <a:prstGeom prst="rect">
             <a:avLst/>
@@ -1624,14 +1840,14 @@
       </p:sp>
       <p:sp>
         <p:nvSpPr>
-          <p:cNvPr id="40" name="CustomShape 5"/>
+          <p:cNvPr id="42" name="CustomShape 5"/>
           <p:cNvSpPr/>
           <p:nvPr/>
         </p:nvSpPr>
         <p:spPr>
           <a:xfrm>
             <a:off x="9870840" y="612360"/>
-            <a:ext cx="282960" cy="6513840"/>
+            <a:ext cx="282600" cy="6513480"/>
           </a:xfrm>
           <a:prstGeom prst="rect">
             <a:avLst/>
@@ -1679,14 +1895,14 @@
       </p:sp>
       <p:sp>
         <p:nvSpPr>
-          <p:cNvPr id="41" name="CustomShape 6"/>
+          <p:cNvPr id="43" name="CustomShape 6"/>
           <p:cNvSpPr/>
           <p:nvPr/>
         </p:nvSpPr>
         <p:spPr>
           <a:xfrm>
             <a:off x="6702840" y="1548360"/>
-            <a:ext cx="1434960" cy="570960"/>
+            <a:ext cx="1434600" cy="570600"/>
           </a:xfrm>
           <a:prstGeom prst="rect">
             <a:avLst/>
@@ -1764,14 +1980,14 @@
       </p:sp>
       <p:sp>
         <p:nvSpPr>
-          <p:cNvPr id="42" name="CustomShape 7"/>
+          <p:cNvPr id="44" name="CustomShape 7"/>
           <p:cNvSpPr/>
           <p:nvPr/>
         </p:nvSpPr>
         <p:spPr>
           <a:xfrm>
             <a:off x="6702840" y="2268360"/>
-            <a:ext cx="1434960" cy="1290960"/>
+            <a:ext cx="1434600" cy="1290600"/>
           </a:xfrm>
           <a:prstGeom prst="rect">
             <a:avLst/>
@@ -1839,14 +2055,14 @@
       </p:sp>
       <p:sp>
         <p:nvSpPr>
-          <p:cNvPr id="43" name="CustomShape 8"/>
+          <p:cNvPr id="45" name="CustomShape 8"/>
           <p:cNvSpPr/>
           <p:nvPr/>
         </p:nvSpPr>
         <p:spPr>
           <a:xfrm>
             <a:off x="1518840" y="900360"/>
-            <a:ext cx="1434960" cy="426960"/>
+            <a:ext cx="1434600" cy="426600"/>
           </a:xfrm>
           <a:prstGeom prst="rect">
             <a:avLst/>
@@ -1914,14 +2130,14 @@
       </p:sp>
       <p:sp>
         <p:nvSpPr>
-          <p:cNvPr id="44" name="CustomShape 9"/>
+          <p:cNvPr id="46" name="CustomShape 9"/>
           <p:cNvSpPr/>
           <p:nvPr/>
         </p:nvSpPr>
         <p:spPr>
           <a:xfrm>
             <a:off x="1518840" y="1548360"/>
-            <a:ext cx="1434960" cy="426960"/>
+            <a:ext cx="1434600" cy="426600"/>
           </a:xfrm>
           <a:prstGeom prst="rect">
             <a:avLst/>
@@ -1969,14 +2185,14 @@
       </p:sp>
       <p:sp>
         <p:nvSpPr>
-          <p:cNvPr id="45" name="CustomShape 10"/>
+          <p:cNvPr id="47" name="CustomShape 10"/>
           <p:cNvSpPr/>
           <p:nvPr/>
         </p:nvSpPr>
         <p:spPr>
           <a:xfrm>
             <a:off x="1518840" y="2556360"/>
-            <a:ext cx="1434960" cy="426960"/>
+            <a:ext cx="1434600" cy="426600"/>
           </a:xfrm>
           <a:prstGeom prst="rect">
             <a:avLst/>
@@ -2024,14 +2240,14 @@
       </p:sp>
       <p:sp>
         <p:nvSpPr>
-          <p:cNvPr id="46" name="CustomShape 11"/>
+          <p:cNvPr id="48" name="CustomShape 11"/>
           <p:cNvSpPr/>
           <p:nvPr/>
         </p:nvSpPr>
         <p:spPr>
           <a:xfrm>
             <a:off x="1512360" y="3132360"/>
-            <a:ext cx="1434960" cy="858960"/>
+            <a:ext cx="1434600" cy="858600"/>
           </a:xfrm>
           <a:prstGeom prst="rect">
             <a:avLst/>
@@ -2079,14 +2295,14 @@
       </p:sp>
       <p:sp>
         <p:nvSpPr>
-          <p:cNvPr id="47" name="CustomShape 12"/>
+          <p:cNvPr id="49" name="CustomShape 12"/>
           <p:cNvSpPr/>
           <p:nvPr/>
         </p:nvSpPr>
         <p:spPr>
           <a:xfrm>
             <a:off x="1512360" y="4140360"/>
-            <a:ext cx="1434960" cy="426960"/>
+            <a:ext cx="1434600" cy="426600"/>
           </a:xfrm>
           <a:prstGeom prst="rect">
             <a:avLst/>
@@ -2134,14 +2350,14 @@
       </p:sp>
       <p:sp>
         <p:nvSpPr>
-          <p:cNvPr id="48" name="CustomShape 13"/>
+          <p:cNvPr id="50" name="CustomShape 13"/>
           <p:cNvSpPr/>
           <p:nvPr/>
         </p:nvSpPr>
         <p:spPr>
           <a:xfrm>
             <a:off x="1512360" y="4824360"/>
-            <a:ext cx="1434960" cy="426960"/>
+            <a:ext cx="1434600" cy="426600"/>
           </a:xfrm>
           <a:prstGeom prst="rect">
             <a:avLst/>
@@ -2189,14 +2405,14 @@
       </p:sp>
       <p:sp>
         <p:nvSpPr>
-          <p:cNvPr id="49" name="CustomShape 14"/>
+          <p:cNvPr id="51" name="CustomShape 14"/>
           <p:cNvSpPr/>
           <p:nvPr/>
         </p:nvSpPr>
         <p:spPr>
           <a:xfrm>
             <a:off x="1512360" y="5472360"/>
-            <a:ext cx="1434960" cy="426960"/>
+            <a:ext cx="1434600" cy="426600"/>
           </a:xfrm>
           <a:prstGeom prst="rect">
             <a:avLst/>
@@ -2244,14 +2460,14 @@
       </p:sp>
       <p:sp>
         <p:nvSpPr>
-          <p:cNvPr id="50" name="CustomShape 15"/>
+          <p:cNvPr id="52" name="CustomShape 15"/>
           <p:cNvSpPr/>
           <p:nvPr/>
         </p:nvSpPr>
         <p:spPr>
           <a:xfrm>
             <a:off x="1512360" y="6113880"/>
-            <a:ext cx="1434960" cy="433440"/>
+            <a:ext cx="1434600" cy="433080"/>
           </a:xfrm>
           <a:prstGeom prst="rect">
             <a:avLst/>
@@ -2299,7 +2515,7 @@
       </p:sp>
       <p:sp>
         <p:nvSpPr>
-          <p:cNvPr id="51" name="Line 16"/>
+          <p:cNvPr id="53" name="Line 16"/>
           <p:cNvSpPr/>
           <p:nvPr/>
         </p:nvSpPr>
@@ -2353,7 +2569,7 @@
       </p:sp>
       <p:sp>
         <p:nvSpPr>
-          <p:cNvPr id="52" name="Line 17"/>
+          <p:cNvPr id="54" name="Line 17"/>
           <p:cNvSpPr/>
           <p:nvPr/>
         </p:nvSpPr>
@@ -2407,7 +2623,7 @@
       </p:sp>
       <p:sp>
         <p:nvSpPr>
-          <p:cNvPr id="53" name="Line 18"/>
+          <p:cNvPr id="55" name="Line 18"/>
           <p:cNvSpPr/>
           <p:nvPr/>
         </p:nvSpPr>
@@ -2461,7 +2677,7 @@
       </p:sp>
       <p:sp>
         <p:nvSpPr>
-          <p:cNvPr id="54" name="Line 19"/>
+          <p:cNvPr id="56" name="Line 19"/>
           <p:cNvSpPr/>
           <p:nvPr/>
         </p:nvSpPr>
@@ -2515,7 +2731,7 @@
       </p:sp>
       <p:sp>
         <p:nvSpPr>
-          <p:cNvPr id="55" name="Line 20"/>
+          <p:cNvPr id="57" name="Line 20"/>
           <p:cNvSpPr/>
           <p:nvPr/>
         </p:nvSpPr>
@@ -2569,14 +2785,14 @@
       </p:sp>
       <p:sp>
         <p:nvSpPr>
-          <p:cNvPr id="56" name="CustomShape 21"/>
+          <p:cNvPr id="58" name="CustomShape 21"/>
           <p:cNvSpPr/>
           <p:nvPr/>
         </p:nvSpPr>
         <p:spPr>
           <a:xfrm rot="16200000">
-            <a:off x="2807640" y="3349080"/>
-            <a:ext cx="858960" cy="426960"/>
+            <a:off x="2807640" y="3349440"/>
+            <a:ext cx="858600" cy="426600"/>
           </a:xfrm>
           <a:prstGeom prst="rect">
             <a:avLst/>
@@ -2624,14 +2840,14 @@
       </p:sp>
       <p:sp>
         <p:nvSpPr>
-          <p:cNvPr id="57" name="CustomShape 22"/>
+          <p:cNvPr id="59" name="CustomShape 22"/>
           <p:cNvSpPr/>
           <p:nvPr/>
         </p:nvSpPr>
         <p:spPr>
           <a:xfrm rot="16200000">
-            <a:off x="288360" y="3353400"/>
-            <a:ext cx="858960" cy="426960"/>
+            <a:off x="288360" y="3353760"/>
+            <a:ext cx="858600" cy="426600"/>
           </a:xfrm>
           <a:prstGeom prst="rect">
             <a:avLst/>
@@ -2679,7 +2895,7 @@
       </p:sp>
       <p:sp>
         <p:nvSpPr>
-          <p:cNvPr id="58" name="Line 23"/>
+          <p:cNvPr id="60" name="Line 23"/>
           <p:cNvSpPr/>
           <p:nvPr/>
         </p:nvSpPr>
@@ -2733,7 +2949,7 @@
       </p:sp>
       <p:sp>
         <p:nvSpPr>
-          <p:cNvPr id="59" name="Line 24"/>
+          <p:cNvPr id="61" name="Line 24"/>
           <p:cNvSpPr/>
           <p:nvPr/>
         </p:nvSpPr>
@@ -2787,7 +3003,7 @@
       </p:sp>
       <p:sp>
         <p:nvSpPr>
-          <p:cNvPr id="60" name="Line 25"/>
+          <p:cNvPr id="62" name="Line 25"/>
           <p:cNvSpPr/>
           <p:nvPr/>
         </p:nvSpPr>
@@ -2816,7 +3032,7 @@
       </p:sp>
       <p:sp>
         <p:nvSpPr>
-          <p:cNvPr id="61" name="Line 26"/>
+          <p:cNvPr id="63" name="Line 26"/>
           <p:cNvSpPr/>
           <p:nvPr/>
         </p:nvSpPr>
@@ -2845,7 +3061,7 @@
       </p:sp>
       <p:sp>
         <p:nvSpPr>
-          <p:cNvPr id="62" name="Line 27"/>
+          <p:cNvPr id="64" name="Line 27"/>
           <p:cNvSpPr/>
           <p:nvPr/>
         </p:nvSpPr>
@@ -2873,14 +3089,14 @@
       </p:sp>
       <p:sp>
         <p:nvSpPr>
-          <p:cNvPr id="63" name="CustomShape 28"/>
+          <p:cNvPr id="65" name="CustomShape 28"/>
           <p:cNvSpPr/>
           <p:nvPr/>
         </p:nvSpPr>
         <p:spPr>
           <a:xfrm rot="16200000">
-            <a:off x="5690160" y="2633400"/>
-            <a:ext cx="1290960" cy="570960"/>
+            <a:off x="5690160" y="2633760"/>
+            <a:ext cx="1290600" cy="570600"/>
           </a:xfrm>
           <a:prstGeom prst="rect">
             <a:avLst/>
@@ -2948,7 +3164,7 @@
       </p:sp>
       <p:sp>
         <p:nvSpPr>
-          <p:cNvPr id="64" name="Line 29"/>
+          <p:cNvPr id="66" name="Line 29"/>
           <p:cNvSpPr/>
           <p:nvPr/>
         </p:nvSpPr>
@@ -2977,7 +3193,7 @@
       </p:sp>
       <p:sp>
         <p:nvSpPr>
-          <p:cNvPr id="65" name="Line 30"/>
+          <p:cNvPr id="67" name="Line 30"/>
           <p:cNvSpPr/>
           <p:nvPr/>
         </p:nvSpPr>
@@ -3031,7 +3247,7 @@
       </p:sp>
       <p:sp>
         <p:nvSpPr>
-          <p:cNvPr id="66" name="Line 31"/>
+          <p:cNvPr id="68" name="Line 31"/>
           <p:cNvSpPr/>
           <p:nvPr/>
         </p:nvSpPr>
@@ -3085,7 +3301,7 @@
       </p:sp>
       <p:sp>
         <p:nvSpPr>
-          <p:cNvPr id="67" name="Line 32"/>
+          <p:cNvPr id="69" name="Line 32"/>
           <p:cNvSpPr/>
           <p:nvPr/>
         </p:nvSpPr>
@@ -3139,7 +3355,7 @@
       </p:sp>
       <p:sp>
         <p:nvSpPr>
-          <p:cNvPr id="68" name="Line 33"/>
+          <p:cNvPr id="70" name="Line 33"/>
           <p:cNvSpPr/>
           <p:nvPr/>
         </p:nvSpPr>
@@ -3193,7 +3409,7 @@
       </p:sp>
       <p:sp>
         <p:nvSpPr>
-          <p:cNvPr id="69" name="Line 34"/>
+          <p:cNvPr id="71" name="Line 34"/>
           <p:cNvSpPr/>
           <p:nvPr/>
         </p:nvSpPr>
@@ -3247,7 +3463,7 @@
       </p:sp>
       <p:sp>
         <p:nvSpPr>
-          <p:cNvPr id="70" name="Line 35"/>
+          <p:cNvPr id="72" name="Line 35"/>
           <p:cNvSpPr/>
           <p:nvPr/>
         </p:nvSpPr>
@@ -3301,7 +3517,7 @@
       </p:sp>
       <p:sp>
         <p:nvSpPr>
-          <p:cNvPr id="71" name="Line 36"/>
+          <p:cNvPr id="73" name="Line 36"/>
           <p:cNvSpPr/>
           <p:nvPr/>
         </p:nvSpPr>
@@ -3355,7 +3571,7 @@
       </p:sp>
       <p:sp>
         <p:nvSpPr>
-          <p:cNvPr id="72" name="Line 37"/>
+          <p:cNvPr id="74" name="Line 37"/>
           <p:cNvSpPr/>
           <p:nvPr/>
         </p:nvSpPr>
@@ -3409,7 +3625,7 @@
       </p:sp>
       <p:sp>
         <p:nvSpPr>
-          <p:cNvPr id="73" name="Line 38"/>
+          <p:cNvPr id="75" name="Line 38"/>
           <p:cNvSpPr/>
           <p:nvPr/>
         </p:nvSpPr>
@@ -3463,7 +3679,7 @@
       </p:sp>
       <p:sp>
         <p:nvSpPr>
-          <p:cNvPr id="74" name="Line 39"/>
+          <p:cNvPr id="76" name="Line 39"/>
           <p:cNvSpPr/>
           <p:nvPr/>
         </p:nvSpPr>
@@ -3517,7 +3733,7 @@
       </p:sp>
       <p:sp>
         <p:nvSpPr>
-          <p:cNvPr id="75" name="Line 40"/>
+          <p:cNvPr id="77" name="Line 40"/>
           <p:cNvSpPr/>
           <p:nvPr/>
         </p:nvSpPr>
@@ -3571,14 +3787,14 @@
       </p:sp>
       <p:sp>
         <p:nvSpPr>
-          <p:cNvPr id="76" name="CustomShape 41"/>
+          <p:cNvPr id="78" name="CustomShape 41"/>
           <p:cNvSpPr/>
           <p:nvPr/>
         </p:nvSpPr>
         <p:spPr>
           <a:xfrm>
             <a:off x="1518840" y="324360"/>
-            <a:ext cx="1434960" cy="426960"/>
+            <a:ext cx="1434600" cy="426600"/>
           </a:xfrm>
           <a:prstGeom prst="rect">
             <a:avLst/>
@@ -3646,7 +3862,7 @@
       </p:sp>
       <p:sp>
         <p:nvSpPr>
-          <p:cNvPr id="77" name="Line 42"/>
+          <p:cNvPr id="79" name="Line 42"/>
           <p:cNvSpPr/>
           <p:nvPr/>
         </p:nvSpPr>
@@ -3675,7 +3891,7 @@
       </p:sp>
       <p:sp>
         <p:nvSpPr>
-          <p:cNvPr id="78" name="Line 43"/>
+          <p:cNvPr id="80" name="Line 43"/>
           <p:cNvSpPr/>
           <p:nvPr/>
         </p:nvSpPr>
@@ -3703,7 +3919,7 @@
       </p:sp>
       <p:sp>
         <p:nvSpPr>
-          <p:cNvPr id="79" name="Line 44"/>
+          <p:cNvPr id="81" name="Line 44"/>
           <p:cNvSpPr/>
           <p:nvPr/>
         </p:nvSpPr>
@@ -3732,14 +3948,14 @@
       </p:sp>
       <p:sp>
         <p:nvSpPr>
-          <p:cNvPr id="80" name="CustomShape 45"/>
+          <p:cNvPr id="82" name="CustomShape 45"/>
           <p:cNvSpPr/>
           <p:nvPr/>
         </p:nvSpPr>
         <p:spPr>
           <a:xfrm>
             <a:off x="4566960" y="324000"/>
-            <a:ext cx="526680" cy="302760"/>
+            <a:ext cx="526320" cy="302760"/>
           </a:xfrm>
           <a:prstGeom prst="rect">
             <a:avLst/>
@@ -3803,14 +4019,14 @@
       </p:sp>
       <p:sp>
         <p:nvSpPr>
-          <p:cNvPr id="81" name="CustomShape 46"/>
+          <p:cNvPr id="83" name="CustomShape 46"/>
           <p:cNvSpPr/>
           <p:nvPr/>
         </p:nvSpPr>
         <p:spPr>
           <a:xfrm>
             <a:off x="9670680" y="324360"/>
-            <a:ext cx="695160" cy="302760"/>
+            <a:ext cx="694800" cy="302760"/>
           </a:xfrm>
           <a:prstGeom prst="rect">
             <a:avLst/>
@@ -3874,14 +4090,14 @@
       </p:sp>
       <p:sp>
         <p:nvSpPr>
-          <p:cNvPr id="82" name="CustomShape 47"/>
-          <p:cNvSpPr/>
-          <p:nvPr/>
-        </p:nvSpPr>
-        <p:spPr>
-          <a:xfrm>
-            <a:off x="3251520" y="2448360"/>
-            <a:ext cx="1152000" cy="546120"/>
+          <p:cNvPr id="84" name="CustomShape 47"/>
+          <p:cNvSpPr/>
+          <p:nvPr/>
+        </p:nvSpPr>
+        <p:spPr>
+          <a:xfrm>
+            <a:off x="448560" y="4356360"/>
+            <a:ext cx="1151640" cy="318600"/>
           </a:xfrm>
           <a:prstGeom prst="rect">
             <a:avLst/>
@@ -3902,7 +4118,7 @@
             <a:spAutoFit/>
           </a:bodyPr>
           <a:p>
-            <a:pPr algn="r">
+            <a:pPr>
               <a:lnSpc>
                 <a:spcPct val="100000"/>
               </a:lnSpc>
@@ -3915,44 +4131,24 @@
                 <a:latin typeface="Arial"/>
                 <a:ea typeface="DejaVu Sans"/>
               </a:rPr>
-              <a:t>Arithmetic</a:t>
+              <a:t>ALU</a:t>
             </a:r>
             <a:endParaRPr b="0" lang="de-DE" sz="1500" spc="-1" strike="noStrike">
               <a:latin typeface="Arial"/>
             </a:endParaRPr>
           </a:p>
-          <a:p>
-            <a:pPr algn="r">
-              <a:lnSpc>
-                <a:spcPct val="100000"/>
-              </a:lnSpc>
-            </a:pPr>
-            <a:r>
-              <a:rPr b="0" lang="de-DE" sz="1500" spc="-1" strike="noStrike">
-                <a:solidFill>
-                  <a:srgbClr val="000000"/>
-                </a:solidFill>
-                <a:latin typeface="Arial"/>
-                <a:ea typeface="DejaVu Sans"/>
-              </a:rPr>
-              <a:t>Logic Unit</a:t>
-            </a:r>
-            <a:endParaRPr b="0" lang="de-DE" sz="1500" spc="-1" strike="noStrike">
-              <a:latin typeface="Arial"/>
-            </a:endParaRPr>
-          </a:p>
-        </p:txBody>
-      </p:sp>
-      <p:sp>
-        <p:nvSpPr>
-          <p:cNvPr id="83" name="CustomShape 48"/>
+        </p:txBody>
+      </p:sp>
+      <p:sp>
+        <p:nvSpPr>
+          <p:cNvPr id="85" name="CustomShape 48"/>
           <p:cNvSpPr/>
           <p:nvPr/>
         </p:nvSpPr>
         <p:spPr>
           <a:xfrm>
             <a:off x="8656560" y="3348000"/>
-            <a:ext cx="930960" cy="317880"/>
+            <a:ext cx="930600" cy="317880"/>
           </a:xfrm>
           <a:prstGeom prst="rect">
             <a:avLst/>
@@ -3996,14 +4192,14 @@
       </p:sp>
       <p:sp>
         <p:nvSpPr>
-          <p:cNvPr id="84" name="CustomShape 49"/>
+          <p:cNvPr id="86" name="CustomShape 49"/>
           <p:cNvSpPr/>
           <p:nvPr/>
         </p:nvSpPr>
         <p:spPr>
           <a:xfrm>
             <a:off x="1464480" y="1116360"/>
-            <a:ext cx="397440" cy="241560"/>
+            <a:ext cx="397080" cy="241560"/>
           </a:xfrm>
           <a:prstGeom prst="rect">
             <a:avLst/>
@@ -4067,14 +4263,14 @@
       </p:sp>
       <p:sp>
         <p:nvSpPr>
-          <p:cNvPr id="85" name="CustomShape 50"/>
+          <p:cNvPr id="87" name="CustomShape 50"/>
           <p:cNvSpPr/>
           <p:nvPr/>
         </p:nvSpPr>
         <p:spPr>
           <a:xfrm>
             <a:off x="6641280" y="885960"/>
-            <a:ext cx="1046880" cy="469440"/>
+            <a:ext cx="1046520" cy="469440"/>
           </a:xfrm>
           <a:prstGeom prst="rect">
             <a:avLst/>
@@ -4198,14 +4394,14 @@
       </p:sp>
       <p:sp>
         <p:nvSpPr>
-          <p:cNvPr id="86" name="CustomShape 51"/>
+          <p:cNvPr id="88" name="CustomShape 51"/>
           <p:cNvSpPr/>
           <p:nvPr/>
         </p:nvSpPr>
         <p:spPr>
           <a:xfrm>
             <a:off x="1450080" y="6408360"/>
-            <a:ext cx="303840" cy="165600"/>
+            <a:ext cx="303480" cy="165600"/>
           </a:xfrm>
           <a:prstGeom prst="rect">
             <a:avLst/>
@@ -4249,14 +4445,14 @@
       </p:sp>
       <p:sp>
         <p:nvSpPr>
-          <p:cNvPr id="87" name="CustomShape 52"/>
+          <p:cNvPr id="89" name="CustomShape 52"/>
           <p:cNvSpPr/>
           <p:nvPr/>
         </p:nvSpPr>
         <p:spPr>
           <a:xfrm>
             <a:off x="1450080" y="5760360"/>
-            <a:ext cx="303840" cy="165600"/>
+            <a:ext cx="303480" cy="165600"/>
           </a:xfrm>
           <a:prstGeom prst="rect">
             <a:avLst/>
@@ -4300,14 +4496,14 @@
       </p:sp>
       <p:sp>
         <p:nvSpPr>
-          <p:cNvPr id="88" name="CustomShape 53"/>
+          <p:cNvPr id="90" name="CustomShape 53"/>
           <p:cNvSpPr/>
           <p:nvPr/>
         </p:nvSpPr>
         <p:spPr>
           <a:xfrm>
             <a:off x="1450080" y="5112360"/>
-            <a:ext cx="303840" cy="165600"/>
+            <a:ext cx="303480" cy="165600"/>
           </a:xfrm>
           <a:prstGeom prst="rect">
             <a:avLst/>
@@ -4351,14 +4547,14 @@
       </p:sp>
       <p:sp>
         <p:nvSpPr>
-          <p:cNvPr id="89" name="CustomShape 54"/>
+          <p:cNvPr id="91" name="CustomShape 54"/>
           <p:cNvSpPr/>
           <p:nvPr/>
         </p:nvSpPr>
         <p:spPr>
           <a:xfrm>
             <a:off x="434880" y="3794760"/>
-            <a:ext cx="397800" cy="241560"/>
+            <a:ext cx="397440" cy="241560"/>
           </a:xfrm>
           <a:prstGeom prst="rect">
             <a:avLst/>
@@ -4422,14 +4618,14 @@
       </p:sp>
       <p:sp>
         <p:nvSpPr>
-          <p:cNvPr id="90" name="CustomShape 55"/>
+          <p:cNvPr id="92" name="CustomShape 55"/>
           <p:cNvSpPr/>
           <p:nvPr/>
         </p:nvSpPr>
         <p:spPr>
           <a:xfrm>
             <a:off x="1457280" y="1836360"/>
-            <a:ext cx="303840" cy="165600"/>
+            <a:ext cx="303480" cy="165600"/>
           </a:xfrm>
           <a:prstGeom prst="rect">
             <a:avLst/>
@@ -4473,14 +4669,14 @@
       </p:sp>
       <p:sp>
         <p:nvSpPr>
-          <p:cNvPr id="91" name="CustomShape 56"/>
+          <p:cNvPr id="93" name="CustomShape 56"/>
           <p:cNvSpPr/>
           <p:nvPr/>
         </p:nvSpPr>
         <p:spPr>
           <a:xfrm>
             <a:off x="1457280" y="2844360"/>
-            <a:ext cx="303840" cy="165600"/>
+            <a:ext cx="303480" cy="165600"/>
           </a:xfrm>
           <a:prstGeom prst="rect">
             <a:avLst/>
@@ -4524,14 +4720,14 @@
       </p:sp>
       <p:sp>
         <p:nvSpPr>
-          <p:cNvPr id="92" name="CustomShape 57"/>
-          <p:cNvSpPr/>
-          <p:nvPr/>
-        </p:nvSpPr>
-        <p:spPr>
-          <a:xfrm>
-            <a:off x="1450080" y="4428360"/>
-            <a:ext cx="303840" cy="165600"/>
+          <p:cNvPr id="94" name="CustomShape 57"/>
+          <p:cNvSpPr/>
+          <p:nvPr/>
+        </p:nvSpPr>
+        <p:spPr>
+          <a:xfrm>
+            <a:off x="1456920" y="4349520"/>
+            <a:ext cx="421920" cy="242280"/>
           </a:xfrm>
           <a:prstGeom prst="rect">
             <a:avLst/>
@@ -4571,18 +4767,38 @@
               <a:latin typeface="Arial"/>
             </a:endParaRPr>
           </a:p>
-        </p:txBody>
-      </p:sp>
-      <p:sp>
-        <p:nvSpPr>
-          <p:cNvPr id="93" name="CustomShape 58"/>
+          <a:p>
+            <a:pPr>
+              <a:lnSpc>
+                <a:spcPct val="100000"/>
+              </a:lnSpc>
+            </a:pPr>
+            <a:r>
+              <a:rPr b="0" lang="de-DE" sz="500" spc="-1" strike="noStrike">
+                <a:solidFill>
+                  <a:srgbClr val="000000"/>
+                </a:solidFill>
+                <a:latin typeface="Arial"/>
+                <a:ea typeface="DejaVu Sans"/>
+              </a:rPr>
+              <a:t>Y_RST</a:t>
+            </a:r>
+            <a:endParaRPr b="0" lang="de-DE" sz="500" spc="-1" strike="noStrike">
+              <a:latin typeface="Arial"/>
+            </a:endParaRPr>
+          </a:p>
+        </p:txBody>
+      </p:sp>
+      <p:sp>
+        <p:nvSpPr>
+          <p:cNvPr id="95" name="CustomShape 58"/>
           <p:cNvSpPr/>
           <p:nvPr/>
         </p:nvSpPr>
         <p:spPr>
           <a:xfrm>
             <a:off x="6641280" y="1757160"/>
-            <a:ext cx="1118880" cy="393480"/>
+            <a:ext cx="1118520" cy="393480"/>
           </a:xfrm>
           <a:prstGeom prst="rect">
             <a:avLst/>
@@ -4686,14 +4902,14 @@
       </p:sp>
       <p:sp>
         <p:nvSpPr>
-          <p:cNvPr id="94" name="CustomShape 59"/>
+          <p:cNvPr id="96" name="CustomShape 59"/>
           <p:cNvSpPr/>
           <p:nvPr/>
         </p:nvSpPr>
         <p:spPr>
           <a:xfrm>
             <a:off x="6655680" y="3402360"/>
-            <a:ext cx="303840" cy="165600"/>
+            <a:ext cx="303480" cy="165600"/>
           </a:xfrm>
           <a:prstGeom prst="rect">
             <a:avLst/>
@@ -4737,14 +4953,14 @@
       </p:sp>
       <p:sp>
         <p:nvSpPr>
-          <p:cNvPr id="95" name="CustomShape 60"/>
+          <p:cNvPr id="97" name="CustomShape 60"/>
           <p:cNvSpPr/>
           <p:nvPr/>
         </p:nvSpPr>
         <p:spPr>
           <a:xfrm>
             <a:off x="1450080" y="3780360"/>
-            <a:ext cx="447840" cy="241560"/>
+            <a:ext cx="447480" cy="241560"/>
           </a:xfrm>
           <a:prstGeom prst="rect">
             <a:avLst/>
@@ -4808,7 +5024,7 @@
       </p:sp>
       <p:sp>
         <p:nvSpPr>
-          <p:cNvPr id="96" name="Line 61"/>
+          <p:cNvPr id="98" name="Line 61"/>
           <p:cNvSpPr/>
           <p:nvPr/>
         </p:nvSpPr>
@@ -4836,14 +5052,14 @@
       </p:sp>
       <p:sp>
         <p:nvSpPr>
-          <p:cNvPr id="97" name="CustomShape 62"/>
+          <p:cNvPr id="99" name="CustomShape 62"/>
           <p:cNvSpPr/>
           <p:nvPr/>
         </p:nvSpPr>
         <p:spPr>
           <a:xfrm>
             <a:off x="6702840" y="5428080"/>
-            <a:ext cx="1434960" cy="570960"/>
+            <a:ext cx="1434600" cy="570600"/>
           </a:xfrm>
           <a:prstGeom prst="rect">
             <a:avLst/>
@@ -4921,7 +5137,7 @@
       </p:sp>
       <p:sp>
         <p:nvSpPr>
-          <p:cNvPr id="98" name="Line 63"/>
+          <p:cNvPr id="100" name="Line 63"/>
           <p:cNvSpPr/>
           <p:nvPr/>
         </p:nvSpPr>
@@ -4975,7 +5191,7 @@
       </p:sp>
       <p:sp>
         <p:nvSpPr>
-          <p:cNvPr id="99" name="Line 64"/>
+          <p:cNvPr id="101" name="Line 64"/>
           <p:cNvSpPr/>
           <p:nvPr/>
         </p:nvSpPr>
@@ -5029,14 +5245,14 @@
       </p:sp>
       <p:sp>
         <p:nvSpPr>
-          <p:cNvPr id="100" name="CustomShape 65"/>
+          <p:cNvPr id="102" name="CustomShape 65"/>
           <p:cNvSpPr/>
           <p:nvPr/>
         </p:nvSpPr>
         <p:spPr>
           <a:xfrm>
             <a:off x="1454760" y="460440"/>
-            <a:ext cx="448920" cy="317520"/>
+            <a:ext cx="448560" cy="317520"/>
           </a:xfrm>
           <a:prstGeom prst="rect">
             <a:avLst/>
@@ -5120,7 +5336,7 @@
       </p:sp>
       <p:sp>
         <p:nvSpPr>
-          <p:cNvPr id="101" name="Line 66"/>
+          <p:cNvPr id="103" name="Line 66"/>
           <p:cNvSpPr/>
           <p:nvPr/>
         </p:nvSpPr>
@@ -5148,14 +5364,14 @@
       </p:sp>
       <p:sp>
         <p:nvSpPr>
-          <p:cNvPr id="102" name="CustomShape 67"/>
+          <p:cNvPr id="104" name="CustomShape 67"/>
           <p:cNvSpPr/>
           <p:nvPr/>
         </p:nvSpPr>
         <p:spPr>
           <a:xfrm>
             <a:off x="2798640" y="887040"/>
-            <a:ext cx="303840" cy="165600"/>
+            <a:ext cx="303480" cy="165600"/>
           </a:xfrm>
           <a:prstGeom prst="rect">
             <a:avLst/>
@@ -5199,14 +5415,14 @@
       </p:sp>
       <p:sp>
         <p:nvSpPr>
-          <p:cNvPr id="103" name="CustomShape 68"/>
+          <p:cNvPr id="105" name="CustomShape 68"/>
           <p:cNvSpPr/>
           <p:nvPr/>
         </p:nvSpPr>
         <p:spPr>
           <a:xfrm>
             <a:off x="2798640" y="1526400"/>
-            <a:ext cx="303840" cy="165600"/>
+            <a:ext cx="303480" cy="165600"/>
           </a:xfrm>
           <a:prstGeom prst="rect">
             <a:avLst/>
@@ -5250,14 +5466,14 @@
       </p:sp>
       <p:sp>
         <p:nvSpPr>
-          <p:cNvPr id="104" name="CustomShape 69"/>
+          <p:cNvPr id="106" name="CustomShape 69"/>
           <p:cNvSpPr/>
           <p:nvPr/>
         </p:nvSpPr>
         <p:spPr>
           <a:xfrm>
             <a:off x="2798640" y="2534400"/>
-            <a:ext cx="303840" cy="165600"/>
+            <a:ext cx="303480" cy="165600"/>
           </a:xfrm>
           <a:prstGeom prst="rect">
             <a:avLst/>
@@ -5301,14 +5517,14 @@
       </p:sp>
       <p:sp>
         <p:nvSpPr>
-          <p:cNvPr id="105" name="CustomShape 70"/>
+          <p:cNvPr id="107" name="CustomShape 70"/>
           <p:cNvSpPr/>
           <p:nvPr/>
         </p:nvSpPr>
         <p:spPr>
           <a:xfrm>
             <a:off x="2798640" y="4118760"/>
-            <a:ext cx="303840" cy="165600"/>
+            <a:ext cx="303480" cy="165600"/>
           </a:xfrm>
           <a:prstGeom prst="rect">
             <a:avLst/>
@@ -5352,14 +5568,14 @@
       </p:sp>
       <p:sp>
         <p:nvSpPr>
-          <p:cNvPr id="106" name="CustomShape 71"/>
+          <p:cNvPr id="108" name="CustomShape 71"/>
           <p:cNvSpPr/>
           <p:nvPr/>
         </p:nvSpPr>
         <p:spPr>
           <a:xfrm>
             <a:off x="2798640" y="4802760"/>
-            <a:ext cx="303840" cy="165600"/>
+            <a:ext cx="303480" cy="165600"/>
           </a:xfrm>
           <a:prstGeom prst="rect">
             <a:avLst/>
@@ -5403,14 +5619,14 @@
       </p:sp>
       <p:sp>
         <p:nvSpPr>
-          <p:cNvPr id="107" name="CustomShape 72"/>
+          <p:cNvPr id="109" name="CustomShape 72"/>
           <p:cNvSpPr/>
           <p:nvPr/>
         </p:nvSpPr>
         <p:spPr>
           <a:xfrm>
             <a:off x="2798640" y="5457240"/>
-            <a:ext cx="303840" cy="165600"/>
+            <a:ext cx="303480" cy="165600"/>
           </a:xfrm>
           <a:prstGeom prst="rect">
             <a:avLst/>
@@ -5454,14 +5670,14 @@
       </p:sp>
       <p:sp>
         <p:nvSpPr>
-          <p:cNvPr id="108" name="CustomShape 73"/>
+          <p:cNvPr id="110" name="CustomShape 73"/>
           <p:cNvSpPr/>
           <p:nvPr/>
         </p:nvSpPr>
         <p:spPr>
           <a:xfrm>
             <a:off x="2798640" y="6093360"/>
-            <a:ext cx="303840" cy="165600"/>
+            <a:ext cx="303480" cy="165600"/>
           </a:xfrm>
           <a:prstGeom prst="rect">
             <a:avLst/>
@@ -5505,14 +5721,14 @@
       </p:sp>
       <p:sp>
         <p:nvSpPr>
-          <p:cNvPr id="109" name="CustomShape 74"/>
+          <p:cNvPr id="111" name="CustomShape 74"/>
           <p:cNvSpPr/>
           <p:nvPr/>
         </p:nvSpPr>
         <p:spPr>
           <a:xfrm>
             <a:off x="3304440" y="3099600"/>
-            <a:ext cx="303840" cy="165600"/>
+            <a:ext cx="303480" cy="165600"/>
           </a:xfrm>
           <a:prstGeom prst="rect">
             <a:avLst/>
@@ -5556,14 +5772,14 @@
       </p:sp>
       <p:sp>
         <p:nvSpPr>
-          <p:cNvPr id="110" name="CustomShape 75"/>
+          <p:cNvPr id="112" name="CustomShape 75"/>
           <p:cNvSpPr/>
           <p:nvPr/>
         </p:nvSpPr>
         <p:spPr>
           <a:xfrm>
             <a:off x="779040" y="3108960"/>
-            <a:ext cx="303840" cy="165600"/>
+            <a:ext cx="303480" cy="165600"/>
           </a:xfrm>
           <a:prstGeom prst="rect">
             <a:avLst/>
@@ -5607,14 +5823,14 @@
       </p:sp>
       <p:sp>
         <p:nvSpPr>
-          <p:cNvPr id="111" name="CustomShape 76"/>
+          <p:cNvPr id="113" name="CustomShape 76"/>
           <p:cNvSpPr/>
           <p:nvPr/>
         </p:nvSpPr>
         <p:spPr>
           <a:xfrm>
             <a:off x="7949160" y="734400"/>
-            <a:ext cx="303840" cy="165600"/>
+            <a:ext cx="303480" cy="165600"/>
           </a:xfrm>
           <a:prstGeom prst="rect">
             <a:avLst/>
@@ -5658,14 +5874,14 @@
       </p:sp>
       <p:sp>
         <p:nvSpPr>
-          <p:cNvPr id="112" name="CustomShape 77"/>
+          <p:cNvPr id="114" name="CustomShape 77"/>
           <p:cNvSpPr/>
           <p:nvPr/>
         </p:nvSpPr>
         <p:spPr>
           <a:xfrm>
             <a:off x="7949160" y="1526400"/>
-            <a:ext cx="303840" cy="165600"/>
+            <a:ext cx="303480" cy="165600"/>
           </a:xfrm>
           <a:prstGeom prst="rect">
             <a:avLst/>
@@ -5709,14 +5925,14 @@
       </p:sp>
       <p:sp>
         <p:nvSpPr>
-          <p:cNvPr id="113" name="CustomShape 78"/>
+          <p:cNvPr id="115" name="CustomShape 78"/>
           <p:cNvSpPr/>
           <p:nvPr/>
         </p:nvSpPr>
         <p:spPr>
           <a:xfrm>
             <a:off x="7955280" y="5400000"/>
-            <a:ext cx="303840" cy="165600"/>
+            <a:ext cx="303480" cy="165600"/>
           </a:xfrm>
           <a:prstGeom prst="rect">
             <a:avLst/>
@@ -5760,14 +5976,14 @@
       </p:sp>
       <p:sp>
         <p:nvSpPr>
-          <p:cNvPr id="114" name="CustomShape 79"/>
+          <p:cNvPr id="116" name="CustomShape 79"/>
           <p:cNvSpPr/>
           <p:nvPr/>
         </p:nvSpPr>
         <p:spPr>
           <a:xfrm>
             <a:off x="6466320" y="2245320"/>
-            <a:ext cx="303840" cy="165600"/>
+            <a:ext cx="303480" cy="165600"/>
           </a:xfrm>
           <a:prstGeom prst="rect">
             <a:avLst/>
@@ -5811,14 +6027,14 @@
       </p:sp>
       <p:sp>
         <p:nvSpPr>
-          <p:cNvPr id="115" name="CustomShape 80"/>
+          <p:cNvPr id="117" name="CustomShape 80"/>
           <p:cNvSpPr/>
           <p:nvPr/>
         </p:nvSpPr>
         <p:spPr>
           <a:xfrm>
             <a:off x="3024000" y="325080"/>
-            <a:ext cx="709200" cy="426960"/>
+            <a:ext cx="708840" cy="426600"/>
           </a:xfrm>
           <a:prstGeom prst="rect">
             <a:avLst/>
@@ -5866,7 +6082,7 @@
       </p:sp>
       <p:sp>
         <p:nvSpPr>
-          <p:cNvPr id="116" name="Line 81"/>
+          <p:cNvPr id="118" name="Line 81"/>
           <p:cNvSpPr/>
           <p:nvPr/>
         </p:nvSpPr>
@@ -5894,14 +6110,14 @@
       </p:sp>
       <p:sp>
         <p:nvSpPr>
-          <p:cNvPr id="117" name="CustomShape 82"/>
+          <p:cNvPr id="119" name="CustomShape 82"/>
           <p:cNvSpPr/>
           <p:nvPr/>
         </p:nvSpPr>
         <p:spPr>
           <a:xfrm>
             <a:off x="2957760" y="612000"/>
-            <a:ext cx="447840" cy="165600"/>
+            <a:ext cx="447480" cy="165600"/>
           </a:xfrm>
           <a:prstGeom prst="rect">
             <a:avLst/>
@@ -5945,7 +6161,7 @@
       </p:sp>
       <p:graphicFrame>
         <p:nvGraphicFramePr>
-          <p:cNvPr id="118" name="Table 83"/>
+          <p:cNvPr id="120" name="Table 83"/>
           <p:cNvGraphicFramePr/>
           <p:nvPr/>
         </p:nvGraphicFramePr>
@@ -6217,14 +6433,14 @@
       </p:graphicFrame>
       <p:sp>
         <p:nvSpPr>
-          <p:cNvPr id="119" name="CustomShape 84"/>
+          <p:cNvPr id="121" name="CustomShape 84"/>
           <p:cNvSpPr/>
           <p:nvPr/>
         </p:nvSpPr>
         <p:spPr>
           <a:xfrm>
             <a:off x="294120" y="6930000"/>
-            <a:ext cx="433440" cy="196200"/>
+            <a:ext cx="433080" cy="196200"/>
           </a:xfrm>
           <a:prstGeom prst="rect">
             <a:avLst/>
@@ -6268,14 +6484,14 @@
       </p:sp>
       <p:sp>
         <p:nvSpPr>
-          <p:cNvPr id="120" name="CustomShape 85"/>
+          <p:cNvPr id="122" name="CustomShape 85"/>
           <p:cNvSpPr/>
           <p:nvPr/>
         </p:nvSpPr>
         <p:spPr>
           <a:xfrm>
             <a:off x="6706080" y="3844080"/>
-            <a:ext cx="1434960" cy="570960"/>
+            <a:ext cx="1434600" cy="570600"/>
           </a:xfrm>
           <a:prstGeom prst="rect">
             <a:avLst/>
@@ -6323,7 +6539,7 @@
       </p:sp>
       <p:sp>
         <p:nvSpPr>
-          <p:cNvPr id="121" name="Line 86"/>
+          <p:cNvPr id="123" name="Line 86"/>
           <p:cNvSpPr/>
           <p:nvPr/>
         </p:nvSpPr>
@@ -6377,7 +6593,7 @@
       </p:sp>
       <p:sp>
         <p:nvSpPr>
-          <p:cNvPr id="122" name="Line 87"/>
+          <p:cNvPr id="124" name="Line 87"/>
           <p:cNvSpPr/>
           <p:nvPr/>
         </p:nvSpPr>
@@ -6431,14 +6647,14 @@
       </p:sp>
       <p:sp>
         <p:nvSpPr>
-          <p:cNvPr id="123" name="CustomShape 88"/>
+          <p:cNvPr id="125" name="CustomShape 88"/>
           <p:cNvSpPr/>
           <p:nvPr/>
         </p:nvSpPr>
         <p:spPr>
           <a:xfrm>
             <a:off x="6658920" y="4197600"/>
-            <a:ext cx="447840" cy="241560"/>
+            <a:ext cx="447480" cy="241560"/>
           </a:xfrm>
           <a:prstGeom prst="rect">
             <a:avLst/>
@@ -6502,14 +6718,14 @@
       </p:sp>
       <p:sp>
         <p:nvSpPr>
-          <p:cNvPr id="124" name="CustomShape 89"/>
+          <p:cNvPr id="126" name="CustomShape 89"/>
           <p:cNvSpPr/>
           <p:nvPr/>
         </p:nvSpPr>
         <p:spPr>
           <a:xfrm>
             <a:off x="7958520" y="3816000"/>
-            <a:ext cx="303840" cy="165600"/>
+            <a:ext cx="303480" cy="165600"/>
           </a:xfrm>
           <a:prstGeom prst="rect">
             <a:avLst/>
@@ -6553,14 +6769,14 @@
       </p:sp>
       <p:sp>
         <p:nvSpPr>
-          <p:cNvPr id="125" name="CustomShape 90"/>
+          <p:cNvPr id="127" name="CustomShape 90"/>
           <p:cNvSpPr/>
           <p:nvPr/>
         </p:nvSpPr>
         <p:spPr>
           <a:xfrm>
             <a:off x="6050160" y="3840840"/>
-            <a:ext cx="570960" cy="261360"/>
+            <a:ext cx="570600" cy="261000"/>
           </a:xfrm>
           <a:prstGeom prst="rect">
             <a:avLst/>
@@ -6608,14 +6824,14 @@
       </p:sp>
       <p:sp>
         <p:nvSpPr>
-          <p:cNvPr id="126" name="CustomShape 91"/>
+          <p:cNvPr id="128" name="CustomShape 91"/>
           <p:cNvSpPr/>
           <p:nvPr/>
         </p:nvSpPr>
         <p:spPr>
           <a:xfrm>
             <a:off x="6050160" y="4154400"/>
-            <a:ext cx="570960" cy="261360"/>
+            <a:ext cx="570600" cy="261000"/>
           </a:xfrm>
           <a:prstGeom prst="rect">
             <a:avLst/>
@@ -6663,7 +6879,7 @@
       </p:sp>
       <p:sp>
         <p:nvSpPr>
-          <p:cNvPr id="127" name="Line 92"/>
+          <p:cNvPr id="129" name="Line 92"/>
           <p:cNvSpPr/>
           <p:nvPr/>
         </p:nvSpPr>
@@ -6691,7 +6907,7 @@
       </p:sp>
       <p:sp>
         <p:nvSpPr>
-          <p:cNvPr id="128" name="Line 93"/>
+          <p:cNvPr id="130" name="Line 93"/>
           <p:cNvSpPr/>
           <p:nvPr/>
         </p:nvSpPr>
@@ -6719,14 +6935,14 @@
       </p:sp>
       <p:sp>
         <p:nvSpPr>
-          <p:cNvPr id="129" name="CustomShape 94"/>
+          <p:cNvPr id="131" name="CustomShape 94"/>
           <p:cNvSpPr/>
           <p:nvPr/>
         </p:nvSpPr>
         <p:spPr>
           <a:xfrm>
             <a:off x="6472800" y="3816000"/>
-            <a:ext cx="303840" cy="165600"/>
+            <a:ext cx="303480" cy="165600"/>
           </a:xfrm>
           <a:prstGeom prst="rect">
             <a:avLst/>
@@ -6770,14 +6986,14 @@
       </p:sp>
       <p:sp>
         <p:nvSpPr>
-          <p:cNvPr id="130" name="CustomShape 95"/>
+          <p:cNvPr id="132" name="CustomShape 95"/>
           <p:cNvSpPr/>
           <p:nvPr/>
         </p:nvSpPr>
         <p:spPr>
           <a:xfrm>
             <a:off x="6472800" y="4125600"/>
-            <a:ext cx="303840" cy="165600"/>
+            <a:ext cx="303480" cy="165600"/>
           </a:xfrm>
           <a:prstGeom prst="rect">
             <a:avLst/>
@@ -6821,14 +7037,14 @@
       </p:sp>
       <p:sp>
         <p:nvSpPr>
-          <p:cNvPr id="131" name="CustomShape 96"/>
+          <p:cNvPr id="133" name="CustomShape 96"/>
           <p:cNvSpPr/>
           <p:nvPr/>
         </p:nvSpPr>
         <p:spPr>
           <a:xfrm>
             <a:off x="6708960" y="4636080"/>
-            <a:ext cx="1434960" cy="570960"/>
+            <a:ext cx="1434600" cy="570600"/>
           </a:xfrm>
           <a:prstGeom prst="rect">
             <a:avLst/>
@@ -6906,7 +7122,7 @@
       </p:sp>
       <p:sp>
         <p:nvSpPr>
-          <p:cNvPr id="132" name="Line 97"/>
+          <p:cNvPr id="134" name="Line 97"/>
           <p:cNvSpPr/>
           <p:nvPr/>
         </p:nvSpPr>
@@ -6960,7 +7176,7 @@
       </p:sp>
       <p:sp>
         <p:nvSpPr>
-          <p:cNvPr id="133" name="Line 98"/>
+          <p:cNvPr id="135" name="Line 98"/>
           <p:cNvSpPr/>
           <p:nvPr/>
         </p:nvSpPr>
@@ -7014,14 +7230,14 @@
       </p:sp>
       <p:sp>
         <p:nvSpPr>
-          <p:cNvPr id="134" name="CustomShape 99"/>
+          <p:cNvPr id="136" name="CustomShape 99"/>
           <p:cNvSpPr/>
           <p:nvPr/>
         </p:nvSpPr>
         <p:spPr>
           <a:xfrm>
             <a:off x="7961400" y="4608000"/>
-            <a:ext cx="303840" cy="165600"/>
+            <a:ext cx="303480" cy="165600"/>
           </a:xfrm>
           <a:prstGeom prst="rect">
             <a:avLst/>
@@ -7065,14 +7281,14 @@
       </p:sp>
       <p:sp>
         <p:nvSpPr>
-          <p:cNvPr id="135" name="CustomShape 100"/>
+          <p:cNvPr id="137" name="CustomShape 100"/>
           <p:cNvSpPr/>
           <p:nvPr/>
         </p:nvSpPr>
         <p:spPr>
           <a:xfrm>
             <a:off x="6708960" y="3844080"/>
-            <a:ext cx="1434960" cy="570960"/>
+            <a:ext cx="1434600" cy="570600"/>
           </a:xfrm>
           <a:prstGeom prst="rect">
             <a:avLst/>
@@ -7120,14 +7336,14 @@
       </p:sp>
       <p:sp>
         <p:nvSpPr>
-          <p:cNvPr id="136" name="CustomShape 101"/>
+          <p:cNvPr id="138" name="CustomShape 101"/>
           <p:cNvSpPr/>
           <p:nvPr/>
         </p:nvSpPr>
         <p:spPr>
           <a:xfrm>
             <a:off x="6647400" y="4125600"/>
-            <a:ext cx="824400" cy="317520"/>
+            <a:ext cx="824040" cy="317520"/>
           </a:xfrm>
           <a:prstGeom prst="rect">
             <a:avLst/>
@@ -7211,14 +7427,14 @@
       </p:sp>
       <p:sp>
         <p:nvSpPr>
-          <p:cNvPr id="137" name="CustomShape 102"/>
+          <p:cNvPr id="139" name="CustomShape 102"/>
           <p:cNvSpPr/>
           <p:nvPr/>
         </p:nvSpPr>
         <p:spPr>
           <a:xfrm>
             <a:off x="7961400" y="3816000"/>
-            <a:ext cx="303840" cy="165600"/>
+            <a:ext cx="303480" cy="165600"/>
           </a:xfrm>
           <a:prstGeom prst="rect">
             <a:avLst/>
@@ -7262,14 +7478,14 @@
       </p:sp>
       <p:sp>
         <p:nvSpPr>
-          <p:cNvPr id="138" name="CustomShape 103"/>
+          <p:cNvPr id="140" name="CustomShape 103"/>
           <p:cNvSpPr/>
           <p:nvPr/>
         </p:nvSpPr>
         <p:spPr>
           <a:xfrm>
             <a:off x="6053040" y="3840840"/>
-            <a:ext cx="570960" cy="261360"/>
+            <a:ext cx="570600" cy="261000"/>
           </a:xfrm>
           <a:prstGeom prst="rect">
             <a:avLst/>
@@ -7317,14 +7533,14 @@
       </p:sp>
       <p:sp>
         <p:nvSpPr>
-          <p:cNvPr id="139" name="CustomShape 104"/>
+          <p:cNvPr id="141" name="CustomShape 104"/>
           <p:cNvSpPr/>
           <p:nvPr/>
         </p:nvSpPr>
         <p:spPr>
           <a:xfrm>
             <a:off x="6053040" y="4154400"/>
-            <a:ext cx="570960" cy="261360"/>
+            <a:ext cx="570600" cy="261000"/>
           </a:xfrm>
           <a:prstGeom prst="rect">
             <a:avLst/>
@@ -7372,7 +7588,7 @@
       </p:sp>
       <p:sp>
         <p:nvSpPr>
-          <p:cNvPr id="140" name="Line 105"/>
+          <p:cNvPr id="142" name="Line 105"/>
           <p:cNvSpPr/>
           <p:nvPr/>
         </p:nvSpPr>
@@ -7400,7 +7616,7 @@
       </p:sp>
       <p:sp>
         <p:nvSpPr>
-          <p:cNvPr id="141" name="Line 106"/>
+          <p:cNvPr id="143" name="Line 106"/>
           <p:cNvSpPr/>
           <p:nvPr/>
         </p:nvSpPr>
@@ -7428,14 +7644,14 @@
       </p:sp>
       <p:sp>
         <p:nvSpPr>
-          <p:cNvPr id="142" name="CustomShape 107"/>
+          <p:cNvPr id="144" name="CustomShape 107"/>
           <p:cNvSpPr/>
           <p:nvPr/>
         </p:nvSpPr>
         <p:spPr>
           <a:xfrm>
             <a:off x="6475680" y="3816000"/>
-            <a:ext cx="303840" cy="165600"/>
+            <a:ext cx="303480" cy="165600"/>
           </a:xfrm>
           <a:prstGeom prst="rect">
             <a:avLst/>
@@ -7479,14 +7695,14 @@
       </p:sp>
       <p:sp>
         <p:nvSpPr>
-          <p:cNvPr id="143" name="CustomShape 108"/>
+          <p:cNvPr id="145" name="CustomShape 108"/>
           <p:cNvSpPr/>
           <p:nvPr/>
         </p:nvSpPr>
         <p:spPr>
           <a:xfrm>
             <a:off x="6475680" y="4125600"/>
-            <a:ext cx="303840" cy="165600"/>
+            <a:ext cx="303480" cy="165600"/>
           </a:xfrm>
           <a:prstGeom prst="rect">
             <a:avLst/>
@@ -7530,7 +7746,7 @@
       </p:sp>
       <p:sp>
         <p:nvSpPr>
-          <p:cNvPr id="144" name="Line 109"/>
+          <p:cNvPr id="146" name="Line 109"/>
           <p:cNvSpPr/>
           <p:nvPr/>
         </p:nvSpPr>
@@ -7584,7 +7800,7 @@
       </p:sp>
       <p:sp>
         <p:nvSpPr>
-          <p:cNvPr id="145" name="Line 110"/>
+          <p:cNvPr id="147" name="Line 110"/>
           <p:cNvSpPr/>
           <p:nvPr/>
         </p:nvSpPr>
@@ -7638,14 +7854,14 @@
       </p:sp>
       <p:sp>
         <p:nvSpPr>
-          <p:cNvPr id="146" name="CustomShape 111"/>
-          <p:cNvSpPr/>
-          <p:nvPr/>
-        </p:nvSpPr>
-        <p:spPr>
-          <a:xfrm>
-            <a:off x="6647400" y="4917600"/>
-            <a:ext cx="824400" cy="317520"/>
+          <p:cNvPr id="148" name="CustomShape 111"/>
+          <p:cNvSpPr/>
+          <p:nvPr/>
+        </p:nvSpPr>
+        <p:spPr>
+          <a:xfrm>
+            <a:off x="6647400" y="4831920"/>
+            <a:ext cx="824040" cy="393480"/>
           </a:xfrm>
           <a:prstGeom prst="rect">
             <a:avLst/>
@@ -7725,18 +7941,38 @@
               <a:latin typeface="Arial"/>
             </a:endParaRPr>
           </a:p>
-        </p:txBody>
-      </p:sp>
-      <p:sp>
-        <p:nvSpPr>
-          <p:cNvPr id="147" name="CustomShape 112"/>
+          <a:p>
+            <a:pPr>
+              <a:lnSpc>
+                <a:spcPct val="100000"/>
+              </a:lnSpc>
+            </a:pPr>
+            <a:r>
+              <a:rPr b="0" lang="de-DE" sz="500" spc="-1" strike="noStrike">
+                <a:solidFill>
+                  <a:srgbClr val="000000"/>
+                </a:solidFill>
+                <a:latin typeface="Arial"/>
+                <a:ea typeface="DejaVu Sans"/>
+              </a:rPr>
+              <a:t>T_RST</a:t>
+            </a:r>
+            <a:endParaRPr b="0" lang="de-DE" sz="500" spc="-1" strike="noStrike">
+              <a:latin typeface="Arial"/>
+            </a:endParaRPr>
+          </a:p>
+        </p:txBody>
+      </p:sp>
+      <p:sp>
+        <p:nvSpPr>
+          <p:cNvPr id="149" name="CustomShape 112"/>
           <p:cNvSpPr/>
           <p:nvPr/>
         </p:nvSpPr>
         <p:spPr>
           <a:xfrm>
             <a:off x="6640200" y="5479200"/>
-            <a:ext cx="824400" cy="545400"/>
+            <a:ext cx="824040" cy="545400"/>
           </a:xfrm>
           <a:prstGeom prst="rect">
             <a:avLst/>
@@ -7880,7 +8116,7 @@
       </p:sp>
       <p:sp>
         <p:nvSpPr>
-          <p:cNvPr id="148" name="Line 113"/>
+          <p:cNvPr id="150" name="Line 113"/>
           <p:cNvSpPr/>
           <p:nvPr/>
         </p:nvSpPr>
@@ -7934,7 +8170,7 @@
       </p:sp>
       <p:sp>
         <p:nvSpPr>
-          <p:cNvPr id="149" name="Line 114"/>
+          <p:cNvPr id="151" name="Line 114"/>
           <p:cNvSpPr/>
           <p:nvPr/>
         </p:nvSpPr>
@@ -7988,7 +8224,7 @@
       </p:sp>
       <p:sp>
         <p:nvSpPr>
-          <p:cNvPr id="150" name="Line 115"/>
+          <p:cNvPr id="152" name="Line 115"/>
           <p:cNvSpPr/>
           <p:nvPr/>
         </p:nvSpPr>
@@ -8042,7 +8278,7 @@
       </p:sp>
       <p:sp>
         <p:nvSpPr>
-          <p:cNvPr id="151" name="Line 116"/>
+          <p:cNvPr id="153" name="Line 116"/>
           <p:cNvSpPr/>
           <p:nvPr/>
         </p:nvSpPr>
@@ -8087,6 +8323,60 @@
                 <a:ea typeface="DejaVu Sans"/>
               </a:rPr>
               <a:t>L_TO_DATA</a:t>
+            </a:r>
+            <a:endParaRPr b="0" lang="de-DE" sz="500" spc="-1" strike="noStrike">
+              <a:latin typeface="Arial"/>
+            </a:endParaRPr>
+          </a:p>
+        </p:txBody>
+      </p:sp>
+      <p:sp>
+        <p:nvSpPr>
+          <p:cNvPr id="154" name="Line 117"/>
+          <p:cNvSpPr/>
+          <p:nvPr/>
+        </p:nvSpPr>
+        <p:spPr>
+          <a:xfrm>
+            <a:off x="2955600" y="2784960"/>
+            <a:ext cx="1728000" cy="0"/>
+          </a:xfrm>
+          <a:prstGeom prst="line">
+            <a:avLst/>
+          </a:prstGeom>
+          <a:ln w="12600">
+            <a:solidFill>
+              <a:srgbClr val="000000"/>
+            </a:solidFill>
+            <a:round/>
+            <a:headEnd len="med" type="triangle" w="med"/>
+          </a:ln>
+        </p:spPr>
+        <p:style>
+          <a:lnRef idx="0"/>
+          <a:fillRef idx="0"/>
+          <a:effectRef idx="0"/>
+          <a:fontRef idx="minor"/>
+        </p:style>
+        <p:txBody>
+          <a:bodyPr lIns="96120" rIns="96120" tIns="51120" bIns="51120" anchorCtr="1">
+            <a:spAutoFit/>
+          </a:bodyPr>
+          <a:p>
+            <a:pPr algn="ctr">
+              <a:lnSpc>
+                <a:spcPts val="283"/>
+              </a:lnSpc>
+            </a:pPr>
+            <a:r>
+              <a:rPr b="0" lang="de-DE" sz="500" spc="-1" strike="noStrike">
+                <a:solidFill>
+                  <a:srgbClr val="000000"/>
+                </a:solidFill>
+                <a:latin typeface="Arial"/>
+                <a:ea typeface="DejaVu Sans"/>
+              </a:rPr>
+              <a:t>DATA_TO_X</a:t>
             </a:r>
             <a:endParaRPr b="0" lang="de-DE" sz="500" spc="-1" strike="noStrike">
               <a:latin typeface="Arial"/>

</xml_diff>